<commit_message>
MaJ PPT (Objectives, Solution)
</commit_message>
<xml_diff>
--- a/Pr�sentation/Pr�sentation_NUI.pptx
+++ b/Pr�sentation/Pr�sentation_NUI.pptx
@@ -4728,11 +4728,7 @@
             </a:br>
             <a:r>
               <a:rPr lang="en-US" dirty="0" smtClean="0"/>
-              <a:t>	</a:t>
-            </a:r>
-            <a:r>
-              <a:rPr lang="en-US" dirty="0" smtClean="0"/>
-              <a:t>Implemented algorithm</a:t>
+              <a:t>	Implemented algorithm</a:t>
             </a:r>
             <a:endParaRPr lang="en-US" dirty="0"/>
           </a:p>
@@ -4827,15 +4823,7 @@
           <a:p>
             <a:r>
               <a:rPr lang="en-US" dirty="0" smtClean="0"/>
-              <a:t>Tracking of the </a:t>
-            </a:r>
-            <a:r>
-              <a:rPr lang="en-US" dirty="0" smtClean="0"/>
-              <a:t>N </a:t>
-            </a:r>
-            <a:r>
-              <a:rPr lang="en-US" dirty="0" smtClean="0"/>
-              <a:t>main Blobs </a:t>
+              <a:t>Tracking of the N main Blobs </a:t>
             </a:r>
             <a:r>
               <a:rPr lang="en-US" dirty="0" smtClean="0">
@@ -5081,15 +5069,7 @@
                   <a:srgbClr val="FF0000"/>
                 </a:solidFill>
               </a:rPr>
-              <a:t>Total </a:t>
-            </a:r>
-            <a:r>
-              <a:rPr lang="fr-FR" sz="2400" dirty="0" smtClean="0">
-                <a:solidFill>
-                  <a:srgbClr val="FF0000"/>
-                </a:solidFill>
-              </a:rPr>
-              <a:t>Time of the </a:t>
+              <a:t>Total Time of the </a:t>
             </a:r>
             <a:r>
               <a:rPr lang="fr-FR" sz="2400" dirty="0" err="1" smtClean="0">
@@ -5105,23 +5085,7 @@
                   <a:srgbClr val="FF0000"/>
                 </a:solidFill>
               </a:rPr>
-              <a:t> </a:t>
-            </a:r>
-            <a:r>
-              <a:rPr lang="fr-FR" sz="2400" dirty="0" smtClean="0">
-                <a:solidFill>
-                  <a:srgbClr val="FF0000"/>
-                </a:solidFill>
-              </a:rPr>
-              <a:t>: 10 – 18 </a:t>
-            </a:r>
-            <a:r>
-              <a:rPr lang="fr-FR" sz="2400" dirty="0" smtClean="0">
-                <a:solidFill>
-                  <a:srgbClr val="FF0000"/>
-                </a:solidFill>
-              </a:rPr>
-              <a:t>ms</a:t>
+              <a:t> : 10 – 18 ms</a:t>
             </a:r>
             <a:br>
               <a:rPr lang="fr-FR" sz="2400" dirty="0" smtClean="0">
@@ -5168,15 +5132,7 @@
                   <a:srgbClr val="FF0000"/>
                 </a:solidFill>
               </a:rPr>
-              <a:t>Dire aussi ce qui se passe si on utilise que 2 blobs et pas 4, ou 6, etc. Genre un graph reco</a:t>
-            </a:r>
-            <a:r>
-              <a:rPr lang="fr-FR" sz="2400" dirty="0" smtClean="0">
-                <a:solidFill>
-                  <a:srgbClr val="FF0000"/>
-                </a:solidFill>
-              </a:rPr>
-              <a:t>gnition rate en fonction du nb de blobs</a:t>
+              <a:t>Dire aussi ce qui se passe si on utilise que 2 blobs et pas 4, ou 6, etc. Genre un graph recognition rate en fonction du nb de blobs</a:t>
             </a:r>
             <a:endParaRPr lang="fr-FR" sz="2400" dirty="0">
               <a:solidFill>
@@ -5810,7 +5766,7 @@
         <p:spPr>
           <a:xfrm>
             <a:off x="457200" y="1600200"/>
-            <a:ext cx="4186808" cy="4525963"/>
+            <a:ext cx="4330824" cy="4525963"/>
           </a:xfrm>
         </p:spPr>
         <p:txBody>
@@ -5854,7 +5810,7 @@
         </p:blipFill>
         <p:spPr>
           <a:xfrm>
-            <a:off x="4724400" y="2089245"/>
+            <a:off x="5148064" y="1916832"/>
             <a:ext cx="2743200" cy="3547872"/>
           </a:xfrm>
         </p:spPr>
@@ -5976,7 +5932,7 @@
             <a:pPr marL="852678" lvl="1" indent="-514350"/>
             <a:r>
               <a:rPr lang="en-US" dirty="0" smtClean="0"/>
-              <a:t>Web browser</a:t>
+              <a:t>Web browser using hands as Mouse cursor</a:t>
             </a:r>
           </a:p>
           <a:p>
@@ -6012,6 +5968,32 @@
           </a:p>
         </p:txBody>
       </p:sp>
+      <p:pic>
+        <p:nvPicPr>
+          <p:cNvPr id="1026" name="Picture 2" descr="C:\Users\Kevin\Documents\Projet Japon\kinect-1.jpg"/>
+          <p:cNvPicPr>
+            <a:picLocks noChangeAspect="1" noChangeArrowheads="1"/>
+          </p:cNvPicPr>
+          <p:nvPr/>
+        </p:nvPicPr>
+        <p:blipFill>
+          <a:blip r:embed="rId2" cstate="print"/>
+          <a:srcRect/>
+          <a:stretch>
+            <a:fillRect/>
+          </a:stretch>
+        </p:blipFill>
+        <p:spPr bwMode="auto">
+          <a:xfrm>
+            <a:off x="1475656" y="4293096"/>
+            <a:ext cx="5715000" cy="2133600"/>
+          </a:xfrm>
+          <a:prstGeom prst="rect">
+            <a:avLst/>
+          </a:prstGeom>
+          <a:noFill/>
+        </p:spPr>
+      </p:pic>
     </p:spTree>
   </p:cSld>
   <p:clrMapOvr>
@@ -6086,35 +6068,17 @@
           <a:p>
             <a:r>
               <a:rPr lang="en-US" dirty="0" smtClean="0"/>
-              <a:t>Must be responsive : running in Real </a:t>
-            </a:r>
+              <a:t>Must be responsive : running in Real Time (30 fps)</a:t>
+            </a:r>
+          </a:p>
+          <a:p>
+            <a:endParaRPr lang="en-US" dirty="0" smtClean="0"/>
+          </a:p>
+          <a:p>
             <a:r>
               <a:rPr lang="en-US" dirty="0" smtClean="0"/>
-              <a:t>Time (</a:t>
-            </a:r>
-            <a:r>
-              <a:rPr lang="en-US" dirty="0" smtClean="0"/>
-              <a:t>30 </a:t>
-            </a:r>
-            <a:r>
-              <a:rPr lang="en-US" dirty="0" smtClean="0"/>
-              <a:t>fps)</a:t>
-            </a:r>
-            <a:endParaRPr lang="en-US" dirty="0" smtClean="0"/>
-          </a:p>
-          <a:p>
-            <a:endParaRPr lang="en-US" dirty="0" smtClean="0"/>
-          </a:p>
-          <a:p>
-            <a:r>
-              <a:rPr lang="en-US" dirty="0" smtClean="0"/>
-              <a:t>Able to be bound with </a:t>
-            </a:r>
-            <a:r>
-              <a:rPr lang="en-US" dirty="0" smtClean="0"/>
-              <a:t>3D window system</a:t>
-            </a:r>
-            <a:endParaRPr lang="en-US" dirty="0" smtClean="0"/>
+              <a:t>Able to be bound with 3D window system</a:t>
+            </a:r>
           </a:p>
         </p:txBody>
       </p:sp>
@@ -6240,8 +6204,8 @@
         </p:blipFill>
         <p:spPr bwMode="auto">
           <a:xfrm>
-            <a:off x="467544" y="2924944"/>
-            <a:ext cx="7467600" cy="3039229"/>
+            <a:off x="1403648" y="3861048"/>
+            <a:ext cx="6402530" cy="2605757"/>
           </a:xfrm>
           <a:prstGeom prst="rect">
             <a:avLst/>
@@ -6439,24 +6403,7 @@
                 <a:ea typeface="+mn-ea"/>
                 <a:cs typeface="+mn-cs"/>
               </a:rPr>
-              <a:t>Recognition</a:t>
-            </a:r>
-            <a:r>
-              <a:rPr kumimoji="0" lang="en-US" sz="3000" b="0" i="0" u="none" strike="noStrike" kern="1200" cap="none" spc="0" normalizeH="0" baseline="0" noProof="0" dirty="0" smtClean="0">
-                <a:ln>
-                  <a:noFill/>
-                </a:ln>
-                <a:solidFill>
-                  <a:schemeClr val="tx1"/>
-                </a:solidFill>
-                <a:effectLst/>
-                <a:uLnTx/>
-                <a:uFillTx/>
-                <a:latin typeface="+mn-lt"/>
-                <a:ea typeface="+mn-ea"/>
-                <a:cs typeface="+mn-cs"/>
-              </a:rPr>
-              <a:t>…</a:t>
+              <a:t>Recognition…</a:t>
             </a:r>
           </a:p>
         </p:txBody>
@@ -6519,11 +6466,7 @@
             </a:br>
             <a:r>
               <a:rPr lang="en-US" dirty="0" smtClean="0"/>
-              <a:t>	</a:t>
-            </a:r>
-            <a:r>
-              <a:rPr lang="en-US" dirty="0" smtClean="0"/>
-              <a:t>Recognizing hand</a:t>
+              <a:t>	Recognizing hand</a:t>
             </a:r>
             <a:endParaRPr lang="en-US" dirty="0"/>
           </a:p>
@@ -6557,11 +6500,7 @@
           <a:p>
             <a:r>
               <a:rPr lang="en-US" dirty="0" smtClean="0"/>
-              <a:t>Pixels are filtered based on their distance from the sensor and grouped by </a:t>
-            </a:r>
-            <a:r>
-              <a:rPr lang="en-US" dirty="0" smtClean="0"/>
-              <a:t>blobs </a:t>
+              <a:t>Pixels are filtered based on their distance from the sensor and grouped by blobs </a:t>
             </a:r>
             <a:r>
               <a:rPr lang="en-US" dirty="0" smtClean="0">
@@ -6651,11 +6590,6 @@
               </a:rPr>
               <a:t> corps]</a:t>
             </a:r>
-            <a:endParaRPr lang="en-US" dirty="0" smtClean="0">
-              <a:solidFill>
-                <a:srgbClr val="FF0000"/>
-              </a:solidFill>
-            </a:endParaRPr>
           </a:p>
           <a:p>
             <a:endParaRPr lang="en-US" dirty="0" smtClean="0"/>
@@ -6663,19 +6597,7 @@
           <a:p>
             <a:r>
               <a:rPr lang="en-US" dirty="0" smtClean="0"/>
-              <a:t>The </a:t>
-            </a:r>
-            <a:r>
-              <a:rPr lang="en-US" dirty="0" smtClean="0"/>
-              <a:t>N biggest </a:t>
-            </a:r>
-            <a:r>
-              <a:rPr lang="en-US" dirty="0" smtClean="0"/>
-              <a:t>blobs are tracked by the software as potential </a:t>
-            </a:r>
-            <a:r>
-              <a:rPr lang="en-US" dirty="0" smtClean="0"/>
-              <a:t>hands candidates </a:t>
+              <a:t>The N biggest blobs are tracked by the software as potential hands candidates </a:t>
             </a:r>
             <a:r>
               <a:rPr lang="en-US" dirty="0" smtClean="0">
@@ -6685,11 +6607,6 @@
               </a:rPr>
               <a:t>[because …]</a:t>
             </a:r>
-            <a:endParaRPr lang="en-US" dirty="0" smtClean="0">
-              <a:solidFill>
-                <a:srgbClr val="FF0000"/>
-              </a:solidFill>
-            </a:endParaRPr>
           </a:p>
           <a:p>
             <a:endParaRPr lang="en-US" dirty="0" smtClean="0"/>
@@ -6784,11 +6701,7 @@
             </a:br>
             <a:r>
               <a:rPr lang="en-US" dirty="0" smtClean="0"/>
-              <a:t>	</a:t>
-            </a:r>
-            <a:r>
-              <a:rPr lang="en-US" dirty="0" smtClean="0"/>
-              <a:t>Running in real time</a:t>
+              <a:t>	Running in real time</a:t>
             </a:r>
             <a:endParaRPr lang="en-US" dirty="0"/>
           </a:p>
@@ -6834,11 +6747,7 @@
             <a:pPr lvl="1"/>
             <a:r>
               <a:rPr lang="en-US" dirty="0" smtClean="0"/>
-              <a:t>Using </a:t>
-            </a:r>
-            <a:r>
-              <a:rPr lang="en-US" dirty="0" smtClean="0"/>
-              <a:t>the horsepower of the graphic card when possible (only simple tasks done on the CPU)</a:t>
+              <a:t>Using the horsepower of the graphic card when possible (only simple tasks done on the CPU)</a:t>
             </a:r>
           </a:p>
           <a:p>

</xml_diff>

<commit_message>
MaJ PPT (modif titre)
</commit_message>
<xml_diff>
--- a/Pr�sentation/Pr�sentation_NUI.pptx
+++ b/Pr�sentation/Pr�sentation_NUI.pptx
@@ -183,16 +183,16 @@
                   <c:v>4.201918</c:v>
                 </c:pt>
                 <c:pt idx="1">
-                  <c:v>1.0630710999999993</c:v>
+                  <c:v>1.063071099999999</c:v>
                 </c:pt>
                 <c:pt idx="2">
-                  <c:v>0.28386960000000017</c:v>
+                  <c:v>0.28386960000000022</c:v>
                 </c:pt>
                 <c:pt idx="3">
-                  <c:v>0.15299750000000009</c:v>
+                  <c:v>0.15299750000000012</c:v>
                 </c:pt>
                 <c:pt idx="4">
-                  <c:v>4.9843000000000026E-2</c:v>
+                  <c:v>4.984300000000004E-2</c:v>
                 </c:pt>
                 <c:pt idx="5">
                   <c:v>3.8114299999999997E-2</c:v>
@@ -248,33 +248,33 @@
                 <c:formatCode>General</c:formatCode>
                 <c:ptCount val="6"/>
                 <c:pt idx="0">
-                  <c:v>3.4600000000000048E-5</c:v>
+                  <c:v>3.4600000000000062E-5</c:v>
                 </c:pt>
                 <c:pt idx="1">
-                  <c:v>3.4000000000000047E-5</c:v>
+                  <c:v>3.4000000000000061E-5</c:v>
                 </c:pt>
                 <c:pt idx="2">
-                  <c:v>3.0700000000000041E-5</c:v>
+                  <c:v>3.0700000000000048E-5</c:v>
                 </c:pt>
                 <c:pt idx="3">
-                  <c:v>5.7700000000000081E-5</c:v>
+                  <c:v>5.7700000000000108E-5</c:v>
                 </c:pt>
                 <c:pt idx="4">
-                  <c:v>3.3300000000000044E-5</c:v>
+                  <c:v>3.3300000000000057E-5</c:v>
                 </c:pt>
                 <c:pt idx="5">
-                  <c:v>3.4600000000000048E-5</c:v>
+                  <c:v>3.4600000000000062E-5</c:v>
                 </c:pt>
               </c:numCache>
             </c:numRef>
           </c:val>
         </c:ser>
         <c:marker val="1"/>
-        <c:axId val="92082560"/>
-        <c:axId val="92084096"/>
+        <c:axId val="65315200"/>
+        <c:axId val="65316736"/>
       </c:lineChart>
       <c:catAx>
-        <c:axId val="92082560"/>
+        <c:axId val="65315200"/>
         <c:scaling>
           <c:orientation val="minMax"/>
         </c:scaling>
@@ -290,14 +290,14 @@
             <a:endParaRPr lang="fr-FR"/>
           </a:p>
         </c:txPr>
-        <c:crossAx val="92084096"/>
-        <c:crossesAt val="1.0000000000000016E-5"/>
+        <c:crossAx val="65316736"/>
+        <c:crossesAt val="1.0000000000000021E-5"/>
         <c:auto val="1"/>
         <c:lblAlgn val="ctr"/>
         <c:lblOffset val="100"/>
       </c:catAx>
       <c:valAx>
-        <c:axId val="92084096"/>
+        <c:axId val="65316736"/>
         <c:scaling>
           <c:logBase val="10"/>
           <c:orientation val="minMax"/>
@@ -307,7 +307,7 @@
         <c:numFmt formatCode="General" sourceLinked="1"/>
         <c:minorTickMark val="in"/>
         <c:tickLblPos val="nextTo"/>
-        <c:crossAx val="92082560"/>
+        <c:crossAx val="65315200"/>
         <c:crosses val="autoZero"/>
         <c:crossBetween val="between"/>
       </c:valAx>
@@ -5101,7 +5101,11 @@
             </a:r>
             <a:r>
               <a:rPr lang="fr-FR" dirty="0" smtClean="0"/>
-              <a:t> Kinect</a:t>
+              <a:t> </a:t>
+            </a:r>
+            <a:r>
+              <a:rPr lang="fr-FR" dirty="0" smtClean="0"/>
+              <a:t>Microsoft Kinect</a:t>
             </a:r>
             <a:endParaRPr lang="fr-FR" dirty="0"/>
           </a:p>
@@ -6112,11 +6116,7 @@
             <a:pPr lvl="1"/>
             <a:r>
               <a:rPr lang="en-US" dirty="0" smtClean="0"/>
-              <a:t>Usually only both arms and the head are </a:t>
-            </a:r>
-            <a:r>
-              <a:rPr lang="en-US" dirty="0" smtClean="0"/>
-              <a:t>visible</a:t>
+              <a:t>Usually only both arms and the head are visible</a:t>
             </a:r>
           </a:p>
           <a:p>
@@ -6133,7 +6133,6 @@
               <a:rPr lang="en-US" dirty="0" smtClean="0"/>
               <a:t> sensors</a:t>
             </a:r>
-            <a:endParaRPr lang="en-US" dirty="0" smtClean="0"/>
           </a:p>
           <a:p>
             <a:pPr lvl="1"/>

</xml_diff>

<commit_message>
Modif PPT (changement titre)
</commit_message>
<xml_diff>
--- a/Pr�sentation/Pr�sentation_NUI.pptx
+++ b/Pr�sentation/Pr�sentation_NUI.pptx
@@ -183,16 +183,16 @@
                   <c:v>4.201918</c:v>
                 </c:pt>
                 <c:pt idx="1">
-                  <c:v>1.063071099999999</c:v>
+                  <c:v>1.0630710999999988</c:v>
                 </c:pt>
                 <c:pt idx="2">
-                  <c:v>0.28386960000000022</c:v>
+                  <c:v>0.28386960000000028</c:v>
                 </c:pt>
                 <c:pt idx="3">
-                  <c:v>0.15299750000000012</c:v>
+                  <c:v>0.15299750000000018</c:v>
                 </c:pt>
                 <c:pt idx="4">
-                  <c:v>4.984300000000004E-2</c:v>
+                  <c:v>4.9843000000000054E-2</c:v>
                 </c:pt>
                 <c:pt idx="5">
                   <c:v>3.8114299999999997E-2</c:v>
@@ -248,33 +248,33 @@
                 <c:formatCode>General</c:formatCode>
                 <c:ptCount val="6"/>
                 <c:pt idx="0">
-                  <c:v>3.4600000000000062E-5</c:v>
+                  <c:v>3.4600000000000075E-5</c:v>
                 </c:pt>
                 <c:pt idx="1">
-                  <c:v>3.4000000000000061E-5</c:v>
+                  <c:v>3.4000000000000074E-5</c:v>
                 </c:pt>
                 <c:pt idx="2">
-                  <c:v>3.0700000000000048E-5</c:v>
+                  <c:v>3.0700000000000062E-5</c:v>
                 </c:pt>
                 <c:pt idx="3">
-                  <c:v>5.7700000000000108E-5</c:v>
+                  <c:v>5.7700000000000135E-5</c:v>
                 </c:pt>
                 <c:pt idx="4">
-                  <c:v>3.3300000000000057E-5</c:v>
+                  <c:v>3.3300000000000071E-5</c:v>
                 </c:pt>
                 <c:pt idx="5">
-                  <c:v>3.4600000000000062E-5</c:v>
+                  <c:v>3.4600000000000075E-5</c:v>
                 </c:pt>
               </c:numCache>
             </c:numRef>
           </c:val>
         </c:ser>
         <c:marker val="1"/>
-        <c:axId val="65315200"/>
-        <c:axId val="65316736"/>
+        <c:axId val="79018240"/>
+        <c:axId val="39301120"/>
       </c:lineChart>
       <c:catAx>
-        <c:axId val="65315200"/>
+        <c:axId val="79018240"/>
         <c:scaling>
           <c:orientation val="minMax"/>
         </c:scaling>
@@ -290,14 +290,14 @@
             <a:endParaRPr lang="fr-FR"/>
           </a:p>
         </c:txPr>
-        <c:crossAx val="65316736"/>
-        <c:crossesAt val="1.0000000000000021E-5"/>
+        <c:crossAx val="39301120"/>
+        <c:crossesAt val="1.0000000000000025E-5"/>
         <c:auto val="1"/>
         <c:lblAlgn val="ctr"/>
         <c:lblOffset val="100"/>
       </c:catAx>
       <c:valAx>
-        <c:axId val="65316736"/>
+        <c:axId val="39301120"/>
         <c:scaling>
           <c:logBase val="10"/>
           <c:orientation val="minMax"/>
@@ -307,7 +307,7 @@
         <c:numFmt formatCode="General" sourceLinked="1"/>
         <c:minorTickMark val="in"/>
         <c:tickLblPos val="nextTo"/>
-        <c:crossAx val="65315200"/>
+        <c:crossAx val="79018240"/>
         <c:crosses val="autoZero"/>
         <c:crossBetween val="between"/>
       </c:valAx>
@@ -5100,12 +5100,12 @@
               <a:t>using</a:t>
             </a:r>
             <a:r>
-              <a:rPr lang="fr-FR" dirty="0" smtClean="0"/>
+              <a:rPr lang="fr-FR" smtClean="0"/>
               <a:t> </a:t>
             </a:r>
             <a:r>
-              <a:rPr lang="fr-FR" dirty="0" smtClean="0"/>
-              <a:t>Microsoft Kinect</a:t>
+              <a:rPr lang="fr-FR" smtClean="0"/>
+              <a:t>Kinect</a:t>
             </a:r>
             <a:endParaRPr lang="fr-FR" dirty="0"/>
           </a:p>

</xml_diff>

<commit_message>
MaJ PPT (legende images)
</commit_message>
<xml_diff>
--- a/Pr�sentation/Pr�sentation_NUI.pptx
+++ b/Pr�sentation/Pr�sentation_NUI.pptx
@@ -183,16 +183,16 @@
                   <c:v>4.201918</c:v>
                 </c:pt>
                 <c:pt idx="1">
-                  <c:v>1.0630710999999988</c:v>
+                  <c:v>1.0630710999999986</c:v>
                 </c:pt>
                 <c:pt idx="2">
-                  <c:v>0.28386960000000028</c:v>
+                  <c:v>0.28386960000000033</c:v>
                 </c:pt>
                 <c:pt idx="3">
-                  <c:v>0.15299750000000018</c:v>
+                  <c:v>0.15299750000000023</c:v>
                 </c:pt>
                 <c:pt idx="4">
-                  <c:v>4.9843000000000054E-2</c:v>
+                  <c:v>4.9843000000000068E-2</c:v>
                 </c:pt>
                 <c:pt idx="5">
                   <c:v>3.8114299999999997E-2</c:v>
@@ -248,33 +248,33 @@
                 <c:formatCode>General</c:formatCode>
                 <c:ptCount val="6"/>
                 <c:pt idx="0">
-                  <c:v>3.4600000000000075E-5</c:v>
+                  <c:v>3.4600000000000089E-5</c:v>
                 </c:pt>
                 <c:pt idx="1">
-                  <c:v>3.4000000000000074E-5</c:v>
+                  <c:v>3.4000000000000088E-5</c:v>
                 </c:pt>
                 <c:pt idx="2">
-                  <c:v>3.0700000000000062E-5</c:v>
+                  <c:v>3.0700000000000075E-5</c:v>
                 </c:pt>
                 <c:pt idx="3">
-                  <c:v>5.7700000000000135E-5</c:v>
+                  <c:v>5.7700000000000162E-5</c:v>
                 </c:pt>
                 <c:pt idx="4">
-                  <c:v>3.3300000000000071E-5</c:v>
+                  <c:v>3.3300000000000084E-5</c:v>
                 </c:pt>
                 <c:pt idx="5">
-                  <c:v>3.4600000000000075E-5</c:v>
+                  <c:v>3.4600000000000089E-5</c:v>
                 </c:pt>
               </c:numCache>
             </c:numRef>
           </c:val>
         </c:ser>
         <c:marker val="1"/>
-        <c:axId val="79018240"/>
-        <c:axId val="39301120"/>
+        <c:axId val="76101888"/>
+        <c:axId val="76115968"/>
       </c:lineChart>
       <c:catAx>
-        <c:axId val="79018240"/>
+        <c:axId val="76101888"/>
         <c:scaling>
           <c:orientation val="minMax"/>
         </c:scaling>
@@ -290,14 +290,14 @@
             <a:endParaRPr lang="fr-FR"/>
           </a:p>
         </c:txPr>
-        <c:crossAx val="39301120"/>
-        <c:crossesAt val="1.0000000000000025E-5"/>
+        <c:crossAx val="76115968"/>
+        <c:crossesAt val="1.0000000000000028E-5"/>
         <c:auto val="1"/>
         <c:lblAlgn val="ctr"/>
         <c:lblOffset val="100"/>
       </c:catAx>
       <c:valAx>
-        <c:axId val="39301120"/>
+        <c:axId val="76115968"/>
         <c:scaling>
           <c:logBase val="10"/>
           <c:orientation val="minMax"/>
@@ -307,7 +307,7 @@
         <c:numFmt formatCode="General" sourceLinked="1"/>
         <c:minorTickMark val="in"/>
         <c:tickLblPos val="nextTo"/>
-        <c:crossAx val="79018240"/>
+        <c:crossAx val="76101888"/>
         <c:crosses val="autoZero"/>
         <c:crossBetween val="between"/>
       </c:valAx>
@@ -465,7 +465,7 @@
             <a:fld id="{2203E90B-0CDC-4675-8BC8-ABC960C3C4BD}" type="datetimeFigureOut">
               <a:rPr lang="fr-FR" smtClean="0"/>
               <a:pPr/>
-              <a:t>20/12/2011</a:t>
+              <a:t>22/12/2011</a:t>
             </a:fld>
             <a:endParaRPr lang="fr-FR"/>
           </a:p>
@@ -1926,7 +1926,7 @@
             <a:fld id="{7FE745BF-AED8-4079-86B5-94776AA709CD}" type="datetime1">
               <a:rPr lang="fr-FR" smtClean="0"/>
               <a:pPr/>
-              <a:t>20/12/2011</a:t>
+              <a:t>22/12/2011</a:t>
             </a:fld>
             <a:endParaRPr lang="fr-FR" dirty="0"/>
           </a:p>
@@ -2093,7 +2093,7 @@
             <a:fld id="{8BADFC06-5AC4-476A-8FD2-54DE0E426D90}" type="datetime1">
               <a:rPr lang="fr-FR" smtClean="0"/>
               <a:pPr/>
-              <a:t>20/12/2011</a:t>
+              <a:t>22/12/2011</a:t>
             </a:fld>
             <a:endParaRPr lang="fr-FR" dirty="0"/>
           </a:p>
@@ -2270,7 +2270,7 @@
             <a:fld id="{271E89F4-7B08-401C-94CC-1E6E90A77743}" type="datetime1">
               <a:rPr lang="fr-FR" smtClean="0"/>
               <a:pPr/>
-              <a:t>20/12/2011</a:t>
+              <a:t>22/12/2011</a:t>
             </a:fld>
             <a:endParaRPr lang="fr-FR" dirty="0"/>
           </a:p>
@@ -2441,7 +2441,7 @@
             <a:fld id="{B8D51CD3-FD0B-4398-96D6-10844A344A7A}" type="datetime1">
               <a:rPr lang="fr-FR" smtClean="0"/>
               <a:pPr/>
-              <a:t>20/12/2011</a:t>
+              <a:t>22/12/2011</a:t>
             </a:fld>
             <a:endParaRPr lang="fr-FR" dirty="0"/>
           </a:p>
@@ -2898,7 +2898,7 @@
             <a:fld id="{5272A46D-708F-4429-9728-C0AAA1D8ED70}" type="datetime1">
               <a:rPr lang="fr-FR" smtClean="0"/>
               <a:pPr/>
-              <a:t>20/12/2011</a:t>
+              <a:t>22/12/2011</a:t>
             </a:fld>
             <a:endParaRPr lang="fr-FR" dirty="0"/>
           </a:p>
@@ -3164,7 +3164,7 @@
             <a:fld id="{85176319-0B46-44DD-88B8-E7F3AAD4F2DF}" type="datetime1">
               <a:rPr lang="fr-FR" smtClean="0"/>
               <a:pPr/>
-              <a:t>20/12/2011</a:t>
+              <a:t>22/12/2011</a:t>
             </a:fld>
             <a:endParaRPr lang="fr-FR" dirty="0"/>
           </a:p>
@@ -3540,7 +3540,7 @@
             <a:fld id="{2587345E-05A6-495C-A1A1-170A1A91A394}" type="datetime1">
               <a:rPr lang="fr-FR" smtClean="0"/>
               <a:pPr/>
-              <a:t>20/12/2011</a:t>
+              <a:t>22/12/2011</a:t>
             </a:fld>
             <a:endParaRPr lang="fr-FR" dirty="0"/>
           </a:p>
@@ -3664,7 +3664,7 @@
             <a:fld id="{172809C5-74F0-4FD7-9204-0F8A8FB1929B}" type="datetime1">
               <a:rPr lang="fr-FR" smtClean="0"/>
               <a:pPr/>
-              <a:t>20/12/2011</a:t>
+              <a:t>22/12/2011</a:t>
             </a:fld>
             <a:endParaRPr lang="fr-FR" dirty="0"/>
           </a:p>
@@ -3756,7 +3756,7 @@
             <a:fld id="{7786A093-8429-44F1-808A-11360C2CAA55}" type="datetime1">
               <a:rPr lang="fr-FR" smtClean="0"/>
               <a:pPr/>
-              <a:t>20/12/2011</a:t>
+              <a:t>22/12/2011</a:t>
             </a:fld>
             <a:endParaRPr lang="fr-FR" dirty="0"/>
           </a:p>
@@ -4007,7 +4007,7 @@
             <a:fld id="{FE18F5A1-6F3E-41A1-AC38-A5948C92E970}" type="datetime1">
               <a:rPr lang="fr-FR" smtClean="0"/>
               <a:pPr/>
-              <a:t>20/12/2011</a:t>
+              <a:t>22/12/2011</a:t>
             </a:fld>
             <a:endParaRPr lang="fr-FR" dirty="0"/>
           </a:p>
@@ -4268,7 +4268,7 @@
             <a:fld id="{42D0C6D8-1219-406E-8CD6-FA778B9D3E63}" type="datetime1">
               <a:rPr lang="fr-FR" smtClean="0"/>
               <a:pPr/>
-              <a:t>20/12/2011</a:t>
+              <a:t>22/12/2011</a:t>
             </a:fld>
             <a:endParaRPr lang="fr-FR" dirty="0"/>
           </a:p>
@@ -4674,7 +4674,7 @@
             <a:fld id="{CC7C295D-0E21-434D-B466-C466C8EF3B27}" type="datetime1">
               <a:rPr lang="fr-FR" smtClean="0"/>
               <a:pPr/>
-              <a:t>20/12/2011</a:t>
+              <a:t>22/12/2011</a:t>
             </a:fld>
             <a:endParaRPr lang="fr-FR" dirty="0"/>
           </a:p>
@@ -5101,11 +5101,7 @@
             </a:r>
             <a:r>
               <a:rPr lang="fr-FR" smtClean="0"/>
-              <a:t> </a:t>
-            </a:r>
-            <a:r>
-              <a:rPr lang="fr-FR" smtClean="0"/>
-              <a:t>Kinect</a:t>
+              <a:t> Kinect</a:t>
             </a:r>
             <a:endParaRPr lang="fr-FR" dirty="0"/>
           </a:p>
@@ -7186,7 +7182,7 @@
         </p:blipFill>
         <p:spPr bwMode="auto">
           <a:xfrm>
-            <a:off x="395536" y="3861048"/>
+            <a:off x="467544" y="3645024"/>
             <a:ext cx="4141031" cy="2313534"/>
           </a:xfrm>
           <a:prstGeom prst="rect">
@@ -7212,7 +7208,7 @@
         </p:blipFill>
         <p:spPr bwMode="auto">
           <a:xfrm>
-            <a:off x="5004048" y="3717032"/>
+            <a:off x="5004048" y="3356992"/>
             <a:ext cx="3405068" cy="2591594"/>
           </a:xfrm>
           <a:prstGeom prst="rect">
@@ -7221,6 +7217,82 @@
           <a:noFill/>
         </p:spPr>
       </p:pic>
+      <p:sp>
+        <p:nvSpPr>
+          <p:cNvPr id="7" name="ZoneTexte 6"/>
+          <p:cNvSpPr txBox="1"/>
+          <p:nvPr/>
+        </p:nvSpPr>
+        <p:spPr>
+          <a:xfrm>
+            <a:off x="971600" y="6021288"/>
+            <a:ext cx="3168352" cy="461665"/>
+          </a:xfrm>
+          <a:prstGeom prst="rect">
+            <a:avLst/>
+          </a:prstGeom>
+          <a:noFill/>
+        </p:spPr>
+        <p:txBody>
+          <a:bodyPr wrap="square" rtlCol="0">
+            <a:spAutoFit/>
+          </a:bodyPr>
+          <a:lstStyle/>
+          <a:p>
+            <a:r>
+              <a:rPr lang="fr-FR" sz="2400" dirty="0" smtClean="0"/>
+              <a:t>2D </a:t>
+            </a:r>
+            <a:r>
+              <a:rPr lang="fr-FR" sz="2400" dirty="0" err="1" smtClean="0"/>
+              <a:t>Window</a:t>
+            </a:r>
+            <a:r>
+              <a:rPr lang="fr-FR" sz="2400" dirty="0" smtClean="0"/>
+              <a:t> system</a:t>
+            </a:r>
+            <a:endParaRPr lang="fr-FR" sz="2400" dirty="0"/>
+          </a:p>
+        </p:txBody>
+      </p:sp>
+      <p:sp>
+        <p:nvSpPr>
+          <p:cNvPr id="8" name="ZoneTexte 7"/>
+          <p:cNvSpPr txBox="1"/>
+          <p:nvPr/>
+        </p:nvSpPr>
+        <p:spPr>
+          <a:xfrm>
+            <a:off x="5292080" y="6021288"/>
+            <a:ext cx="2880320" cy="461665"/>
+          </a:xfrm>
+          <a:prstGeom prst="rect">
+            <a:avLst/>
+          </a:prstGeom>
+          <a:noFill/>
+        </p:spPr>
+        <p:txBody>
+          <a:bodyPr wrap="square" rtlCol="0">
+            <a:spAutoFit/>
+          </a:bodyPr>
+          <a:lstStyle/>
+          <a:p>
+            <a:r>
+              <a:rPr lang="fr-FR" sz="2400" dirty="0" smtClean="0"/>
+              <a:t>3D </a:t>
+            </a:r>
+            <a:r>
+              <a:rPr lang="fr-FR" sz="2400" dirty="0" err="1" smtClean="0"/>
+              <a:t>Window</a:t>
+            </a:r>
+            <a:r>
+              <a:rPr lang="fr-FR" sz="2400" dirty="0" smtClean="0"/>
+              <a:t> system</a:t>
+            </a:r>
+            <a:endParaRPr lang="fr-FR" sz="2400" dirty="0"/>
+          </a:p>
+        </p:txBody>
+      </p:sp>
     </p:spTree>
   </p:cSld>
   <p:clrMapOvr>

</xml_diff>

<commit_message>
maj rapport et presentation
</commit_message>
<xml_diff>
--- a/Pr�sentation/Pr�sentation_NUI.pptx
+++ b/Pr�sentation/Pr�sentation_NUI.pptx
@@ -5,7 +5,7 @@
     <p:sldMasterId id="2147483684" r:id="rId1"/>
   </p:sldMasterIdLst>
   <p:notesMasterIdLst>
-    <p:notesMasterId r:id="rId17"/>
+    <p:notesMasterId r:id="rId24"/>
   </p:notesMasterIdLst>
   <p:sldIdLst>
     <p:sldId id="256" r:id="rId2"/>
@@ -20,9 +20,16 @@
     <p:sldId id="264" r:id="rId11"/>
     <p:sldId id="267" r:id="rId12"/>
     <p:sldId id="266" r:id="rId13"/>
-    <p:sldId id="262" r:id="rId14"/>
-    <p:sldId id="265" r:id="rId15"/>
-    <p:sldId id="268" r:id="rId16"/>
+    <p:sldId id="271" r:id="rId14"/>
+    <p:sldId id="272" r:id="rId15"/>
+    <p:sldId id="273" r:id="rId16"/>
+    <p:sldId id="274" r:id="rId17"/>
+    <p:sldId id="275" r:id="rId18"/>
+    <p:sldId id="276" r:id="rId19"/>
+    <p:sldId id="277" r:id="rId20"/>
+    <p:sldId id="262" r:id="rId21"/>
+    <p:sldId id="265" r:id="rId22"/>
+    <p:sldId id="268" r:id="rId23"/>
   </p:sldIdLst>
   <p:sldSz cx="9144000" cy="6858000" type="screen4x3"/>
   <p:notesSz cx="6858000" cy="9144000"/>
@@ -183,16 +190,16 @@
                   <c:v>4.201918</c:v>
                 </c:pt>
                 <c:pt idx="1">
-                  <c:v>1.0630710999999982</c:v>
+                  <c:v>1.0630710999999979</c:v>
                 </c:pt>
                 <c:pt idx="2">
-                  <c:v>0.28386960000000044</c:v>
+                  <c:v>0.2838696000000005</c:v>
                 </c:pt>
                 <c:pt idx="3">
-                  <c:v>0.15299750000000029</c:v>
+                  <c:v>0.15299750000000031</c:v>
                 </c:pt>
                 <c:pt idx="4">
-                  <c:v>4.9843000000000089E-2</c:v>
+                  <c:v>4.9843000000000103E-2</c:v>
                 </c:pt>
                 <c:pt idx="5">
                   <c:v>3.8114299999999997E-2</c:v>
@@ -248,33 +255,33 @@
                 <c:formatCode>General</c:formatCode>
                 <c:ptCount val="6"/>
                 <c:pt idx="0">
-                  <c:v>3.4600000000000116E-5</c:v>
+                  <c:v>3.460000000000013E-5</c:v>
                 </c:pt>
                 <c:pt idx="1">
-                  <c:v>3.4000000000000115E-5</c:v>
+                  <c:v>3.4000000000000128E-5</c:v>
                 </c:pt>
                 <c:pt idx="2">
-                  <c:v>3.0700000000000102E-5</c:v>
+                  <c:v>3.0700000000000116E-5</c:v>
                 </c:pt>
                 <c:pt idx="3">
-                  <c:v>5.7700000000000217E-5</c:v>
+                  <c:v>5.7700000000000251E-5</c:v>
                 </c:pt>
                 <c:pt idx="4">
-                  <c:v>3.3300000000000105E-5</c:v>
+                  <c:v>3.3300000000000118E-5</c:v>
                 </c:pt>
                 <c:pt idx="5">
-                  <c:v>3.4600000000000116E-5</c:v>
+                  <c:v>3.460000000000013E-5</c:v>
                 </c:pt>
               </c:numCache>
             </c:numRef>
           </c:val>
         </c:ser>
         <c:marker val="1"/>
-        <c:axId val="51283072"/>
-        <c:axId val="51284608"/>
+        <c:axId val="70034176"/>
+        <c:axId val="70035712"/>
       </c:lineChart>
       <c:catAx>
-        <c:axId val="51283072"/>
+        <c:axId val="70034176"/>
         <c:scaling>
           <c:orientation val="minMax"/>
         </c:scaling>
@@ -290,14 +297,14 @@
             <a:endParaRPr lang="fr-FR"/>
           </a:p>
         </c:txPr>
-        <c:crossAx val="51284608"/>
-        <c:crossesAt val="1.0000000000000038E-5"/>
+        <c:crossAx val="70035712"/>
+        <c:crossesAt val="1.0000000000000045E-5"/>
         <c:auto val="1"/>
         <c:lblAlgn val="ctr"/>
         <c:lblOffset val="100"/>
       </c:catAx>
       <c:valAx>
-        <c:axId val="51284608"/>
+        <c:axId val="70035712"/>
         <c:scaling>
           <c:logBase val="10"/>
           <c:orientation val="minMax"/>
@@ -307,7 +314,7 @@
         <c:numFmt formatCode="General" sourceLinked="1"/>
         <c:minorTickMark val="in"/>
         <c:tickLblPos val="nextTo"/>
-        <c:crossAx val="51283072"/>
+        <c:crossAx val="70034176"/>
         <c:crosses val="autoZero"/>
         <c:crossBetween val="between"/>
       </c:valAx>
@@ -330,6 +337,1214 @@
   </c:txPr>
   <c:externalData r:id="rId1"/>
   <c:userShapes r:id="rId2"/>
+</c:chartSpace>
+</file>
+
+<file path=ppt/charts/chart2.xml><?xml version="1.0" encoding="utf-8"?>
+<c:chartSpace xmlns:c="http://schemas.openxmlformats.org/drawingml/2006/chart" xmlns:a="http://schemas.openxmlformats.org/drawingml/2006/main" xmlns:r="http://schemas.openxmlformats.org/officeDocument/2006/relationships">
+  <c:date1904 val="1"/>
+  <c:lang val="fr-FR"/>
+  <c:chart>
+    <c:plotArea>
+      <c:layout/>
+      <c:lineChart>
+        <c:grouping val="standard"/>
+        <c:ser>
+          <c:idx val="0"/>
+          <c:order val="0"/>
+          <c:tx>
+            <c:v>Mouse</c:v>
+          </c:tx>
+          <c:marker>
+            <c:symbol val="none"/>
+          </c:marker>
+          <c:cat>
+            <c:numRef>
+              <c:f>Precision!$A$6:$A$11</c:f>
+              <c:numCache>
+                <c:formatCode>General</c:formatCode>
+                <c:ptCount val="6"/>
+                <c:pt idx="0">
+                  <c:v>24</c:v>
+                </c:pt>
+                <c:pt idx="1">
+                  <c:v>32</c:v>
+                </c:pt>
+                <c:pt idx="2">
+                  <c:v>64</c:v>
+                </c:pt>
+                <c:pt idx="3">
+                  <c:v>72</c:v>
+                </c:pt>
+                <c:pt idx="4">
+                  <c:v>92</c:v>
+                </c:pt>
+                <c:pt idx="5">
+                  <c:v>128</c:v>
+                </c:pt>
+              </c:numCache>
+            </c:numRef>
+          </c:cat>
+          <c:val>
+            <c:numRef>
+              <c:f>Precision!$B$6:$B$11</c:f>
+              <c:numCache>
+                <c:formatCode>General</c:formatCode>
+                <c:ptCount val="6"/>
+                <c:pt idx="0">
+                  <c:v>0.76500000000000123</c:v>
+                </c:pt>
+                <c:pt idx="1">
+                  <c:v>0.81799999999999995</c:v>
+                </c:pt>
+                <c:pt idx="2">
+                  <c:v>0.72800000000000065</c:v>
+                </c:pt>
+                <c:pt idx="3">
+                  <c:v>0.61100000000000065</c:v>
+                </c:pt>
+                <c:pt idx="4">
+                  <c:v>0.57099999999999995</c:v>
+                </c:pt>
+                <c:pt idx="5">
+                  <c:v>0.46400000000000002</c:v>
+                </c:pt>
+              </c:numCache>
+            </c:numRef>
+          </c:val>
+        </c:ser>
+        <c:ser>
+          <c:idx val="1"/>
+          <c:order val="1"/>
+          <c:tx>
+            <c:v>Kinect Hands</c:v>
+          </c:tx>
+          <c:marker>
+            <c:symbol val="none"/>
+          </c:marker>
+          <c:val>
+            <c:numRef>
+              <c:f>Precision!$B$15:$B$20</c:f>
+              <c:numCache>
+                <c:formatCode>General</c:formatCode>
+                <c:ptCount val="6"/>
+                <c:pt idx="0">
+                  <c:v>3.08</c:v>
+                </c:pt>
+                <c:pt idx="1">
+                  <c:v>2.92</c:v>
+                </c:pt>
+                <c:pt idx="2">
+                  <c:v>2.4499999999999997</c:v>
+                </c:pt>
+                <c:pt idx="3">
+                  <c:v>3.03</c:v>
+                </c:pt>
+                <c:pt idx="4">
+                  <c:v>2.23</c:v>
+                </c:pt>
+                <c:pt idx="5">
+                  <c:v>2.14</c:v>
+                </c:pt>
+              </c:numCache>
+            </c:numRef>
+          </c:val>
+        </c:ser>
+        <c:ser>
+          <c:idx val="2"/>
+          <c:order val="2"/>
+          <c:tx>
+            <c:v>Kinect Skeleton</c:v>
+          </c:tx>
+          <c:marker>
+            <c:symbol val="none"/>
+          </c:marker>
+          <c:val>
+            <c:numRef>
+              <c:f>Precision!$B$24:$B$29</c:f>
+              <c:numCache>
+                <c:formatCode>General</c:formatCode>
+                <c:ptCount val="6"/>
+                <c:pt idx="0">
+                  <c:v>3.226</c:v>
+                </c:pt>
+                <c:pt idx="1">
+                  <c:v>3.2229999999999999</c:v>
+                </c:pt>
+                <c:pt idx="2">
+                  <c:v>2.2890000000000001</c:v>
+                </c:pt>
+                <c:pt idx="3">
+                  <c:v>2.3509999999999978</c:v>
+                </c:pt>
+                <c:pt idx="4">
+                  <c:v>2.0840000000000001</c:v>
+                </c:pt>
+                <c:pt idx="5">
+                  <c:v>1.7749999999999975</c:v>
+                </c:pt>
+              </c:numCache>
+            </c:numRef>
+          </c:val>
+        </c:ser>
+        <c:marker val="1"/>
+        <c:axId val="48964352"/>
+        <c:axId val="59970688"/>
+      </c:lineChart>
+      <c:catAx>
+        <c:axId val="48964352"/>
+        <c:scaling>
+          <c:orientation val="minMax"/>
+        </c:scaling>
+        <c:axPos val="b"/>
+        <c:numFmt formatCode="General" sourceLinked="1"/>
+        <c:tickLblPos val="nextTo"/>
+        <c:crossAx val="59970688"/>
+        <c:crosses val="autoZero"/>
+        <c:auto val="1"/>
+        <c:lblAlgn val="ctr"/>
+        <c:lblOffset val="100"/>
+      </c:catAx>
+      <c:valAx>
+        <c:axId val="59970688"/>
+        <c:scaling>
+          <c:orientation val="minMax"/>
+        </c:scaling>
+        <c:axPos val="l"/>
+        <c:majorGridlines/>
+        <c:numFmt formatCode="General" sourceLinked="1"/>
+        <c:tickLblPos val="nextTo"/>
+        <c:crossAx val="48964352"/>
+        <c:crosses val="autoZero"/>
+        <c:crossBetween val="between"/>
+      </c:valAx>
+    </c:plotArea>
+    <c:legend>
+      <c:legendPos val="r"/>
+      <c:layout/>
+    </c:legend>
+    <c:plotVisOnly val="1"/>
+  </c:chart>
+  <c:externalData r:id="rId1"/>
+</c:chartSpace>
+</file>
+
+<file path=ppt/charts/chart3.xml><?xml version="1.0" encoding="utf-8"?>
+<c:chartSpace xmlns:c="http://schemas.openxmlformats.org/drawingml/2006/chart" xmlns:a="http://schemas.openxmlformats.org/drawingml/2006/main" xmlns:r="http://schemas.openxmlformats.org/officeDocument/2006/relationships">
+  <c:date1904 val="1"/>
+  <c:lang val="fr-FR"/>
+  <c:chart>
+    <c:plotArea>
+      <c:layout/>
+      <c:lineChart>
+        <c:grouping val="standard"/>
+        <c:ser>
+          <c:idx val="0"/>
+          <c:order val="0"/>
+          <c:tx>
+            <c:v>Mouse</c:v>
+          </c:tx>
+          <c:marker>
+            <c:symbol val="none"/>
+          </c:marker>
+          <c:cat>
+            <c:numRef>
+              <c:f>Precision!$A$6:$A$11</c:f>
+              <c:numCache>
+                <c:formatCode>General</c:formatCode>
+                <c:ptCount val="6"/>
+                <c:pt idx="0">
+                  <c:v>24</c:v>
+                </c:pt>
+                <c:pt idx="1">
+                  <c:v>32</c:v>
+                </c:pt>
+                <c:pt idx="2">
+                  <c:v>64</c:v>
+                </c:pt>
+                <c:pt idx="3">
+                  <c:v>72</c:v>
+                </c:pt>
+                <c:pt idx="4">
+                  <c:v>92</c:v>
+                </c:pt>
+                <c:pt idx="5">
+                  <c:v>128</c:v>
+                </c:pt>
+              </c:numCache>
+            </c:numRef>
+          </c:cat>
+          <c:val>
+            <c:numRef>
+              <c:f>Precision!$C$6:$C$11</c:f>
+              <c:numCache>
+                <c:formatCode>General</c:formatCode>
+                <c:ptCount val="6"/>
+                <c:pt idx="0">
+                  <c:v>4.6199999999999966</c:v>
+                </c:pt>
+                <c:pt idx="1">
+                  <c:v>4.71</c:v>
+                </c:pt>
+                <c:pt idx="2">
+                  <c:v>6.84</c:v>
+                </c:pt>
+                <c:pt idx="3">
+                  <c:v>11.97</c:v>
+                </c:pt>
+                <c:pt idx="4">
+                  <c:v>26.04</c:v>
+                </c:pt>
+                <c:pt idx="5">
+                  <c:v>50.11</c:v>
+                </c:pt>
+              </c:numCache>
+            </c:numRef>
+          </c:val>
+        </c:ser>
+        <c:ser>
+          <c:idx val="1"/>
+          <c:order val="1"/>
+          <c:tx>
+            <c:v>Kinect Hands</c:v>
+          </c:tx>
+          <c:marker>
+            <c:symbol val="none"/>
+          </c:marker>
+          <c:cat>
+            <c:numRef>
+              <c:f>Precision!$A$6:$A$11</c:f>
+              <c:numCache>
+                <c:formatCode>General</c:formatCode>
+                <c:ptCount val="6"/>
+                <c:pt idx="0">
+                  <c:v>24</c:v>
+                </c:pt>
+                <c:pt idx="1">
+                  <c:v>32</c:v>
+                </c:pt>
+                <c:pt idx="2">
+                  <c:v>64</c:v>
+                </c:pt>
+                <c:pt idx="3">
+                  <c:v>72</c:v>
+                </c:pt>
+                <c:pt idx="4">
+                  <c:v>92</c:v>
+                </c:pt>
+                <c:pt idx="5">
+                  <c:v>128</c:v>
+                </c:pt>
+              </c:numCache>
+            </c:numRef>
+          </c:cat>
+          <c:val>
+            <c:numRef>
+              <c:f>Precision!$C$15:$C$20</c:f>
+              <c:numCache>
+                <c:formatCode>General</c:formatCode>
+                <c:ptCount val="6"/>
+                <c:pt idx="0">
+                  <c:v>15.07</c:v>
+                </c:pt>
+                <c:pt idx="1">
+                  <c:v>21.16</c:v>
+                </c:pt>
+                <c:pt idx="2">
+                  <c:v>16.939999999999987</c:v>
+                </c:pt>
+                <c:pt idx="3">
+                  <c:v>24.99</c:v>
+                </c:pt>
+                <c:pt idx="4">
+                  <c:v>31.99</c:v>
+                </c:pt>
+                <c:pt idx="5">
+                  <c:v>57.39</c:v>
+                </c:pt>
+              </c:numCache>
+            </c:numRef>
+          </c:val>
+        </c:ser>
+        <c:ser>
+          <c:idx val="2"/>
+          <c:order val="2"/>
+          <c:tx>
+            <c:v>Kinect Skeleton</c:v>
+          </c:tx>
+          <c:marker>
+            <c:symbol val="none"/>
+          </c:marker>
+          <c:cat>
+            <c:numRef>
+              <c:f>Precision!$A$6:$A$11</c:f>
+              <c:numCache>
+                <c:formatCode>General</c:formatCode>
+                <c:ptCount val="6"/>
+                <c:pt idx="0">
+                  <c:v>24</c:v>
+                </c:pt>
+                <c:pt idx="1">
+                  <c:v>32</c:v>
+                </c:pt>
+                <c:pt idx="2">
+                  <c:v>64</c:v>
+                </c:pt>
+                <c:pt idx="3">
+                  <c:v>72</c:v>
+                </c:pt>
+                <c:pt idx="4">
+                  <c:v>92</c:v>
+                </c:pt>
+                <c:pt idx="5">
+                  <c:v>128</c:v>
+                </c:pt>
+              </c:numCache>
+            </c:numRef>
+          </c:cat>
+          <c:val>
+            <c:numRef>
+              <c:f>Precision!$C$24:$C$29</c:f>
+              <c:numCache>
+                <c:formatCode>General</c:formatCode>
+                <c:ptCount val="6"/>
+                <c:pt idx="0">
+                  <c:v>20.75</c:v>
+                </c:pt>
+                <c:pt idx="1">
+                  <c:v>17.27</c:v>
+                </c:pt>
+                <c:pt idx="2">
+                  <c:v>19.260000000000002</c:v>
+                </c:pt>
+                <c:pt idx="3">
+                  <c:v>26.03</c:v>
+                </c:pt>
+                <c:pt idx="4">
+                  <c:v>31.810000000000031</c:v>
+                </c:pt>
+                <c:pt idx="5">
+                  <c:v>57.44</c:v>
+                </c:pt>
+              </c:numCache>
+            </c:numRef>
+          </c:val>
+        </c:ser>
+        <c:marker val="1"/>
+        <c:axId val="47586304"/>
+        <c:axId val="48944256"/>
+      </c:lineChart>
+      <c:catAx>
+        <c:axId val="47586304"/>
+        <c:scaling>
+          <c:orientation val="minMax"/>
+        </c:scaling>
+        <c:axPos val="b"/>
+        <c:numFmt formatCode="General" sourceLinked="1"/>
+        <c:tickLblPos val="nextTo"/>
+        <c:crossAx val="48944256"/>
+        <c:crosses val="autoZero"/>
+        <c:auto val="1"/>
+        <c:lblAlgn val="ctr"/>
+        <c:lblOffset val="100"/>
+      </c:catAx>
+      <c:valAx>
+        <c:axId val="48944256"/>
+        <c:scaling>
+          <c:orientation val="minMax"/>
+        </c:scaling>
+        <c:axPos val="l"/>
+        <c:majorGridlines/>
+        <c:numFmt formatCode="General" sourceLinked="1"/>
+        <c:tickLblPos val="nextTo"/>
+        <c:crossAx val="47586304"/>
+        <c:crosses val="autoZero"/>
+        <c:crossBetween val="between"/>
+      </c:valAx>
+    </c:plotArea>
+    <c:legend>
+      <c:legendPos val="r"/>
+      <c:layout/>
+    </c:legend>
+    <c:plotVisOnly val="1"/>
+  </c:chart>
+  <c:externalData r:id="rId1"/>
+</c:chartSpace>
+</file>
+
+<file path=ppt/charts/chart4.xml><?xml version="1.0" encoding="utf-8"?>
+<c:chartSpace xmlns:c="http://schemas.openxmlformats.org/drawingml/2006/chart" xmlns:a="http://schemas.openxmlformats.org/drawingml/2006/main" xmlns:r="http://schemas.openxmlformats.org/officeDocument/2006/relationships">
+  <c:date1904 val="1"/>
+  <c:lang val="fr-FR"/>
+  <c:chart>
+    <c:plotArea>
+      <c:layout/>
+      <c:lineChart>
+        <c:grouping val="standard"/>
+        <c:ser>
+          <c:idx val="0"/>
+          <c:order val="0"/>
+          <c:tx>
+            <c:v>Mouse</c:v>
+          </c:tx>
+          <c:marker>
+            <c:symbol val="none"/>
+          </c:marker>
+          <c:cat>
+            <c:numRef>
+              <c:f>Precision!$A$6:$A$11</c:f>
+              <c:numCache>
+                <c:formatCode>General</c:formatCode>
+                <c:ptCount val="6"/>
+                <c:pt idx="0">
+                  <c:v>24</c:v>
+                </c:pt>
+                <c:pt idx="1">
+                  <c:v>32</c:v>
+                </c:pt>
+                <c:pt idx="2">
+                  <c:v>64</c:v>
+                </c:pt>
+                <c:pt idx="3">
+                  <c:v>72</c:v>
+                </c:pt>
+                <c:pt idx="4">
+                  <c:v>92</c:v>
+                </c:pt>
+                <c:pt idx="5">
+                  <c:v>128</c:v>
+                </c:pt>
+              </c:numCache>
+            </c:numRef>
+          </c:cat>
+          <c:val>
+            <c:numRef>
+              <c:f>Precision!$D$6:$D$11</c:f>
+              <c:numCache>
+                <c:formatCode>General</c:formatCode>
+                <c:ptCount val="6"/>
+                <c:pt idx="0">
+                  <c:v>99.88</c:v>
+                </c:pt>
+                <c:pt idx="1">
+                  <c:v>100</c:v>
+                </c:pt>
+                <c:pt idx="2">
+                  <c:v>100</c:v>
+                </c:pt>
+                <c:pt idx="3">
+                  <c:v>100</c:v>
+                </c:pt>
+                <c:pt idx="4">
+                  <c:v>100</c:v>
+                </c:pt>
+                <c:pt idx="5">
+                  <c:v>100</c:v>
+                </c:pt>
+              </c:numCache>
+            </c:numRef>
+          </c:val>
+        </c:ser>
+        <c:ser>
+          <c:idx val="1"/>
+          <c:order val="1"/>
+          <c:tx>
+            <c:v>Kinect Hands</c:v>
+          </c:tx>
+          <c:marker>
+            <c:symbol val="none"/>
+          </c:marker>
+          <c:val>
+            <c:numRef>
+              <c:f>Precision!$D$15:$D$20</c:f>
+              <c:numCache>
+                <c:formatCode>General</c:formatCode>
+                <c:ptCount val="6"/>
+                <c:pt idx="0">
+                  <c:v>74.86</c:v>
+                </c:pt>
+                <c:pt idx="1">
+                  <c:v>94.910000000000025</c:v>
+                </c:pt>
+                <c:pt idx="2">
+                  <c:v>95.34</c:v>
+                </c:pt>
+                <c:pt idx="3">
+                  <c:v>94.5</c:v>
+                </c:pt>
+                <c:pt idx="4">
+                  <c:v>100</c:v>
+                </c:pt>
+                <c:pt idx="5">
+                  <c:v>100</c:v>
+                </c:pt>
+              </c:numCache>
+            </c:numRef>
+          </c:val>
+        </c:ser>
+        <c:ser>
+          <c:idx val="2"/>
+          <c:order val="2"/>
+          <c:tx>
+            <c:v>Kinect Skeleton</c:v>
+          </c:tx>
+          <c:marker>
+            <c:symbol val="none"/>
+          </c:marker>
+          <c:val>
+            <c:numRef>
+              <c:f>Precision!$D$24:$D$29</c:f>
+              <c:numCache>
+                <c:formatCode>General</c:formatCode>
+                <c:ptCount val="6"/>
+                <c:pt idx="0">
+                  <c:v>64.09</c:v>
+                </c:pt>
+                <c:pt idx="1">
+                  <c:v>72.099999999999994</c:v>
+                </c:pt>
+                <c:pt idx="2">
+                  <c:v>97.26</c:v>
+                </c:pt>
+                <c:pt idx="3">
+                  <c:v>99.490000000000023</c:v>
+                </c:pt>
+                <c:pt idx="4">
+                  <c:v>100</c:v>
+                </c:pt>
+                <c:pt idx="5">
+                  <c:v>100</c:v>
+                </c:pt>
+              </c:numCache>
+            </c:numRef>
+          </c:val>
+        </c:ser>
+        <c:marker val="1"/>
+        <c:axId val="48685056"/>
+        <c:axId val="48687744"/>
+      </c:lineChart>
+      <c:catAx>
+        <c:axId val="48685056"/>
+        <c:scaling>
+          <c:orientation val="minMax"/>
+        </c:scaling>
+        <c:axPos val="b"/>
+        <c:numFmt formatCode="General" sourceLinked="1"/>
+        <c:tickLblPos val="nextTo"/>
+        <c:crossAx val="48687744"/>
+        <c:crosses val="autoZero"/>
+        <c:auto val="1"/>
+        <c:lblAlgn val="ctr"/>
+        <c:lblOffset val="100"/>
+      </c:catAx>
+      <c:valAx>
+        <c:axId val="48687744"/>
+        <c:scaling>
+          <c:orientation val="minMax"/>
+        </c:scaling>
+        <c:axPos val="l"/>
+        <c:majorGridlines/>
+        <c:numFmt formatCode="General" sourceLinked="1"/>
+        <c:tickLblPos val="nextTo"/>
+        <c:crossAx val="48685056"/>
+        <c:crosses val="autoZero"/>
+        <c:crossBetween val="between"/>
+      </c:valAx>
+    </c:plotArea>
+    <c:legend>
+      <c:legendPos val="r"/>
+      <c:layout/>
+    </c:legend>
+    <c:plotVisOnly val="1"/>
+  </c:chart>
+  <c:externalData r:id="rId1"/>
+</c:chartSpace>
+</file>
+
+<file path=ppt/charts/chart5.xml><?xml version="1.0" encoding="utf-8"?>
+<c:chartSpace xmlns:c="http://schemas.openxmlformats.org/drawingml/2006/chart" xmlns:a="http://schemas.openxmlformats.org/drawingml/2006/main" xmlns:r="http://schemas.openxmlformats.org/officeDocument/2006/relationships">
+  <c:date1904 val="1"/>
+  <c:lang val="fr-FR"/>
+  <c:chart>
+    <c:plotArea>
+      <c:layout/>
+      <c:lineChart>
+        <c:grouping val="standard"/>
+        <c:ser>
+          <c:idx val="0"/>
+          <c:order val="0"/>
+          <c:tx>
+            <c:v>Mouse</c:v>
+          </c:tx>
+          <c:marker>
+            <c:symbol val="none"/>
+          </c:marker>
+          <c:cat>
+            <c:numRef>
+              <c:f>Precision!$A$15:$A$20</c:f>
+              <c:numCache>
+                <c:formatCode>General</c:formatCode>
+                <c:ptCount val="6"/>
+                <c:pt idx="0">
+                  <c:v>24</c:v>
+                </c:pt>
+                <c:pt idx="1">
+                  <c:v>32</c:v>
+                </c:pt>
+                <c:pt idx="2">
+                  <c:v>64</c:v>
+                </c:pt>
+                <c:pt idx="3">
+                  <c:v>72</c:v>
+                </c:pt>
+                <c:pt idx="4">
+                  <c:v>92</c:v>
+                </c:pt>
+                <c:pt idx="5">
+                  <c:v>128</c:v>
+                </c:pt>
+              </c:numCache>
+            </c:numRef>
+          </c:cat>
+          <c:val>
+            <c:numRef>
+              <c:f>Precision!$F$6:$F$11</c:f>
+              <c:numCache>
+                <c:formatCode>General</c:formatCode>
+                <c:ptCount val="6"/>
+                <c:pt idx="0">
+                  <c:v>7.3900000000000006</c:v>
+                </c:pt>
+                <c:pt idx="1">
+                  <c:v>4.3100000000000005</c:v>
+                </c:pt>
+                <c:pt idx="2">
+                  <c:v>2.8309999999999977</c:v>
+                </c:pt>
+                <c:pt idx="3">
+                  <c:v>5.4539999999999997</c:v>
+                </c:pt>
+                <c:pt idx="4">
+                  <c:v>6.7319999999999993</c:v>
+                </c:pt>
+                <c:pt idx="5">
+                  <c:v>3.9630000000000001</c:v>
+                </c:pt>
+              </c:numCache>
+            </c:numRef>
+          </c:val>
+        </c:ser>
+        <c:ser>
+          <c:idx val="1"/>
+          <c:order val="1"/>
+          <c:tx>
+            <c:v>Kinect Hands</c:v>
+          </c:tx>
+          <c:marker>
+            <c:symbol val="none"/>
+          </c:marker>
+          <c:val>
+            <c:numRef>
+              <c:f>Precision!$F$15:$F$20</c:f>
+              <c:numCache>
+                <c:formatCode>General</c:formatCode>
+                <c:ptCount val="6"/>
+                <c:pt idx="0">
+                  <c:v>48.839000000000006</c:v>
+                </c:pt>
+                <c:pt idx="1">
+                  <c:v>49.285000000000011</c:v>
+                </c:pt>
+                <c:pt idx="2">
+                  <c:v>37.531000000000006</c:v>
+                </c:pt>
+                <c:pt idx="3">
+                  <c:v>49.551000000000002</c:v>
+                </c:pt>
+                <c:pt idx="4">
+                  <c:v>44.338000000000001</c:v>
+                </c:pt>
+                <c:pt idx="5">
+                  <c:v>57.416999999999994</c:v>
+                </c:pt>
+              </c:numCache>
+            </c:numRef>
+          </c:val>
+        </c:ser>
+        <c:ser>
+          <c:idx val="2"/>
+          <c:order val="2"/>
+          <c:tx>
+            <c:v>Kinect Skeleton</c:v>
+          </c:tx>
+          <c:marker>
+            <c:symbol val="none"/>
+          </c:marker>
+          <c:val>
+            <c:numRef>
+              <c:f>Precision!$F$24:$F$29</c:f>
+              <c:numCache>
+                <c:formatCode>General</c:formatCode>
+                <c:ptCount val="6"/>
+                <c:pt idx="0">
+                  <c:v>32.128000000000071</c:v>
+                </c:pt>
+                <c:pt idx="1">
+                  <c:v>33.488</c:v>
+                </c:pt>
+                <c:pt idx="2">
+                  <c:v>31.844000000000001</c:v>
+                </c:pt>
+                <c:pt idx="3">
+                  <c:v>34.085000000000001</c:v>
+                </c:pt>
+                <c:pt idx="4">
+                  <c:v>31.51</c:v>
+                </c:pt>
+                <c:pt idx="5">
+                  <c:v>33.220000000000013</c:v>
+                </c:pt>
+              </c:numCache>
+            </c:numRef>
+          </c:val>
+        </c:ser>
+        <c:marker val="1"/>
+        <c:axId val="48683648"/>
+        <c:axId val="60354560"/>
+      </c:lineChart>
+      <c:catAx>
+        <c:axId val="48683648"/>
+        <c:scaling>
+          <c:orientation val="minMax"/>
+        </c:scaling>
+        <c:axPos val="b"/>
+        <c:numFmt formatCode="General" sourceLinked="1"/>
+        <c:tickLblPos val="nextTo"/>
+        <c:crossAx val="60354560"/>
+        <c:crosses val="autoZero"/>
+        <c:auto val="1"/>
+        <c:lblAlgn val="ctr"/>
+        <c:lblOffset val="100"/>
+      </c:catAx>
+      <c:valAx>
+        <c:axId val="60354560"/>
+        <c:scaling>
+          <c:orientation val="minMax"/>
+        </c:scaling>
+        <c:axPos val="l"/>
+        <c:majorGridlines/>
+        <c:numFmt formatCode="General" sourceLinked="1"/>
+        <c:tickLblPos val="nextTo"/>
+        <c:crossAx val="48683648"/>
+        <c:crosses val="autoZero"/>
+        <c:crossBetween val="between"/>
+      </c:valAx>
+    </c:plotArea>
+    <c:legend>
+      <c:legendPos val="r"/>
+      <c:layout/>
+    </c:legend>
+    <c:plotVisOnly val="1"/>
+  </c:chart>
+  <c:externalData r:id="rId1"/>
+</c:chartSpace>
+</file>
+
+<file path=ppt/charts/chart6.xml><?xml version="1.0" encoding="utf-8"?>
+<c:chartSpace xmlns:c="http://schemas.openxmlformats.org/drawingml/2006/chart" xmlns:a="http://schemas.openxmlformats.org/drawingml/2006/main" xmlns:r="http://schemas.openxmlformats.org/officeDocument/2006/relationships">
+  <c:date1904 val="1"/>
+  <c:lang val="fr-FR"/>
+  <c:chart>
+    <c:plotArea>
+      <c:layout/>
+      <c:barChart>
+        <c:barDir val="col"/>
+        <c:grouping val="stacked"/>
+        <c:ser>
+          <c:idx val="0"/>
+          <c:order val="0"/>
+          <c:tx>
+            <c:v>Processing Time</c:v>
+          </c:tx>
+          <c:cat>
+            <c:strRef>
+              <c:f>Speed!$A$8:$A$11</c:f>
+              <c:strCache>
+                <c:ptCount val="4"/>
+                <c:pt idx="0">
+                  <c:v>PC1 Normal</c:v>
+                </c:pt>
+                <c:pt idx="1">
+                  <c:v>PC1 Eco</c:v>
+                </c:pt>
+                <c:pt idx="2">
+                  <c:v>PC2 Normal</c:v>
+                </c:pt>
+                <c:pt idx="3">
+                  <c:v>PC2 Eco</c:v>
+                </c:pt>
+              </c:strCache>
+            </c:strRef>
+          </c:cat>
+          <c:val>
+            <c:numRef>
+              <c:f>Speed!$B$8:$B$11</c:f>
+              <c:numCache>
+                <c:formatCode>General</c:formatCode>
+                <c:ptCount val="4"/>
+                <c:pt idx="0">
+                  <c:v>18</c:v>
+                </c:pt>
+                <c:pt idx="1">
+                  <c:v>30</c:v>
+                </c:pt>
+                <c:pt idx="2">
+                  <c:v>30</c:v>
+                </c:pt>
+                <c:pt idx="3">
+                  <c:v>50</c:v>
+                </c:pt>
+              </c:numCache>
+            </c:numRef>
+          </c:val>
+        </c:ser>
+        <c:ser>
+          <c:idx val="1"/>
+          <c:order val="1"/>
+          <c:tx>
+            <c:v>Rendering Time</c:v>
+          </c:tx>
+          <c:val>
+            <c:numRef>
+              <c:f>Speed!$C$8:$C$11</c:f>
+              <c:numCache>
+                <c:formatCode>General</c:formatCode>
+                <c:ptCount val="4"/>
+                <c:pt idx="0">
+                  <c:v>3</c:v>
+                </c:pt>
+                <c:pt idx="1">
+                  <c:v>52</c:v>
+                </c:pt>
+                <c:pt idx="2">
+                  <c:v>20</c:v>
+                </c:pt>
+                <c:pt idx="3">
+                  <c:v>40</c:v>
+                </c:pt>
+              </c:numCache>
+            </c:numRef>
+          </c:val>
+        </c:ser>
+        <c:overlap val="100"/>
+        <c:axId val="47683072"/>
+        <c:axId val="47710592"/>
+      </c:barChart>
+      <c:catAx>
+        <c:axId val="47683072"/>
+        <c:scaling>
+          <c:orientation val="minMax"/>
+        </c:scaling>
+        <c:axPos val="b"/>
+        <c:tickLblPos val="nextTo"/>
+        <c:crossAx val="47710592"/>
+        <c:crosses val="autoZero"/>
+        <c:auto val="1"/>
+        <c:lblAlgn val="ctr"/>
+        <c:lblOffset val="100"/>
+      </c:catAx>
+      <c:valAx>
+        <c:axId val="47710592"/>
+        <c:scaling>
+          <c:orientation val="minMax"/>
+        </c:scaling>
+        <c:axPos val="l"/>
+        <c:majorGridlines/>
+        <c:numFmt formatCode="General" sourceLinked="1"/>
+        <c:tickLblPos val="nextTo"/>
+        <c:crossAx val="47683072"/>
+        <c:crosses val="autoZero"/>
+        <c:crossBetween val="between"/>
+      </c:valAx>
+    </c:plotArea>
+    <c:legend>
+      <c:legendPos val="r"/>
+      <c:layout/>
+    </c:legend>
+    <c:plotVisOnly val="1"/>
+  </c:chart>
+  <c:externalData r:id="rId1"/>
+</c:chartSpace>
+</file>
+
+<file path=ppt/charts/chart7.xml><?xml version="1.0" encoding="utf-8"?>
+<c:chartSpace xmlns:c="http://schemas.openxmlformats.org/drawingml/2006/chart" xmlns:a="http://schemas.openxmlformats.org/drawingml/2006/main" xmlns:r="http://schemas.openxmlformats.org/officeDocument/2006/relationships">
+  <c:date1904 val="1"/>
+  <c:lang val="fr-FR"/>
+  <c:chart>
+    <c:plotArea>
+      <c:layout/>
+      <c:barChart>
+        <c:barDir val="col"/>
+        <c:grouping val="clustered"/>
+        <c:ser>
+          <c:idx val="0"/>
+          <c:order val="0"/>
+          <c:tx>
+            <c:v>Circular Keyboard</c:v>
+          </c:tx>
+          <c:cat>
+            <c:strRef>
+              <c:f>Keyboard!$B$2:$B$6</c:f>
+              <c:strCache>
+                <c:ptCount val="5"/>
+                <c:pt idx="0">
+                  <c:v>yes</c:v>
+                </c:pt>
+                <c:pt idx="1">
+                  <c:v>zero</c:v>
+                </c:pt>
+                <c:pt idx="2">
+                  <c:v>apple</c:v>
+                </c:pt>
+                <c:pt idx="3">
+                  <c:v>morning</c:v>
+                </c:pt>
+                <c:pt idx="4">
+                  <c:v>establishment</c:v>
+                </c:pt>
+              </c:strCache>
+            </c:strRef>
+          </c:cat>
+          <c:val>
+            <c:numRef>
+              <c:f>Keyboard!$C$2:$C$6</c:f>
+              <c:numCache>
+                <c:formatCode>General</c:formatCode>
+                <c:ptCount val="5"/>
+                <c:pt idx="0">
+                  <c:v>17.260000000000002</c:v>
+                </c:pt>
+                <c:pt idx="1">
+                  <c:v>20.2</c:v>
+                </c:pt>
+                <c:pt idx="2">
+                  <c:v>25.88</c:v>
+                </c:pt>
+                <c:pt idx="3">
+                  <c:v>22.110000000000031</c:v>
+                </c:pt>
+                <c:pt idx="4">
+                  <c:v>53.64</c:v>
+                </c:pt>
+              </c:numCache>
+            </c:numRef>
+          </c:val>
+        </c:ser>
+        <c:ser>
+          <c:idx val="1"/>
+          <c:order val="1"/>
+          <c:tx>
+            <c:v>T9 Keyboard</c:v>
+          </c:tx>
+          <c:val>
+            <c:numRef>
+              <c:f>Keyboard!$C$9:$C$13</c:f>
+              <c:numCache>
+                <c:formatCode>General</c:formatCode>
+                <c:ptCount val="5"/>
+                <c:pt idx="0">
+                  <c:v>14.54</c:v>
+                </c:pt>
+                <c:pt idx="1">
+                  <c:v>15.42</c:v>
+                </c:pt>
+                <c:pt idx="2">
+                  <c:v>17.86</c:v>
+                </c:pt>
+                <c:pt idx="3">
+                  <c:v>16.559999999999999</c:v>
+                </c:pt>
+                <c:pt idx="4">
+                  <c:v>17.479999999999986</c:v>
+                </c:pt>
+              </c:numCache>
+            </c:numRef>
+          </c:val>
+        </c:ser>
+        <c:axId val="64356352"/>
+        <c:axId val="64357888"/>
+      </c:barChart>
+      <c:catAx>
+        <c:axId val="64356352"/>
+        <c:scaling>
+          <c:orientation val="minMax"/>
+        </c:scaling>
+        <c:axPos val="b"/>
+        <c:tickLblPos val="nextTo"/>
+        <c:crossAx val="64357888"/>
+        <c:crosses val="autoZero"/>
+        <c:auto val="1"/>
+        <c:lblAlgn val="ctr"/>
+        <c:lblOffset val="100"/>
+      </c:catAx>
+      <c:valAx>
+        <c:axId val="64357888"/>
+        <c:scaling>
+          <c:orientation val="minMax"/>
+        </c:scaling>
+        <c:axPos val="l"/>
+        <c:majorGridlines/>
+        <c:numFmt formatCode="General" sourceLinked="1"/>
+        <c:tickLblPos val="nextTo"/>
+        <c:crossAx val="64356352"/>
+        <c:crosses val="autoZero"/>
+        <c:crossBetween val="between"/>
+      </c:valAx>
+    </c:plotArea>
+    <c:legend>
+      <c:legendPos val="r"/>
+      <c:layout/>
+    </c:legend>
+    <c:plotVisOnly val="1"/>
+  </c:chart>
+  <c:externalData r:id="rId1"/>
+</c:chartSpace>
+</file>
+
+<file path=ppt/charts/chart8.xml><?xml version="1.0" encoding="utf-8"?>
+<c:chartSpace xmlns:c="http://schemas.openxmlformats.org/drawingml/2006/chart" xmlns:a="http://schemas.openxmlformats.org/drawingml/2006/main" xmlns:r="http://schemas.openxmlformats.org/officeDocument/2006/relationships">
+  <c:date1904 val="1"/>
+  <c:lang val="fr-FR"/>
+  <c:chart>
+    <c:plotArea>
+      <c:layout/>
+      <c:barChart>
+        <c:barDir val="col"/>
+        <c:grouping val="clustered"/>
+        <c:ser>
+          <c:idx val="0"/>
+          <c:order val="0"/>
+          <c:tx>
+            <c:v>Circular Keyboard</c:v>
+          </c:tx>
+          <c:cat>
+            <c:strRef>
+              <c:f>Keyboard!$B$9:$B$13</c:f>
+              <c:strCache>
+                <c:ptCount val="5"/>
+                <c:pt idx="0">
+                  <c:v>yes</c:v>
+                </c:pt>
+                <c:pt idx="1">
+                  <c:v>zero</c:v>
+                </c:pt>
+                <c:pt idx="2">
+                  <c:v>apple</c:v>
+                </c:pt>
+                <c:pt idx="3">
+                  <c:v>morning</c:v>
+                </c:pt>
+                <c:pt idx="4">
+                  <c:v>establishment</c:v>
+                </c:pt>
+              </c:strCache>
+            </c:strRef>
+          </c:cat>
+          <c:val>
+            <c:numRef>
+              <c:f>Keyboard!$D$2:$D$6</c:f>
+              <c:numCache>
+                <c:formatCode>General</c:formatCode>
+                <c:ptCount val="5"/>
+                <c:pt idx="0">
+                  <c:v>4</c:v>
+                </c:pt>
+                <c:pt idx="1">
+                  <c:v>5</c:v>
+                </c:pt>
+                <c:pt idx="2">
+                  <c:v>5</c:v>
+                </c:pt>
+                <c:pt idx="3">
+                  <c:v>6</c:v>
+                </c:pt>
+                <c:pt idx="4">
+                  <c:v>11</c:v>
+                </c:pt>
+              </c:numCache>
+            </c:numRef>
+          </c:val>
+        </c:ser>
+        <c:ser>
+          <c:idx val="1"/>
+          <c:order val="1"/>
+          <c:tx>
+            <c:v>T9 Keyboard</c:v>
+          </c:tx>
+          <c:val>
+            <c:numRef>
+              <c:f>Keyboard!$D$9:$D$13</c:f>
+              <c:numCache>
+                <c:formatCode>General</c:formatCode>
+                <c:ptCount val="5"/>
+                <c:pt idx="0">
+                  <c:v>4</c:v>
+                </c:pt>
+                <c:pt idx="1">
+                  <c:v>5</c:v>
+                </c:pt>
+                <c:pt idx="2">
+                  <c:v>6</c:v>
+                </c:pt>
+                <c:pt idx="3">
+                  <c:v>5</c:v>
+                </c:pt>
+                <c:pt idx="4">
+                  <c:v>7</c:v>
+                </c:pt>
+              </c:numCache>
+            </c:numRef>
+          </c:val>
+        </c:ser>
+        <c:axId val="48077056"/>
+        <c:axId val="48095616"/>
+      </c:barChart>
+      <c:catAx>
+        <c:axId val="48077056"/>
+        <c:scaling>
+          <c:orientation val="minMax"/>
+        </c:scaling>
+        <c:axPos val="b"/>
+        <c:numFmt formatCode="General" sourceLinked="1"/>
+        <c:tickLblPos val="nextTo"/>
+        <c:crossAx val="48095616"/>
+        <c:crosses val="autoZero"/>
+        <c:auto val="1"/>
+        <c:lblAlgn val="ctr"/>
+        <c:lblOffset val="100"/>
+      </c:catAx>
+      <c:valAx>
+        <c:axId val="48095616"/>
+        <c:scaling>
+          <c:orientation val="minMax"/>
+        </c:scaling>
+        <c:axPos val="l"/>
+        <c:majorGridlines/>
+        <c:numFmt formatCode="General" sourceLinked="1"/>
+        <c:tickLblPos val="nextTo"/>
+        <c:crossAx val="48077056"/>
+        <c:crosses val="autoZero"/>
+        <c:crossBetween val="between"/>
+      </c:valAx>
+    </c:plotArea>
+    <c:legend>
+      <c:legendPos val="r"/>
+      <c:layout/>
+    </c:legend>
+    <c:plotVisOnly val="1"/>
+  </c:chart>
+  <c:externalData r:id="rId1"/>
 </c:chartSpace>
 </file>
 
@@ -465,7 +1680,7 @@
             <a:fld id="{2203E90B-0CDC-4675-8BC8-ABC960C3C4BD}" type="datetimeFigureOut">
               <a:rPr lang="fr-FR" smtClean="0"/>
               <a:pPr/>
-              <a:t>25/12/2011</a:t>
+              <a:t>18/03/2012</a:t>
             </a:fld>
             <a:endParaRPr lang="fr-FR"/>
           </a:p>
@@ -1522,7 +2737,7 @@
             <a:fld id="{2AC8731D-2D87-440C-8698-DB210FC0FD5A}" type="slidenum">
               <a:rPr lang="fr-FR" smtClean="0"/>
               <a:pPr/>
-              <a:t>13</a:t>
+              <a:t>20</a:t>
             </a:fld>
             <a:endParaRPr lang="fr-FR"/>
           </a:p>
@@ -1624,7 +2839,7 @@
             <a:fld id="{2AC8731D-2D87-440C-8698-DB210FC0FD5A}" type="slidenum">
               <a:rPr lang="fr-FR" smtClean="0"/>
               <a:pPr/>
-              <a:t>14</a:t>
+              <a:t>21</a:t>
             </a:fld>
             <a:endParaRPr lang="fr-FR"/>
           </a:p>
@@ -2023,7 +3238,7 @@
             <a:fld id="{7FE745BF-AED8-4079-86B5-94776AA709CD}" type="datetime1">
               <a:rPr lang="fr-FR" smtClean="0"/>
               <a:pPr/>
-              <a:t>25/12/2011</a:t>
+              <a:t>18/03/2012</a:t>
             </a:fld>
             <a:endParaRPr lang="fr-FR" dirty="0"/>
           </a:p>
@@ -2190,7 +3405,7 @@
             <a:fld id="{8BADFC06-5AC4-476A-8FD2-54DE0E426D90}" type="datetime1">
               <a:rPr lang="fr-FR" smtClean="0"/>
               <a:pPr/>
-              <a:t>25/12/2011</a:t>
+              <a:t>18/03/2012</a:t>
             </a:fld>
             <a:endParaRPr lang="fr-FR" dirty="0"/>
           </a:p>
@@ -2367,7 +3582,7 @@
             <a:fld id="{271E89F4-7B08-401C-94CC-1E6E90A77743}" type="datetime1">
               <a:rPr lang="fr-FR" smtClean="0"/>
               <a:pPr/>
-              <a:t>25/12/2011</a:t>
+              <a:t>18/03/2012</a:t>
             </a:fld>
             <a:endParaRPr lang="fr-FR" dirty="0"/>
           </a:p>
@@ -2538,7 +3753,7 @@
             <a:fld id="{B8D51CD3-FD0B-4398-96D6-10844A344A7A}" type="datetime1">
               <a:rPr lang="fr-FR" smtClean="0"/>
               <a:pPr/>
-              <a:t>25/12/2011</a:t>
+              <a:t>18/03/2012</a:t>
             </a:fld>
             <a:endParaRPr lang="fr-FR" dirty="0"/>
           </a:p>
@@ -2995,7 +4210,7 @@
             <a:fld id="{5272A46D-708F-4429-9728-C0AAA1D8ED70}" type="datetime1">
               <a:rPr lang="fr-FR" smtClean="0"/>
               <a:pPr/>
-              <a:t>25/12/2011</a:t>
+              <a:t>18/03/2012</a:t>
             </a:fld>
             <a:endParaRPr lang="fr-FR" dirty="0"/>
           </a:p>
@@ -3261,7 +4476,7 @@
             <a:fld id="{85176319-0B46-44DD-88B8-E7F3AAD4F2DF}" type="datetime1">
               <a:rPr lang="fr-FR" smtClean="0"/>
               <a:pPr/>
-              <a:t>25/12/2011</a:t>
+              <a:t>18/03/2012</a:t>
             </a:fld>
             <a:endParaRPr lang="fr-FR" dirty="0"/>
           </a:p>
@@ -3637,7 +4852,7 @@
             <a:fld id="{2587345E-05A6-495C-A1A1-170A1A91A394}" type="datetime1">
               <a:rPr lang="fr-FR" smtClean="0"/>
               <a:pPr/>
-              <a:t>25/12/2011</a:t>
+              <a:t>18/03/2012</a:t>
             </a:fld>
             <a:endParaRPr lang="fr-FR" dirty="0"/>
           </a:p>
@@ -3761,7 +4976,7 @@
             <a:fld id="{172809C5-74F0-4FD7-9204-0F8A8FB1929B}" type="datetime1">
               <a:rPr lang="fr-FR" smtClean="0"/>
               <a:pPr/>
-              <a:t>25/12/2011</a:t>
+              <a:t>18/03/2012</a:t>
             </a:fld>
             <a:endParaRPr lang="fr-FR" dirty="0"/>
           </a:p>
@@ -3853,7 +5068,7 @@
             <a:fld id="{7786A093-8429-44F1-808A-11360C2CAA55}" type="datetime1">
               <a:rPr lang="fr-FR" smtClean="0"/>
               <a:pPr/>
-              <a:t>25/12/2011</a:t>
+              <a:t>18/03/2012</a:t>
             </a:fld>
             <a:endParaRPr lang="fr-FR" dirty="0"/>
           </a:p>
@@ -4104,7 +5319,7 @@
             <a:fld id="{FE18F5A1-6F3E-41A1-AC38-A5948C92E970}" type="datetime1">
               <a:rPr lang="fr-FR" smtClean="0"/>
               <a:pPr/>
-              <a:t>25/12/2011</a:t>
+              <a:t>18/03/2012</a:t>
             </a:fld>
             <a:endParaRPr lang="fr-FR" dirty="0"/>
           </a:p>
@@ -4365,7 +5580,7 @@
             <a:fld id="{42D0C6D8-1219-406E-8CD6-FA778B9D3E63}" type="datetime1">
               <a:rPr lang="fr-FR" smtClean="0"/>
               <a:pPr/>
-              <a:t>25/12/2011</a:t>
+              <a:t>18/03/2012</a:t>
             </a:fld>
             <a:endParaRPr lang="fr-FR" dirty="0"/>
           </a:p>
@@ -4771,7 +5986,7 @@
             <a:fld id="{CC7C295D-0E21-434D-B466-C466C8EF3B27}" type="datetime1">
               <a:rPr lang="fr-FR" smtClean="0"/>
               <a:pPr/>
-              <a:t>25/12/2011</a:t>
+              <a:t>18/03/2012</a:t>
             </a:fld>
             <a:endParaRPr lang="fr-FR" dirty="0"/>
           </a:p>
@@ -6011,30 +7226,7 @@
                   </a:outerShdw>
                 </a:effectLst>
               </a:rPr>
-              <a:t>Depth based Regions </a:t>
-            </a:r>
-            <a:r>
-              <a:rPr lang="en-US" b="1" dirty="0" smtClean="0">
-                <a:ln w="12700">
-                  <a:solidFill>
-                    <a:schemeClr val="tx2">
-                      <a:satMod val="155000"/>
-                    </a:schemeClr>
-                  </a:solidFill>
-                  <a:prstDash val="solid"/>
-                </a:ln>
-                <a:solidFill>
-                  <a:schemeClr val="bg1"/>
-                </a:solidFill>
-                <a:effectLst>
-                  <a:outerShdw blurRad="41275" dist="20320" dir="1800000" algn="tl" rotWithShape="0">
-                    <a:srgbClr val="000000">
-                      <a:alpha val="40000"/>
-                    </a:srgbClr>
-                  </a:outerShdw>
-                </a:effectLst>
-              </a:rPr>
-              <a:t>extraction</a:t>
+              <a:t>Depth based Regions extraction</a:t>
             </a:r>
             <a:endParaRPr lang="en-US" b="1" dirty="0">
               <a:ln w="12700">
@@ -6297,7 +7489,30 @@
       </p:grpSpPr>
       <p:sp>
         <p:nvSpPr>
-          <p:cNvPr id="6" name="Espace réservé du contenu 2"/>
+          <p:cNvPr id="2" name="Titre 1"/>
+          <p:cNvSpPr>
+            <a:spLocks noGrp="1"/>
+          </p:cNvSpPr>
+          <p:nvPr>
+            <p:ph type="title"/>
+          </p:nvPr>
+        </p:nvSpPr>
+        <p:spPr/>
+        <p:txBody>
+          <a:bodyPr/>
+          <a:lstStyle/>
+          <a:p>
+            <a:r>
+              <a:rPr lang="fr-FR" dirty="0" smtClean="0"/>
+              <a:t>Evaluation</a:t>
+            </a:r>
+            <a:endParaRPr lang="fr-FR" dirty="0"/>
+          </a:p>
+        </p:txBody>
+      </p:sp>
+      <p:sp>
+        <p:nvSpPr>
+          <p:cNvPr id="3" name="Espace réservé du contenu 2"/>
           <p:cNvSpPr>
             <a:spLocks noGrp="1"/>
           </p:cNvSpPr>
@@ -6305,100 +7520,48 @@
             <p:ph idx="1"/>
           </p:nvPr>
         </p:nvSpPr>
-        <p:spPr>
-          <a:xfrm>
-            <a:off x="457200" y="1600200"/>
-            <a:ext cx="7467600" cy="4525963"/>
-          </a:xfrm>
-        </p:spPr>
-        <p:txBody>
-          <a:bodyPr>
-            <a:normAutofit fontScale="92500" lnSpcReduction="20000"/>
-          </a:bodyPr>
+        <p:spPr/>
+        <p:txBody>
+          <a:bodyPr/>
           <a:lstStyle/>
           <a:p>
             <a:r>
               <a:rPr lang="en-US" dirty="0" smtClean="0"/>
-              <a:t>Total Execution Time : </a:t>
-            </a:r>
-            <a:r>
-              <a:rPr lang="en-US" dirty="0" smtClean="0">
-                <a:solidFill>
-                  <a:srgbClr val="FFC000"/>
-                </a:solidFill>
-              </a:rPr>
-              <a:t>10 – 18 ms</a:t>
-            </a:r>
-          </a:p>
-          <a:p>
-            <a:endParaRPr lang="en-US" dirty="0" smtClean="0">
-              <a:solidFill>
-                <a:srgbClr val="FFFF00"/>
-              </a:solidFill>
-            </a:endParaRPr>
-          </a:p>
-          <a:p>
+              <a:t>3 types of evaluations:</a:t>
+            </a:r>
+          </a:p>
+          <a:p>
+            <a:pPr lvl="1"/>
             <a:r>
               <a:rPr lang="en-US" dirty="0" smtClean="0"/>
-              <a:t>We are tracking 4 blobs</a:t>
+              <a:t>Accuracy</a:t>
             </a:r>
           </a:p>
           <a:p>
             <a:pPr lvl="1"/>
             <a:r>
               <a:rPr lang="en-US" dirty="0" smtClean="0"/>
-              <a:t>Single user</a:t>
+              <a:t>Speed processing</a:t>
             </a:r>
           </a:p>
           <a:p>
             <a:pPr lvl="1"/>
             <a:r>
               <a:rPr lang="en-US" dirty="0" smtClean="0"/>
-              <a:t>Usually only both arms and the head are visible</a:t>
-            </a:r>
-          </a:p>
-          <a:p>
-            <a:pPr lvl="1"/>
-            <a:r>
-              <a:rPr lang="en-US" dirty="0" smtClean="0"/>
-              <a:t>One blob added for safety considering the noise of </a:t>
-            </a:r>
-            <a:r>
-              <a:rPr lang="en-US" dirty="0" err="1" smtClean="0"/>
-              <a:t>Kinect’s</a:t>
-            </a:r>
-            <a:r>
-              <a:rPr lang="en-US" dirty="0" smtClean="0"/>
-              <a:t> sensors</a:t>
-            </a:r>
-          </a:p>
-          <a:p>
-            <a:pPr lvl="1"/>
-            <a:endParaRPr lang="en-US" dirty="0" smtClean="0"/>
-          </a:p>
-          <a:p>
-            <a:r>
-              <a:rPr lang="en-US" dirty="0" smtClean="0"/>
-              <a:t>Functional distance : 1m – 2m</a:t>
-            </a:r>
-          </a:p>
-          <a:p>
-            <a:pPr lvl="1"/>
-            <a:r>
-              <a:rPr lang="en-US" dirty="0" smtClean="0"/>
-              <a:t>1m is the minimum allowed by the Kinect, 2m was defined as a usability configuration</a:t>
-            </a:r>
-          </a:p>
-        </p:txBody>
-      </p:sp>
-      <p:sp>
-        <p:nvSpPr>
-          <p:cNvPr id="2" name="Titre 1"/>
-          <p:cNvSpPr>
-            <a:spLocks noGrp="1"/>
-          </p:cNvSpPr>
-          <p:nvPr>
-            <p:ph type="title"/>
+              <a:t>Input word</a:t>
+            </a:r>
+            <a:endParaRPr lang="en-US" dirty="0"/>
+          </a:p>
+        </p:txBody>
+      </p:sp>
+      <p:sp>
+        <p:nvSpPr>
+          <p:cNvPr id="4" name="Espace réservé du numéro de diapositive 3"/>
+          <p:cNvSpPr>
+            <a:spLocks noGrp="1"/>
+          </p:cNvSpPr>
+          <p:nvPr>
+            <p:ph type="sldNum" sz="quarter" idx="12"/>
           </p:nvPr>
         </p:nvSpPr>
         <p:spPr/>
@@ -6406,35 +7569,12 @@
           <a:bodyPr/>
           <a:lstStyle/>
           <a:p>
-            <a:r>
-              <a:rPr lang="en-US" dirty="0" smtClean="0"/>
-              <a:t>Results</a:t>
-            </a:r>
-            <a:endParaRPr lang="en-US" dirty="0"/>
-          </a:p>
-        </p:txBody>
-      </p:sp>
-      <p:sp>
-        <p:nvSpPr>
-          <p:cNvPr id="4" name="Espace réservé du numéro de diapositive 3"/>
-          <p:cNvSpPr>
-            <a:spLocks noGrp="1"/>
-          </p:cNvSpPr>
-          <p:nvPr>
-            <p:ph type="sldNum" sz="quarter" idx="12"/>
-          </p:nvPr>
-        </p:nvSpPr>
-        <p:spPr/>
-        <p:txBody>
-          <a:bodyPr/>
-          <a:lstStyle/>
-          <a:p>
             <a:fld id="{AB9DB7C7-3B7A-421A-AF98-AB9FC2185CD3}" type="slidenum">
-              <a:rPr lang="en-US" smtClean="0"/>
+              <a:rPr lang="fr-FR" smtClean="0"/>
               <a:pPr/>
               <a:t>13</a:t>
             </a:fld>
-            <a:endParaRPr lang="en-US"/>
+            <a:endParaRPr lang="fr-FR" dirty="0"/>
           </a:p>
         </p:txBody>
       </p:sp>
@@ -6486,111 +7626,9 @@
           <a:lstStyle/>
           <a:p>
             <a:r>
-              <a:rPr lang="fr-FR" dirty="0" smtClean="0"/>
-              <a:t>Conclusion</a:t>
-            </a:r>
-            <a:endParaRPr lang="fr-FR" dirty="0"/>
-          </a:p>
-        </p:txBody>
-      </p:sp>
-      <p:sp>
-        <p:nvSpPr>
-          <p:cNvPr id="3" name="Espace réservé du contenu 2"/>
-          <p:cNvSpPr>
-            <a:spLocks noGrp="1"/>
-          </p:cNvSpPr>
-          <p:nvPr>
-            <p:ph idx="1"/>
-          </p:nvPr>
-        </p:nvSpPr>
-        <p:spPr/>
-        <p:txBody>
-          <a:bodyPr>
-            <a:normAutofit fontScale="77500" lnSpcReduction="20000"/>
-          </a:bodyPr>
-          <a:lstStyle/>
-          <a:p>
-            <a:r>
-              <a:rPr lang="en-US" dirty="0" smtClean="0"/>
-              <a:t>Features offered by the Kinect</a:t>
-            </a:r>
-          </a:p>
-          <a:p>
-            <a:pPr lvl="1"/>
-            <a:r>
-              <a:rPr lang="en-US" dirty="0" smtClean="0"/>
-              <a:t>Depth data</a:t>
-            </a:r>
-          </a:p>
-          <a:p>
-            <a:pPr lvl="1"/>
-            <a:r>
-              <a:rPr lang="en-US" dirty="0" smtClean="0"/>
-              <a:t>Color data</a:t>
-            </a:r>
-          </a:p>
-          <a:p>
-            <a:pPr lvl="1"/>
-            <a:r>
-              <a:rPr lang="en-US" dirty="0" smtClean="0"/>
-              <a:t>Skeleton recognition</a:t>
-            </a:r>
-          </a:p>
-          <a:p>
-            <a:pPr lvl="1">
-              <a:buNone/>
-            </a:pPr>
-            <a:endParaRPr lang="en-US" dirty="0" smtClean="0"/>
-          </a:p>
-          <a:p>
-            <a:r>
-              <a:rPr lang="en-US" dirty="0" smtClean="0"/>
-              <a:t>Limitations</a:t>
-            </a:r>
-          </a:p>
-          <a:p>
-            <a:pPr lvl="1"/>
-            <a:r>
-              <a:rPr lang="en-US" dirty="0" smtClean="0"/>
-              <a:t>Distance</a:t>
-            </a:r>
-          </a:p>
-          <a:p>
-            <a:pPr lvl="1"/>
-            <a:r>
-              <a:rPr lang="en-US" dirty="0" smtClean="0"/>
-              <a:t>Accuracy when not standing up</a:t>
-            </a:r>
-          </a:p>
-          <a:p>
-            <a:pPr lvl="1">
-              <a:buNone/>
-            </a:pPr>
-            <a:endParaRPr lang="en-US" dirty="0" smtClean="0"/>
-          </a:p>
-          <a:p>
-            <a:r>
-              <a:rPr lang="en-US" dirty="0" smtClean="0"/>
-              <a:t>“Easy-to-use” camera</a:t>
-            </a:r>
-          </a:p>
-          <a:p>
-            <a:endParaRPr lang="en-US" dirty="0" smtClean="0"/>
-          </a:p>
-          <a:p>
-            <a:r>
-              <a:rPr lang="en-US" dirty="0" smtClean="0"/>
-              <a:t>PC Kinect in development</a:t>
-            </a:r>
-            <a:br>
-              <a:rPr lang="en-US" dirty="0" smtClean="0"/>
-            </a:br>
-            <a:r>
-              <a:rPr lang="en-US" dirty="0" smtClean="0"/>
-              <a:t>Minimum Depth : 50 cm (1m with the current Kinect)</a:t>
-            </a:r>
-          </a:p>
-          <a:p>
+              <a:rPr lang="fr-FR" dirty="0" err="1" smtClean="0"/>
+              <a:t>Accuracy</a:t>
+            </a:r>
             <a:endParaRPr lang="fr-FR" dirty="0"/>
           </a:p>
         </p:txBody>
@@ -6619,6 +7657,74 @@
           </a:p>
         </p:txBody>
       </p:sp>
+      <p:pic>
+        <p:nvPicPr>
+          <p:cNvPr id="7" name="Espace réservé du contenu 6" descr="C:\Users\Kevin\Documents\Projet Japon\Report\Measure test 1.jpg"/>
+          <p:cNvPicPr>
+            <a:picLocks noGrp="1"/>
+          </p:cNvPicPr>
+          <p:nvPr>
+            <p:ph sz="half" idx="1"/>
+          </p:nvPr>
+        </p:nvPicPr>
+        <p:blipFill>
+          <a:blip r:embed="rId2" cstate="print"/>
+          <a:srcRect l="4801" t="1475" r="5464" b="5605"/>
+          <a:stretch>
+            <a:fillRect/>
+          </a:stretch>
+        </p:blipFill>
+        <p:spPr bwMode="auto">
+          <a:xfrm>
+            <a:off x="457200" y="2798489"/>
+            <a:ext cx="3657600" cy="2129385"/>
+          </a:xfrm>
+          <a:prstGeom prst="rect">
+            <a:avLst/>
+          </a:prstGeom>
+          <a:noFill/>
+          <a:ln w="9525">
+            <a:noFill/>
+            <a:miter lim="800000"/>
+            <a:headEnd/>
+            <a:tailEnd/>
+          </a:ln>
+        </p:spPr>
+      </p:pic>
+      <p:pic>
+        <p:nvPicPr>
+          <p:cNvPr id="8" name="Espace réservé du contenu 7" descr="C:\Users\Kevin\Documents\Projet Japon\Report\Measure test 2.jpg"/>
+          <p:cNvPicPr>
+            <a:picLocks noGrp="1"/>
+          </p:cNvPicPr>
+          <p:nvPr>
+            <p:ph sz="half" idx="2"/>
+          </p:nvPr>
+        </p:nvPicPr>
+        <p:blipFill>
+          <a:blip r:embed="rId3" cstate="print"/>
+          <a:srcRect l="4715" r="4828" b="5507"/>
+          <a:stretch>
+            <a:fillRect/>
+          </a:stretch>
+        </p:blipFill>
+        <p:spPr bwMode="auto">
+          <a:xfrm>
+            <a:off x="4267200" y="2789107"/>
+            <a:ext cx="3657600" cy="2148148"/>
+          </a:xfrm>
+          <a:prstGeom prst="rect">
+            <a:avLst/>
+          </a:prstGeom>
+          <a:noFill/>
+          <a:ln w="9525">
+            <a:noFill/>
+            <a:miter lim="800000"/>
+            <a:headEnd/>
+            <a:tailEnd/>
+          </a:ln>
+        </p:spPr>
+      </p:pic>
     </p:spTree>
   </p:cSld>
   <p:clrMapOvr>
@@ -6653,7 +7759,7 @@
       </p:grpSpPr>
       <p:sp>
         <p:nvSpPr>
-          <p:cNvPr id="5" name="Titre 4"/>
+          <p:cNvPr id="7" name="Titre 6"/>
           <p:cNvSpPr>
             <a:spLocks noGrp="1"/>
           </p:cNvSpPr>
@@ -6661,33 +7767,89 @@
             <p:ph type="title"/>
           </p:nvPr>
         </p:nvSpPr>
-        <p:spPr>
-          <a:xfrm>
-            <a:off x="611560" y="2708920"/>
-            <a:ext cx="7470648" cy="1143000"/>
-          </a:xfrm>
-        </p:spPr>
+        <p:spPr/>
         <p:txBody>
           <a:bodyPr/>
           <a:lstStyle/>
           <a:p>
-            <a:pPr algn="ctr"/>
-            <a:r>
-              <a:rPr lang="en-US" dirty="0" smtClean="0"/>
-              <a:t>Thank you for your attention</a:t>
-            </a:r>
-            <a:endParaRPr lang="en-US" dirty="0"/>
-          </a:p>
-        </p:txBody>
-      </p:sp>
-      <p:sp>
-        <p:nvSpPr>
-          <p:cNvPr id="4" name="Espace réservé du numéro de diapositive 3"/>
-          <p:cNvSpPr>
-            <a:spLocks noGrp="1"/>
-          </p:cNvSpPr>
-          <p:nvPr>
-            <p:ph type="sldNum" sz="quarter" idx="11"/>
+            <a:r>
+              <a:rPr lang="fr-FR" dirty="0" err="1" smtClean="0"/>
+              <a:t>Accuracy</a:t>
+            </a:r>
+            <a:endParaRPr lang="fr-FR" dirty="0"/>
+          </a:p>
+        </p:txBody>
+      </p:sp>
+      <p:sp>
+        <p:nvSpPr>
+          <p:cNvPr id="8" name="Espace réservé du texte 7"/>
+          <p:cNvSpPr>
+            <a:spLocks noGrp="1"/>
+          </p:cNvSpPr>
+          <p:nvPr>
+            <p:ph type="body" idx="1"/>
+          </p:nvPr>
+        </p:nvSpPr>
+        <p:spPr/>
+        <p:txBody>
+          <a:bodyPr/>
+          <a:lstStyle/>
+          <a:p>
+            <a:r>
+              <a:rPr lang="fr-FR" dirty="0" err="1" smtClean="0"/>
+              <a:t>Arrival</a:t>
+            </a:r>
+            <a:r>
+              <a:rPr lang="fr-FR" dirty="0" smtClean="0"/>
+              <a:t> </a:t>
+            </a:r>
+            <a:r>
+              <a:rPr lang="fr-FR" dirty="0" err="1" smtClean="0"/>
+              <a:t>duration</a:t>
+            </a:r>
+            <a:endParaRPr lang="fr-FR" dirty="0"/>
+          </a:p>
+        </p:txBody>
+      </p:sp>
+      <p:sp>
+        <p:nvSpPr>
+          <p:cNvPr id="10" name="Espace réservé du texte 9"/>
+          <p:cNvSpPr>
+            <a:spLocks noGrp="1"/>
+          </p:cNvSpPr>
+          <p:nvPr>
+            <p:ph type="body" sz="half" idx="3"/>
+          </p:nvPr>
+        </p:nvSpPr>
+        <p:spPr/>
+        <p:txBody>
+          <a:bodyPr/>
+          <a:lstStyle/>
+          <a:p>
+            <a:r>
+              <a:rPr lang="fr-FR" dirty="0" err="1" smtClean="0"/>
+              <a:t>Average</a:t>
+            </a:r>
+            <a:r>
+              <a:rPr lang="fr-FR" dirty="0" smtClean="0"/>
+              <a:t> </a:t>
+            </a:r>
+            <a:r>
+              <a:rPr lang="fr-FR" dirty="0" err="1" smtClean="0"/>
+              <a:t>error</a:t>
+            </a:r>
+            <a:endParaRPr lang="fr-FR" dirty="0"/>
+          </a:p>
+        </p:txBody>
+      </p:sp>
+      <p:sp>
+        <p:nvSpPr>
+          <p:cNvPr id="5" name="Espace réservé du numéro de diapositive 4"/>
+          <p:cNvSpPr>
+            <a:spLocks noGrp="1"/>
+          </p:cNvSpPr>
+          <p:nvPr>
+            <p:ph type="sldNum" sz="quarter" idx="12"/>
           </p:nvPr>
         </p:nvSpPr>
         <p:spPr/>
@@ -6704,6 +7866,824 @@
           </a:p>
         </p:txBody>
       </p:sp>
+      <p:graphicFrame>
+        <p:nvGraphicFramePr>
+          <p:cNvPr id="12" name="Espace réservé du contenu 11"/>
+          <p:cNvGraphicFramePr>
+            <a:graphicFrameLocks noGrp="1"/>
+          </p:cNvGraphicFramePr>
+          <p:nvPr>
+            <p:ph sz="quarter" idx="2"/>
+          </p:nvPr>
+        </p:nvGraphicFramePr>
+        <p:xfrm>
+          <a:off x="457200" y="1517650"/>
+          <a:ext cx="4040188" cy="3941763"/>
+        </p:xfrm>
+        <a:graphic>
+          <a:graphicData uri="http://schemas.openxmlformats.org/drawingml/2006/chart">
+            <c:chart xmlns:c="http://schemas.openxmlformats.org/drawingml/2006/chart" xmlns:r="http://schemas.openxmlformats.org/officeDocument/2006/relationships" r:id="rId2"/>
+          </a:graphicData>
+        </a:graphic>
+      </p:graphicFrame>
+      <p:graphicFrame>
+        <p:nvGraphicFramePr>
+          <p:cNvPr id="13" name="Espace réservé du contenu 12"/>
+          <p:cNvGraphicFramePr>
+            <a:graphicFrameLocks noGrp="1"/>
+          </p:cNvGraphicFramePr>
+          <p:nvPr>
+            <p:ph sz="quarter" idx="4"/>
+          </p:nvPr>
+        </p:nvGraphicFramePr>
+        <p:xfrm>
+          <a:off x="4645025" y="1517650"/>
+          <a:ext cx="4041775" cy="3941763"/>
+        </p:xfrm>
+        <a:graphic>
+          <a:graphicData uri="http://schemas.openxmlformats.org/drawingml/2006/chart">
+            <c:chart xmlns:c="http://schemas.openxmlformats.org/drawingml/2006/chart" xmlns:r="http://schemas.openxmlformats.org/officeDocument/2006/relationships" r:id="rId3"/>
+          </a:graphicData>
+        </a:graphic>
+      </p:graphicFrame>
+    </p:spTree>
+  </p:cSld>
+  <p:clrMapOvr>
+    <a:masterClrMapping/>
+  </p:clrMapOvr>
+  <p:timing>
+    <p:tnLst>
+      <p:par>
+        <p:cTn id="1" dur="indefinite" restart="never" nodeType="tmRoot"/>
+      </p:par>
+    </p:tnLst>
+  </p:timing>
+</p:sld>
+</file>
+
+<file path=ppt/slides/slide16.xml><?xml version="1.0" encoding="utf-8"?>
+<p:sld xmlns:a="http://schemas.openxmlformats.org/drawingml/2006/main" xmlns:r="http://schemas.openxmlformats.org/officeDocument/2006/relationships" xmlns:p="http://schemas.openxmlformats.org/presentationml/2006/main">
+  <p:cSld>
+    <p:spTree>
+      <p:nvGrpSpPr>
+        <p:cNvPr id="1" name=""/>
+        <p:cNvGrpSpPr/>
+        <p:nvPr/>
+      </p:nvGrpSpPr>
+      <p:grpSpPr>
+        <a:xfrm>
+          <a:off x="0" y="0"/>
+          <a:ext cx="0" cy="0"/>
+          <a:chOff x="0" y="0"/>
+          <a:chExt cx="0" cy="0"/>
+        </a:xfrm>
+      </p:grpSpPr>
+      <p:sp>
+        <p:nvSpPr>
+          <p:cNvPr id="2" name="Titre 1"/>
+          <p:cNvSpPr>
+            <a:spLocks noGrp="1"/>
+          </p:cNvSpPr>
+          <p:nvPr>
+            <p:ph type="title"/>
+          </p:nvPr>
+        </p:nvSpPr>
+        <p:spPr/>
+        <p:txBody>
+          <a:bodyPr/>
+          <a:lstStyle/>
+          <a:p>
+            <a:r>
+              <a:rPr lang="fr-FR" dirty="0" err="1" smtClean="0"/>
+              <a:t>Accuracy</a:t>
+            </a:r>
+            <a:endParaRPr lang="fr-FR" dirty="0"/>
+          </a:p>
+        </p:txBody>
+      </p:sp>
+      <p:sp>
+        <p:nvSpPr>
+          <p:cNvPr id="3" name="Espace réservé du texte 2"/>
+          <p:cNvSpPr>
+            <a:spLocks noGrp="1"/>
+          </p:cNvSpPr>
+          <p:nvPr>
+            <p:ph type="body" idx="1"/>
+          </p:nvPr>
+        </p:nvSpPr>
+        <p:spPr/>
+        <p:txBody>
+          <a:bodyPr/>
+          <a:lstStyle/>
+          <a:p>
+            <a:r>
+              <a:rPr lang="fr-FR" dirty="0" err="1" smtClean="0"/>
+              <a:t>Percentage</a:t>
+            </a:r>
+            <a:r>
+              <a:rPr lang="fr-FR" dirty="0" smtClean="0"/>
+              <a:t> </a:t>
+            </a:r>
+            <a:r>
+              <a:rPr lang="fr-FR" dirty="0" err="1" smtClean="0"/>
+              <a:t>error</a:t>
+            </a:r>
+            <a:endParaRPr lang="fr-FR" dirty="0"/>
+          </a:p>
+        </p:txBody>
+      </p:sp>
+      <p:sp>
+        <p:nvSpPr>
+          <p:cNvPr id="4" name="Espace réservé du texte 3"/>
+          <p:cNvSpPr>
+            <a:spLocks noGrp="1"/>
+          </p:cNvSpPr>
+          <p:nvPr>
+            <p:ph type="body" sz="half" idx="3"/>
+          </p:nvPr>
+        </p:nvSpPr>
+        <p:spPr/>
+        <p:txBody>
+          <a:bodyPr/>
+          <a:lstStyle/>
+          <a:p>
+            <a:r>
+              <a:rPr lang="fr-FR" dirty="0" smtClean="0"/>
+              <a:t>Distance </a:t>
+            </a:r>
+            <a:r>
+              <a:rPr lang="fr-FR" dirty="0" err="1" smtClean="0"/>
+              <a:t>moved</a:t>
+            </a:r>
+            <a:r>
+              <a:rPr lang="fr-FR" dirty="0" smtClean="0"/>
+              <a:t> in </a:t>
+            </a:r>
+            <a:r>
+              <a:rPr lang="fr-FR" dirty="0" err="1" smtClean="0"/>
+              <a:t>rest</a:t>
+            </a:r>
+            <a:endParaRPr lang="fr-FR" dirty="0"/>
+          </a:p>
+        </p:txBody>
+      </p:sp>
+      <p:sp>
+        <p:nvSpPr>
+          <p:cNvPr id="7" name="Espace réservé du numéro de diapositive 6"/>
+          <p:cNvSpPr>
+            <a:spLocks noGrp="1"/>
+          </p:cNvSpPr>
+          <p:nvPr>
+            <p:ph type="sldNum" sz="quarter" idx="12"/>
+          </p:nvPr>
+        </p:nvSpPr>
+        <p:spPr/>
+        <p:txBody>
+          <a:bodyPr/>
+          <a:lstStyle/>
+          <a:p>
+            <a:fld id="{AB9DB7C7-3B7A-421A-AF98-AB9FC2185CD3}" type="slidenum">
+              <a:rPr lang="fr-FR" smtClean="0"/>
+              <a:pPr/>
+              <a:t>16</a:t>
+            </a:fld>
+            <a:endParaRPr lang="fr-FR" dirty="0"/>
+          </a:p>
+        </p:txBody>
+      </p:sp>
+      <p:graphicFrame>
+        <p:nvGraphicFramePr>
+          <p:cNvPr id="8" name="Espace réservé du contenu 7"/>
+          <p:cNvGraphicFramePr>
+            <a:graphicFrameLocks noGrp="1"/>
+          </p:cNvGraphicFramePr>
+          <p:nvPr>
+            <p:ph sz="quarter" idx="2"/>
+          </p:nvPr>
+        </p:nvGraphicFramePr>
+        <p:xfrm>
+          <a:off x="457200" y="1517650"/>
+          <a:ext cx="4040188" cy="3941763"/>
+        </p:xfrm>
+        <a:graphic>
+          <a:graphicData uri="http://schemas.openxmlformats.org/drawingml/2006/chart">
+            <c:chart xmlns:c="http://schemas.openxmlformats.org/drawingml/2006/chart" xmlns:r="http://schemas.openxmlformats.org/officeDocument/2006/relationships" r:id="rId2"/>
+          </a:graphicData>
+        </a:graphic>
+      </p:graphicFrame>
+      <p:graphicFrame>
+        <p:nvGraphicFramePr>
+          <p:cNvPr id="9" name="Espace réservé du contenu 8"/>
+          <p:cNvGraphicFramePr>
+            <a:graphicFrameLocks noGrp="1"/>
+          </p:cNvGraphicFramePr>
+          <p:nvPr>
+            <p:ph sz="quarter" idx="4"/>
+          </p:nvPr>
+        </p:nvGraphicFramePr>
+        <p:xfrm>
+          <a:off x="4645025" y="1517650"/>
+          <a:ext cx="4041775" cy="3941763"/>
+        </p:xfrm>
+        <a:graphic>
+          <a:graphicData uri="http://schemas.openxmlformats.org/drawingml/2006/chart">
+            <c:chart xmlns:c="http://schemas.openxmlformats.org/drawingml/2006/chart" xmlns:r="http://schemas.openxmlformats.org/officeDocument/2006/relationships" r:id="rId3"/>
+          </a:graphicData>
+        </a:graphic>
+      </p:graphicFrame>
+    </p:spTree>
+  </p:cSld>
+  <p:clrMapOvr>
+    <a:masterClrMapping/>
+  </p:clrMapOvr>
+  <p:timing>
+    <p:tnLst>
+      <p:par>
+        <p:cTn id="1" dur="indefinite" restart="never" nodeType="tmRoot"/>
+      </p:par>
+    </p:tnLst>
+  </p:timing>
+</p:sld>
+</file>
+
+<file path=ppt/slides/slide17.xml><?xml version="1.0" encoding="utf-8"?>
+<p:sld xmlns:a="http://schemas.openxmlformats.org/drawingml/2006/main" xmlns:r="http://schemas.openxmlformats.org/officeDocument/2006/relationships" xmlns:p="http://schemas.openxmlformats.org/presentationml/2006/main">
+  <p:cSld>
+    <p:spTree>
+      <p:nvGrpSpPr>
+        <p:cNvPr id="1" name=""/>
+        <p:cNvGrpSpPr/>
+        <p:nvPr/>
+      </p:nvGrpSpPr>
+      <p:grpSpPr>
+        <a:xfrm>
+          <a:off x="0" y="0"/>
+          <a:ext cx="0" cy="0"/>
+          <a:chOff x="0" y="0"/>
+          <a:chExt cx="0" cy="0"/>
+        </a:xfrm>
+      </p:grpSpPr>
+      <p:sp>
+        <p:nvSpPr>
+          <p:cNvPr id="2" name="Titre 1"/>
+          <p:cNvSpPr>
+            <a:spLocks noGrp="1"/>
+          </p:cNvSpPr>
+          <p:nvPr>
+            <p:ph type="title"/>
+          </p:nvPr>
+        </p:nvSpPr>
+        <p:spPr/>
+        <p:txBody>
+          <a:bodyPr/>
+          <a:lstStyle/>
+          <a:p>
+            <a:r>
+              <a:rPr lang="fr-FR" dirty="0" smtClean="0"/>
+              <a:t>Speed </a:t>
+            </a:r>
+            <a:r>
+              <a:rPr lang="fr-FR" dirty="0" err="1" smtClean="0"/>
+              <a:t>processing</a:t>
+            </a:r>
+            <a:endParaRPr lang="fr-FR" dirty="0"/>
+          </a:p>
+        </p:txBody>
+      </p:sp>
+      <p:sp>
+        <p:nvSpPr>
+          <p:cNvPr id="10" name="Espace réservé du contenu 9"/>
+          <p:cNvSpPr>
+            <a:spLocks noGrp="1"/>
+          </p:cNvSpPr>
+          <p:nvPr>
+            <p:ph idx="1"/>
+          </p:nvPr>
+        </p:nvSpPr>
+        <p:spPr>
+          <a:xfrm>
+            <a:off x="467544" y="1484784"/>
+            <a:ext cx="7467600" cy="4525963"/>
+          </a:xfrm>
+        </p:spPr>
+        <p:txBody>
+          <a:bodyPr/>
+          <a:lstStyle/>
+          <a:p>
+            <a:pPr lvl="0"/>
+            <a:r>
+              <a:rPr lang="fr-FR" dirty="0" smtClean="0"/>
+              <a:t>PC1(Karim) </a:t>
+            </a:r>
+            <a:r>
+              <a:rPr lang="fr-FR" dirty="0" err="1" smtClean="0"/>
+              <a:t>Core</a:t>
+            </a:r>
+            <a:r>
+              <a:rPr lang="fr-FR" dirty="0" smtClean="0"/>
+              <a:t> </a:t>
+            </a:r>
+            <a:r>
+              <a:rPr lang="fr-FR" dirty="0" smtClean="0"/>
+              <a:t>i7 2 </a:t>
+            </a:r>
+            <a:r>
+              <a:rPr lang="fr-FR" dirty="0" err="1" smtClean="0"/>
+              <a:t>Ghz</a:t>
+            </a:r>
+            <a:endParaRPr lang="fr-FR" dirty="0" smtClean="0"/>
+          </a:p>
+          <a:p>
+            <a:pPr lvl="0">
+              <a:buNone/>
+            </a:pPr>
+            <a:r>
+              <a:rPr lang="fr-FR" dirty="0" smtClean="0"/>
+              <a:t>	</a:t>
+            </a:r>
+            <a:r>
+              <a:rPr lang="fr-FR" dirty="0" err="1" smtClean="0"/>
+              <a:t>Radeon</a:t>
+            </a:r>
+            <a:r>
+              <a:rPr lang="fr-FR" dirty="0" smtClean="0"/>
+              <a:t> </a:t>
+            </a:r>
+            <a:r>
+              <a:rPr lang="fr-FR" dirty="0" smtClean="0"/>
+              <a:t>HD 4650</a:t>
+            </a:r>
+          </a:p>
+          <a:p>
+            <a:pPr lvl="0"/>
+            <a:r>
+              <a:rPr lang="fr-FR" dirty="0" smtClean="0"/>
+              <a:t>PC 2 (</a:t>
+            </a:r>
+            <a:r>
+              <a:rPr lang="fr-FR" dirty="0" smtClean="0"/>
+              <a:t>Kevin) </a:t>
+            </a:r>
+            <a:r>
+              <a:rPr lang="fr-FR" dirty="0" err="1" smtClean="0"/>
+              <a:t>Core</a:t>
+            </a:r>
+            <a:r>
+              <a:rPr lang="fr-FR" dirty="0" smtClean="0"/>
+              <a:t> </a:t>
+            </a:r>
+            <a:r>
+              <a:rPr lang="fr-FR" dirty="0" smtClean="0"/>
+              <a:t>2 Duo 2,13 </a:t>
+            </a:r>
+            <a:r>
+              <a:rPr lang="fr-FR" dirty="0" err="1" smtClean="0"/>
+              <a:t>Ghz</a:t>
+            </a:r>
+            <a:r>
+              <a:rPr lang="fr-FR" dirty="0" smtClean="0"/>
+              <a:t> </a:t>
+            </a:r>
+            <a:r>
+              <a:rPr lang="fr-FR" dirty="0" err="1" smtClean="0"/>
+              <a:t>Radeon</a:t>
+            </a:r>
+            <a:r>
+              <a:rPr lang="fr-FR" dirty="0" smtClean="0"/>
+              <a:t> </a:t>
+            </a:r>
+            <a:r>
+              <a:rPr lang="fr-FR" dirty="0" smtClean="0"/>
+              <a:t>HD 4530</a:t>
+            </a:r>
+          </a:p>
+          <a:p>
+            <a:endParaRPr lang="fr-FR" dirty="0"/>
+          </a:p>
+        </p:txBody>
+      </p:sp>
+      <p:sp>
+        <p:nvSpPr>
+          <p:cNvPr id="7" name="Espace réservé du numéro de diapositive 6"/>
+          <p:cNvSpPr>
+            <a:spLocks noGrp="1"/>
+          </p:cNvSpPr>
+          <p:nvPr>
+            <p:ph type="sldNum" sz="quarter" idx="12"/>
+          </p:nvPr>
+        </p:nvSpPr>
+        <p:spPr/>
+        <p:txBody>
+          <a:bodyPr/>
+          <a:lstStyle/>
+          <a:p>
+            <a:fld id="{AB9DB7C7-3B7A-421A-AF98-AB9FC2185CD3}" type="slidenum">
+              <a:rPr lang="fr-FR" smtClean="0"/>
+              <a:pPr/>
+              <a:t>17</a:t>
+            </a:fld>
+            <a:endParaRPr lang="fr-FR" dirty="0"/>
+          </a:p>
+        </p:txBody>
+      </p:sp>
+      <p:graphicFrame>
+        <p:nvGraphicFramePr>
+          <p:cNvPr id="11" name="Graphique 10"/>
+          <p:cNvGraphicFramePr/>
+          <p:nvPr/>
+        </p:nvGraphicFramePr>
+        <p:xfrm>
+          <a:off x="1835696" y="3645024"/>
+          <a:ext cx="5328592" cy="2880320"/>
+        </p:xfrm>
+        <a:graphic>
+          <a:graphicData uri="http://schemas.openxmlformats.org/drawingml/2006/chart">
+            <c:chart xmlns:c="http://schemas.openxmlformats.org/drawingml/2006/chart" xmlns:r="http://schemas.openxmlformats.org/officeDocument/2006/relationships" r:id="rId2"/>
+          </a:graphicData>
+        </a:graphic>
+      </p:graphicFrame>
+    </p:spTree>
+  </p:cSld>
+  <p:clrMapOvr>
+    <a:masterClrMapping/>
+  </p:clrMapOvr>
+  <p:timing>
+    <p:tnLst>
+      <p:par>
+        <p:cTn id="1" dur="indefinite" restart="never" nodeType="tmRoot"/>
+      </p:par>
+    </p:tnLst>
+  </p:timing>
+</p:sld>
+</file>
+
+<file path=ppt/slides/slide18.xml><?xml version="1.0" encoding="utf-8"?>
+<p:sld xmlns:a="http://schemas.openxmlformats.org/drawingml/2006/main" xmlns:r="http://schemas.openxmlformats.org/officeDocument/2006/relationships" xmlns:p="http://schemas.openxmlformats.org/presentationml/2006/main">
+  <p:cSld>
+    <p:spTree>
+      <p:nvGrpSpPr>
+        <p:cNvPr id="1" name=""/>
+        <p:cNvGrpSpPr/>
+        <p:nvPr/>
+      </p:nvGrpSpPr>
+      <p:grpSpPr>
+        <a:xfrm>
+          <a:off x="0" y="0"/>
+          <a:ext cx="0" cy="0"/>
+          <a:chOff x="0" y="0"/>
+          <a:chExt cx="0" cy="0"/>
+        </a:xfrm>
+      </p:grpSpPr>
+      <p:sp>
+        <p:nvSpPr>
+          <p:cNvPr id="2" name="Titre 1"/>
+          <p:cNvSpPr>
+            <a:spLocks noGrp="1"/>
+          </p:cNvSpPr>
+          <p:nvPr>
+            <p:ph type="title"/>
+          </p:nvPr>
+        </p:nvSpPr>
+        <p:spPr/>
+        <p:txBody>
+          <a:bodyPr/>
+          <a:lstStyle/>
+          <a:p>
+            <a:r>
+              <a:rPr lang="fr-FR" dirty="0" smtClean="0"/>
+              <a:t>Input </a:t>
+            </a:r>
+            <a:r>
+              <a:rPr lang="fr-FR" dirty="0" err="1" smtClean="0"/>
+              <a:t>word</a:t>
+            </a:r>
+            <a:r>
+              <a:rPr lang="fr-FR" dirty="0" smtClean="0"/>
+              <a:t> speed</a:t>
+            </a:r>
+            <a:endParaRPr lang="fr-FR" dirty="0"/>
+          </a:p>
+        </p:txBody>
+      </p:sp>
+      <p:sp>
+        <p:nvSpPr>
+          <p:cNvPr id="5" name="Espace réservé du texte 4"/>
+          <p:cNvSpPr>
+            <a:spLocks noGrp="1"/>
+          </p:cNvSpPr>
+          <p:nvPr>
+            <p:ph type="body" idx="1"/>
+          </p:nvPr>
+        </p:nvSpPr>
+        <p:spPr/>
+        <p:txBody>
+          <a:bodyPr/>
+          <a:lstStyle/>
+          <a:p>
+            <a:r>
+              <a:rPr lang="fr-FR" dirty="0" err="1" smtClean="0"/>
+              <a:t>Circular</a:t>
+            </a:r>
+            <a:r>
+              <a:rPr lang="fr-FR" dirty="0" smtClean="0"/>
+              <a:t> Keyboard</a:t>
+            </a:r>
+            <a:endParaRPr lang="fr-FR" dirty="0"/>
+          </a:p>
+        </p:txBody>
+      </p:sp>
+      <p:sp>
+        <p:nvSpPr>
+          <p:cNvPr id="7" name="Espace réservé du texte 6"/>
+          <p:cNvSpPr>
+            <a:spLocks noGrp="1"/>
+          </p:cNvSpPr>
+          <p:nvPr>
+            <p:ph type="body" sz="half" idx="3"/>
+          </p:nvPr>
+        </p:nvSpPr>
+        <p:spPr/>
+        <p:txBody>
+          <a:bodyPr/>
+          <a:lstStyle/>
+          <a:p>
+            <a:r>
+              <a:rPr lang="fr-FR" dirty="0" smtClean="0"/>
+              <a:t>T9 Keyboard</a:t>
+            </a:r>
+            <a:endParaRPr lang="fr-FR" dirty="0"/>
+          </a:p>
+        </p:txBody>
+      </p:sp>
+      <p:sp>
+        <p:nvSpPr>
+          <p:cNvPr id="4" name="Espace réservé du numéro de diapositive 3"/>
+          <p:cNvSpPr>
+            <a:spLocks noGrp="1"/>
+          </p:cNvSpPr>
+          <p:nvPr>
+            <p:ph type="sldNum" sz="quarter" idx="12"/>
+          </p:nvPr>
+        </p:nvSpPr>
+        <p:spPr/>
+        <p:txBody>
+          <a:bodyPr/>
+          <a:lstStyle/>
+          <a:p>
+            <a:fld id="{AB9DB7C7-3B7A-421A-AF98-AB9FC2185CD3}" type="slidenum">
+              <a:rPr lang="fr-FR" smtClean="0"/>
+              <a:pPr/>
+              <a:t>18</a:t>
+            </a:fld>
+            <a:endParaRPr lang="fr-FR" dirty="0"/>
+          </a:p>
+        </p:txBody>
+      </p:sp>
+      <p:pic>
+        <p:nvPicPr>
+          <p:cNvPr id="9" name="Espace réservé du contenu 8"/>
+          <p:cNvPicPr>
+            <a:picLocks noGrp="1"/>
+          </p:cNvPicPr>
+          <p:nvPr>
+            <p:ph sz="quarter" idx="2"/>
+          </p:nvPr>
+        </p:nvPicPr>
+        <p:blipFill>
+          <a:blip r:embed="rId2" cstate="print"/>
+          <a:srcRect/>
+          <a:stretch>
+            <a:fillRect/>
+          </a:stretch>
+        </p:blipFill>
+        <p:spPr bwMode="auto">
+          <a:xfrm>
+            <a:off x="457200" y="2297383"/>
+            <a:ext cx="4040188" cy="2382296"/>
+          </a:xfrm>
+          <a:prstGeom prst="rect">
+            <a:avLst/>
+          </a:prstGeom>
+          <a:noFill/>
+          <a:ln w="9525">
+            <a:noFill/>
+            <a:miter lim="800000"/>
+            <a:headEnd/>
+            <a:tailEnd/>
+          </a:ln>
+        </p:spPr>
+      </p:pic>
+      <p:pic>
+        <p:nvPicPr>
+          <p:cNvPr id="10" name="Espace réservé du contenu 9"/>
+          <p:cNvPicPr>
+            <a:picLocks noGrp="1"/>
+          </p:cNvPicPr>
+          <p:nvPr>
+            <p:ph sz="quarter" idx="4"/>
+          </p:nvPr>
+        </p:nvPicPr>
+        <p:blipFill>
+          <a:blip r:embed="rId3" cstate="print"/>
+          <a:srcRect/>
+          <a:stretch>
+            <a:fillRect/>
+          </a:stretch>
+        </p:blipFill>
+        <p:spPr bwMode="auto">
+          <a:xfrm>
+            <a:off x="4645025" y="2296956"/>
+            <a:ext cx="4041775" cy="2383150"/>
+          </a:xfrm>
+          <a:prstGeom prst="rect">
+            <a:avLst/>
+          </a:prstGeom>
+          <a:noFill/>
+          <a:ln w="9525">
+            <a:noFill/>
+            <a:miter lim="800000"/>
+            <a:headEnd/>
+            <a:tailEnd/>
+          </a:ln>
+        </p:spPr>
+      </p:pic>
+    </p:spTree>
+  </p:cSld>
+  <p:clrMapOvr>
+    <a:masterClrMapping/>
+  </p:clrMapOvr>
+  <p:timing>
+    <p:tnLst>
+      <p:par>
+        <p:cTn id="1" dur="indefinite" restart="never" nodeType="tmRoot"/>
+      </p:par>
+    </p:tnLst>
+  </p:timing>
+</p:sld>
+</file>
+
+<file path=ppt/slides/slide19.xml><?xml version="1.0" encoding="utf-8"?>
+<p:sld xmlns:a="http://schemas.openxmlformats.org/drawingml/2006/main" xmlns:r="http://schemas.openxmlformats.org/officeDocument/2006/relationships" xmlns:p="http://schemas.openxmlformats.org/presentationml/2006/main">
+  <p:cSld>
+    <p:spTree>
+      <p:nvGrpSpPr>
+        <p:cNvPr id="1" name=""/>
+        <p:cNvGrpSpPr/>
+        <p:nvPr/>
+      </p:nvGrpSpPr>
+      <p:grpSpPr>
+        <a:xfrm>
+          <a:off x="0" y="0"/>
+          <a:ext cx="0" cy="0"/>
+          <a:chOff x="0" y="0"/>
+          <a:chExt cx="0" cy="0"/>
+        </a:xfrm>
+      </p:grpSpPr>
+      <p:sp>
+        <p:nvSpPr>
+          <p:cNvPr id="2" name="Titre 1"/>
+          <p:cNvSpPr>
+            <a:spLocks noGrp="1"/>
+          </p:cNvSpPr>
+          <p:nvPr>
+            <p:ph type="title"/>
+          </p:nvPr>
+        </p:nvSpPr>
+        <p:spPr/>
+        <p:txBody>
+          <a:bodyPr/>
+          <a:lstStyle/>
+          <a:p>
+            <a:r>
+              <a:rPr lang="fr-FR" dirty="0" smtClean="0"/>
+              <a:t>Input </a:t>
+            </a:r>
+            <a:r>
+              <a:rPr lang="fr-FR" dirty="0" err="1" smtClean="0"/>
+              <a:t>word</a:t>
+            </a:r>
+            <a:r>
+              <a:rPr lang="fr-FR" dirty="0" smtClean="0"/>
+              <a:t> speed</a:t>
+            </a:r>
+            <a:endParaRPr lang="fr-FR" dirty="0"/>
+          </a:p>
+        </p:txBody>
+      </p:sp>
+      <p:sp>
+        <p:nvSpPr>
+          <p:cNvPr id="11" name="Espace réservé du texte 10"/>
+          <p:cNvSpPr>
+            <a:spLocks noGrp="1"/>
+          </p:cNvSpPr>
+          <p:nvPr>
+            <p:ph type="body" idx="1"/>
+          </p:nvPr>
+        </p:nvSpPr>
+        <p:spPr/>
+        <p:txBody>
+          <a:bodyPr/>
+          <a:lstStyle/>
+          <a:p>
+            <a:r>
+              <a:rPr lang="fr-FR" dirty="0" smtClean="0"/>
+              <a:t>Time</a:t>
+            </a:r>
+            <a:endParaRPr lang="fr-FR" dirty="0"/>
+          </a:p>
+        </p:txBody>
+      </p:sp>
+      <p:sp>
+        <p:nvSpPr>
+          <p:cNvPr id="13" name="Espace réservé du texte 12"/>
+          <p:cNvSpPr>
+            <a:spLocks noGrp="1"/>
+          </p:cNvSpPr>
+          <p:nvPr>
+            <p:ph type="body" sz="half" idx="3"/>
+          </p:nvPr>
+        </p:nvSpPr>
+        <p:spPr/>
+        <p:txBody>
+          <a:bodyPr/>
+          <a:lstStyle/>
+          <a:p>
+            <a:r>
+              <a:rPr lang="fr-FR" dirty="0" err="1" smtClean="0"/>
+              <a:t>Number</a:t>
+            </a:r>
+            <a:r>
+              <a:rPr lang="fr-FR" dirty="0" smtClean="0"/>
+              <a:t> of clicks</a:t>
+            </a:r>
+            <a:endParaRPr lang="fr-FR" dirty="0"/>
+          </a:p>
+        </p:txBody>
+      </p:sp>
+      <p:sp>
+        <p:nvSpPr>
+          <p:cNvPr id="7" name="Espace réservé du numéro de diapositive 6"/>
+          <p:cNvSpPr>
+            <a:spLocks noGrp="1"/>
+          </p:cNvSpPr>
+          <p:nvPr>
+            <p:ph type="sldNum" sz="quarter" idx="12"/>
+          </p:nvPr>
+        </p:nvSpPr>
+        <p:spPr/>
+        <p:txBody>
+          <a:bodyPr/>
+          <a:lstStyle/>
+          <a:p>
+            <a:fld id="{AB9DB7C7-3B7A-421A-AF98-AB9FC2185CD3}" type="slidenum">
+              <a:rPr lang="fr-FR" smtClean="0"/>
+              <a:pPr/>
+              <a:t>19</a:t>
+            </a:fld>
+            <a:endParaRPr lang="fr-FR" dirty="0"/>
+          </a:p>
+        </p:txBody>
+      </p:sp>
+      <p:graphicFrame>
+        <p:nvGraphicFramePr>
+          <p:cNvPr id="15" name="Espace réservé du contenu 14"/>
+          <p:cNvGraphicFramePr>
+            <a:graphicFrameLocks noGrp="1"/>
+          </p:cNvGraphicFramePr>
+          <p:nvPr>
+            <p:ph sz="quarter" idx="2"/>
+          </p:nvPr>
+        </p:nvGraphicFramePr>
+        <p:xfrm>
+          <a:off x="457200" y="1517650"/>
+          <a:ext cx="4040188" cy="3941763"/>
+        </p:xfrm>
+        <a:graphic>
+          <a:graphicData uri="http://schemas.openxmlformats.org/drawingml/2006/chart">
+            <c:chart xmlns:c="http://schemas.openxmlformats.org/drawingml/2006/chart" xmlns:r="http://schemas.openxmlformats.org/officeDocument/2006/relationships" r:id="rId2"/>
+          </a:graphicData>
+        </a:graphic>
+      </p:graphicFrame>
+      <p:graphicFrame>
+        <p:nvGraphicFramePr>
+          <p:cNvPr id="16" name="Espace réservé du contenu 15"/>
+          <p:cNvGraphicFramePr>
+            <a:graphicFrameLocks noGrp="1"/>
+          </p:cNvGraphicFramePr>
+          <p:nvPr>
+            <p:ph sz="quarter" idx="4"/>
+          </p:nvPr>
+        </p:nvGraphicFramePr>
+        <p:xfrm>
+          <a:off x="4645025" y="1517650"/>
+          <a:ext cx="4041775" cy="3941763"/>
+        </p:xfrm>
+        <a:graphic>
+          <a:graphicData uri="http://schemas.openxmlformats.org/drawingml/2006/chart">
+            <c:chart xmlns:c="http://schemas.openxmlformats.org/drawingml/2006/chart" xmlns:r="http://schemas.openxmlformats.org/officeDocument/2006/relationships" r:id="rId3"/>
+          </a:graphicData>
+        </a:graphic>
+      </p:graphicFrame>
     </p:spTree>
   </p:cSld>
   <p:clrMapOvr>
@@ -6793,16 +8773,22 @@
           </a:p>
           <a:p>
             <a:r>
-              <a:rPr lang="en-US" smtClean="0"/>
+              <a:rPr lang="en-US" dirty="0" smtClean="0"/>
               <a:t>Solution</a:t>
             </a:r>
-            <a:endParaRPr lang="en-US" dirty="0" smtClean="0"/>
           </a:p>
           <a:p>
             <a:r>
               <a:rPr lang="en-US" dirty="0" smtClean="0"/>
               <a:t>Theory/Technical</a:t>
             </a:r>
+          </a:p>
+          <a:p>
+            <a:r>
+              <a:rPr lang="en-US" dirty="0" smtClean="0"/>
+              <a:t>Evaluation</a:t>
+            </a:r>
+            <a:endParaRPr lang="en-US" dirty="0" smtClean="0"/>
           </a:p>
           <a:p>
             <a:r>
@@ -6837,6 +8823,447 @@
               <a:rPr lang="fr-FR" smtClean="0"/>
               <a:pPr/>
               <a:t>2</a:t>
+            </a:fld>
+            <a:endParaRPr lang="fr-FR" dirty="0"/>
+          </a:p>
+        </p:txBody>
+      </p:sp>
+    </p:spTree>
+  </p:cSld>
+  <p:clrMapOvr>
+    <a:masterClrMapping/>
+  </p:clrMapOvr>
+  <p:timing>
+    <p:tnLst>
+      <p:par>
+        <p:cTn id="1" dur="indefinite" restart="never" nodeType="tmRoot"/>
+      </p:par>
+    </p:tnLst>
+  </p:timing>
+</p:sld>
+</file>
+
+<file path=ppt/slides/slide20.xml><?xml version="1.0" encoding="utf-8"?>
+<p:sld xmlns:a="http://schemas.openxmlformats.org/drawingml/2006/main" xmlns:r="http://schemas.openxmlformats.org/officeDocument/2006/relationships" xmlns:p="http://schemas.openxmlformats.org/presentationml/2006/main">
+  <p:cSld>
+    <p:spTree>
+      <p:nvGrpSpPr>
+        <p:cNvPr id="1" name=""/>
+        <p:cNvGrpSpPr/>
+        <p:nvPr/>
+      </p:nvGrpSpPr>
+      <p:grpSpPr>
+        <a:xfrm>
+          <a:off x="0" y="0"/>
+          <a:ext cx="0" cy="0"/>
+          <a:chOff x="0" y="0"/>
+          <a:chExt cx="0" cy="0"/>
+        </a:xfrm>
+      </p:grpSpPr>
+      <p:sp>
+        <p:nvSpPr>
+          <p:cNvPr id="6" name="Espace réservé du contenu 2"/>
+          <p:cNvSpPr>
+            <a:spLocks noGrp="1"/>
+          </p:cNvSpPr>
+          <p:nvPr>
+            <p:ph idx="1"/>
+          </p:nvPr>
+        </p:nvSpPr>
+        <p:spPr>
+          <a:xfrm>
+            <a:off x="457200" y="1600200"/>
+            <a:ext cx="7467600" cy="4525963"/>
+          </a:xfrm>
+        </p:spPr>
+        <p:txBody>
+          <a:bodyPr>
+            <a:normAutofit fontScale="92500" lnSpcReduction="20000"/>
+          </a:bodyPr>
+          <a:lstStyle/>
+          <a:p>
+            <a:r>
+              <a:rPr lang="en-US" dirty="0" smtClean="0"/>
+              <a:t>Total Execution Time : </a:t>
+            </a:r>
+            <a:r>
+              <a:rPr lang="en-US" dirty="0" smtClean="0">
+                <a:solidFill>
+                  <a:srgbClr val="FFC000"/>
+                </a:solidFill>
+              </a:rPr>
+              <a:t>10 – 18 ms</a:t>
+            </a:r>
+          </a:p>
+          <a:p>
+            <a:endParaRPr lang="en-US" dirty="0" smtClean="0">
+              <a:solidFill>
+                <a:srgbClr val="FFFF00"/>
+              </a:solidFill>
+            </a:endParaRPr>
+          </a:p>
+          <a:p>
+            <a:r>
+              <a:rPr lang="en-US" dirty="0" smtClean="0"/>
+              <a:t>We are tracking 4 blobs</a:t>
+            </a:r>
+          </a:p>
+          <a:p>
+            <a:pPr lvl="1"/>
+            <a:r>
+              <a:rPr lang="en-US" dirty="0" smtClean="0"/>
+              <a:t>Single user</a:t>
+            </a:r>
+          </a:p>
+          <a:p>
+            <a:pPr lvl="1"/>
+            <a:r>
+              <a:rPr lang="en-US" dirty="0" smtClean="0"/>
+              <a:t>Usually only both arms and the head are visible</a:t>
+            </a:r>
+          </a:p>
+          <a:p>
+            <a:pPr lvl="1"/>
+            <a:r>
+              <a:rPr lang="en-US" dirty="0" smtClean="0"/>
+              <a:t>One blob added for safety considering the noise of </a:t>
+            </a:r>
+            <a:r>
+              <a:rPr lang="en-US" dirty="0" err="1" smtClean="0"/>
+              <a:t>Kinect’s</a:t>
+            </a:r>
+            <a:r>
+              <a:rPr lang="en-US" dirty="0" smtClean="0"/>
+              <a:t> sensors</a:t>
+            </a:r>
+          </a:p>
+          <a:p>
+            <a:pPr lvl="1"/>
+            <a:endParaRPr lang="en-US" dirty="0" smtClean="0"/>
+          </a:p>
+          <a:p>
+            <a:r>
+              <a:rPr lang="en-US" dirty="0" smtClean="0"/>
+              <a:t>Functional distance : 1m – 2m</a:t>
+            </a:r>
+          </a:p>
+          <a:p>
+            <a:pPr lvl="1"/>
+            <a:r>
+              <a:rPr lang="en-US" dirty="0" smtClean="0"/>
+              <a:t>1m is the minimum allowed by the Kinect, 2m was defined as a usability configuration</a:t>
+            </a:r>
+          </a:p>
+        </p:txBody>
+      </p:sp>
+      <p:sp>
+        <p:nvSpPr>
+          <p:cNvPr id="2" name="Titre 1"/>
+          <p:cNvSpPr>
+            <a:spLocks noGrp="1"/>
+          </p:cNvSpPr>
+          <p:nvPr>
+            <p:ph type="title"/>
+          </p:nvPr>
+        </p:nvSpPr>
+        <p:spPr/>
+        <p:txBody>
+          <a:bodyPr/>
+          <a:lstStyle/>
+          <a:p>
+            <a:r>
+              <a:rPr lang="en-US" dirty="0" smtClean="0"/>
+              <a:t>Results</a:t>
+            </a:r>
+            <a:endParaRPr lang="en-US" dirty="0"/>
+          </a:p>
+        </p:txBody>
+      </p:sp>
+      <p:sp>
+        <p:nvSpPr>
+          <p:cNvPr id="4" name="Espace réservé du numéro de diapositive 3"/>
+          <p:cNvSpPr>
+            <a:spLocks noGrp="1"/>
+          </p:cNvSpPr>
+          <p:nvPr>
+            <p:ph type="sldNum" sz="quarter" idx="12"/>
+          </p:nvPr>
+        </p:nvSpPr>
+        <p:spPr/>
+        <p:txBody>
+          <a:bodyPr/>
+          <a:lstStyle/>
+          <a:p>
+            <a:fld id="{AB9DB7C7-3B7A-421A-AF98-AB9FC2185CD3}" type="slidenum">
+              <a:rPr lang="en-US" smtClean="0"/>
+              <a:pPr/>
+              <a:t>20</a:t>
+            </a:fld>
+            <a:endParaRPr lang="en-US"/>
+          </a:p>
+        </p:txBody>
+      </p:sp>
+    </p:spTree>
+  </p:cSld>
+  <p:clrMapOvr>
+    <a:masterClrMapping/>
+  </p:clrMapOvr>
+  <p:timing>
+    <p:tnLst>
+      <p:par>
+        <p:cTn id="1" dur="indefinite" restart="never" nodeType="tmRoot"/>
+      </p:par>
+    </p:tnLst>
+  </p:timing>
+</p:sld>
+</file>
+
+<file path=ppt/slides/slide21.xml><?xml version="1.0" encoding="utf-8"?>
+<p:sld xmlns:a="http://schemas.openxmlformats.org/drawingml/2006/main" xmlns:r="http://schemas.openxmlformats.org/officeDocument/2006/relationships" xmlns:p="http://schemas.openxmlformats.org/presentationml/2006/main">
+  <p:cSld>
+    <p:spTree>
+      <p:nvGrpSpPr>
+        <p:cNvPr id="1" name=""/>
+        <p:cNvGrpSpPr/>
+        <p:nvPr/>
+      </p:nvGrpSpPr>
+      <p:grpSpPr>
+        <a:xfrm>
+          <a:off x="0" y="0"/>
+          <a:ext cx="0" cy="0"/>
+          <a:chOff x="0" y="0"/>
+          <a:chExt cx="0" cy="0"/>
+        </a:xfrm>
+      </p:grpSpPr>
+      <p:sp>
+        <p:nvSpPr>
+          <p:cNvPr id="2" name="Titre 1"/>
+          <p:cNvSpPr>
+            <a:spLocks noGrp="1"/>
+          </p:cNvSpPr>
+          <p:nvPr>
+            <p:ph type="title"/>
+          </p:nvPr>
+        </p:nvSpPr>
+        <p:spPr/>
+        <p:txBody>
+          <a:bodyPr/>
+          <a:lstStyle/>
+          <a:p>
+            <a:r>
+              <a:rPr lang="fr-FR" dirty="0" smtClean="0"/>
+              <a:t>Conclusion</a:t>
+            </a:r>
+            <a:endParaRPr lang="fr-FR" dirty="0"/>
+          </a:p>
+        </p:txBody>
+      </p:sp>
+      <p:sp>
+        <p:nvSpPr>
+          <p:cNvPr id="3" name="Espace réservé du contenu 2"/>
+          <p:cNvSpPr>
+            <a:spLocks noGrp="1"/>
+          </p:cNvSpPr>
+          <p:nvPr>
+            <p:ph idx="1"/>
+          </p:nvPr>
+        </p:nvSpPr>
+        <p:spPr/>
+        <p:txBody>
+          <a:bodyPr>
+            <a:normAutofit fontScale="77500" lnSpcReduction="20000"/>
+          </a:bodyPr>
+          <a:lstStyle/>
+          <a:p>
+            <a:r>
+              <a:rPr lang="en-US" dirty="0" smtClean="0"/>
+              <a:t>Features offered by the Kinect</a:t>
+            </a:r>
+          </a:p>
+          <a:p>
+            <a:pPr lvl="1"/>
+            <a:r>
+              <a:rPr lang="en-US" dirty="0" smtClean="0"/>
+              <a:t>Depth data</a:t>
+            </a:r>
+          </a:p>
+          <a:p>
+            <a:pPr lvl="1"/>
+            <a:r>
+              <a:rPr lang="en-US" dirty="0" smtClean="0"/>
+              <a:t>Color data</a:t>
+            </a:r>
+          </a:p>
+          <a:p>
+            <a:pPr lvl="1"/>
+            <a:r>
+              <a:rPr lang="en-US" dirty="0" smtClean="0"/>
+              <a:t>Skeleton recognition</a:t>
+            </a:r>
+          </a:p>
+          <a:p>
+            <a:pPr lvl="1">
+              <a:buNone/>
+            </a:pPr>
+            <a:endParaRPr lang="en-US" dirty="0" smtClean="0"/>
+          </a:p>
+          <a:p>
+            <a:r>
+              <a:rPr lang="en-US" dirty="0" smtClean="0"/>
+              <a:t>Limitations</a:t>
+            </a:r>
+          </a:p>
+          <a:p>
+            <a:pPr lvl="1"/>
+            <a:r>
+              <a:rPr lang="en-US" dirty="0" smtClean="0"/>
+              <a:t>Distance</a:t>
+            </a:r>
+          </a:p>
+          <a:p>
+            <a:pPr lvl="1"/>
+            <a:r>
+              <a:rPr lang="en-US" dirty="0" smtClean="0"/>
+              <a:t>Accuracy when not standing up</a:t>
+            </a:r>
+          </a:p>
+          <a:p>
+            <a:pPr lvl="1">
+              <a:buNone/>
+            </a:pPr>
+            <a:endParaRPr lang="en-US" dirty="0" smtClean="0"/>
+          </a:p>
+          <a:p>
+            <a:r>
+              <a:rPr lang="en-US" dirty="0" smtClean="0"/>
+              <a:t>“Easy-to-use” camera</a:t>
+            </a:r>
+          </a:p>
+          <a:p>
+            <a:endParaRPr lang="en-US" dirty="0" smtClean="0"/>
+          </a:p>
+          <a:p>
+            <a:r>
+              <a:rPr lang="en-US" dirty="0" smtClean="0"/>
+              <a:t>PC Kinect in development</a:t>
+            </a:r>
+            <a:br>
+              <a:rPr lang="en-US" dirty="0" smtClean="0"/>
+            </a:br>
+            <a:r>
+              <a:rPr lang="en-US" dirty="0" smtClean="0"/>
+              <a:t>Minimum Depth : 50 cm (1m with the current Kinect)</a:t>
+            </a:r>
+          </a:p>
+          <a:p>
+            <a:endParaRPr lang="fr-FR" dirty="0"/>
+          </a:p>
+        </p:txBody>
+      </p:sp>
+      <p:sp>
+        <p:nvSpPr>
+          <p:cNvPr id="4" name="Espace réservé du numéro de diapositive 3"/>
+          <p:cNvSpPr>
+            <a:spLocks noGrp="1"/>
+          </p:cNvSpPr>
+          <p:nvPr>
+            <p:ph type="sldNum" sz="quarter" idx="12"/>
+          </p:nvPr>
+        </p:nvSpPr>
+        <p:spPr/>
+        <p:txBody>
+          <a:bodyPr/>
+          <a:lstStyle/>
+          <a:p>
+            <a:fld id="{AB9DB7C7-3B7A-421A-AF98-AB9FC2185CD3}" type="slidenum">
+              <a:rPr lang="fr-FR" smtClean="0"/>
+              <a:pPr/>
+              <a:t>21</a:t>
+            </a:fld>
+            <a:endParaRPr lang="fr-FR" dirty="0"/>
+          </a:p>
+        </p:txBody>
+      </p:sp>
+    </p:spTree>
+  </p:cSld>
+  <p:clrMapOvr>
+    <a:masterClrMapping/>
+  </p:clrMapOvr>
+  <p:timing>
+    <p:tnLst>
+      <p:par>
+        <p:cTn id="1" dur="indefinite" restart="never" nodeType="tmRoot"/>
+      </p:par>
+    </p:tnLst>
+  </p:timing>
+</p:sld>
+</file>
+
+<file path=ppt/slides/slide22.xml><?xml version="1.0" encoding="utf-8"?>
+<p:sld xmlns:a="http://schemas.openxmlformats.org/drawingml/2006/main" xmlns:r="http://schemas.openxmlformats.org/officeDocument/2006/relationships" xmlns:p="http://schemas.openxmlformats.org/presentationml/2006/main">
+  <p:cSld>
+    <p:spTree>
+      <p:nvGrpSpPr>
+        <p:cNvPr id="1" name=""/>
+        <p:cNvGrpSpPr/>
+        <p:nvPr/>
+      </p:nvGrpSpPr>
+      <p:grpSpPr>
+        <a:xfrm>
+          <a:off x="0" y="0"/>
+          <a:ext cx="0" cy="0"/>
+          <a:chOff x="0" y="0"/>
+          <a:chExt cx="0" cy="0"/>
+        </a:xfrm>
+      </p:grpSpPr>
+      <p:sp>
+        <p:nvSpPr>
+          <p:cNvPr id="5" name="Titre 4"/>
+          <p:cNvSpPr>
+            <a:spLocks noGrp="1"/>
+          </p:cNvSpPr>
+          <p:nvPr>
+            <p:ph type="title"/>
+          </p:nvPr>
+        </p:nvSpPr>
+        <p:spPr>
+          <a:xfrm>
+            <a:off x="611560" y="2708920"/>
+            <a:ext cx="7470648" cy="1143000"/>
+          </a:xfrm>
+        </p:spPr>
+        <p:txBody>
+          <a:bodyPr/>
+          <a:lstStyle/>
+          <a:p>
+            <a:pPr algn="ctr"/>
+            <a:r>
+              <a:rPr lang="en-US" dirty="0" smtClean="0"/>
+              <a:t>Thank you for your attention</a:t>
+            </a:r>
+            <a:endParaRPr lang="en-US" dirty="0"/>
+          </a:p>
+        </p:txBody>
+      </p:sp>
+      <p:sp>
+        <p:nvSpPr>
+          <p:cNvPr id="4" name="Espace réservé du numéro de diapositive 3"/>
+          <p:cNvSpPr>
+            <a:spLocks noGrp="1"/>
+          </p:cNvSpPr>
+          <p:nvPr>
+            <p:ph type="sldNum" sz="quarter" idx="11"/>
+          </p:nvPr>
+        </p:nvSpPr>
+        <p:spPr/>
+        <p:txBody>
+          <a:bodyPr/>
+          <a:lstStyle/>
+          <a:p>
+            <a:fld id="{AB9DB7C7-3B7A-421A-AF98-AB9FC2185CD3}" type="slidenum">
+              <a:rPr lang="fr-FR" smtClean="0"/>
+              <a:pPr/>
+              <a:t>22</a:t>
             </a:fld>
             <a:endParaRPr lang="fr-FR" dirty="0"/>
           </a:p>

</xml_diff>

<commit_message>
TODO présentation + rapport
</commit_message>
<xml_diff>
--- a/Pr�sentation/Pr�sentation_NUI.pptx
+++ b/Pr�sentation/Pr�sentation_NUI.pptx
@@ -5,7 +5,7 @@
     <p:sldMasterId id="2147483684" r:id="rId1"/>
   </p:sldMasterIdLst>
   <p:notesMasterIdLst>
-    <p:notesMasterId r:id="rId24"/>
+    <p:notesMasterId r:id="rId27"/>
   </p:notesMasterIdLst>
   <p:sldIdLst>
     <p:sldId id="256" r:id="rId2"/>
@@ -21,15 +21,18 @@
     <p:sldId id="267" r:id="rId12"/>
     <p:sldId id="266" r:id="rId13"/>
     <p:sldId id="271" r:id="rId14"/>
-    <p:sldId id="272" r:id="rId15"/>
-    <p:sldId id="273" r:id="rId16"/>
-    <p:sldId id="274" r:id="rId17"/>
-    <p:sldId id="275" r:id="rId18"/>
-    <p:sldId id="276" r:id="rId19"/>
-    <p:sldId id="277" r:id="rId20"/>
-    <p:sldId id="262" r:id="rId21"/>
-    <p:sldId id="265" r:id="rId22"/>
-    <p:sldId id="268" r:id="rId23"/>
+    <p:sldId id="280" r:id="rId15"/>
+    <p:sldId id="272" r:id="rId16"/>
+    <p:sldId id="273" r:id="rId17"/>
+    <p:sldId id="278" r:id="rId18"/>
+    <p:sldId id="274" r:id="rId19"/>
+    <p:sldId id="279" r:id="rId20"/>
+    <p:sldId id="275" r:id="rId21"/>
+    <p:sldId id="276" r:id="rId22"/>
+    <p:sldId id="277" r:id="rId23"/>
+    <p:sldId id="262" r:id="rId24"/>
+    <p:sldId id="265" r:id="rId25"/>
+    <p:sldId id="268" r:id="rId26"/>
   </p:sldIdLst>
   <p:sldSz cx="9144000" cy="6858000" type="screen4x3"/>
   <p:notesSz cx="6858000" cy="9144000"/>
@@ -190,13 +193,13 @@
                   <c:v>4.201918</c:v>
                 </c:pt>
                 <c:pt idx="1">
-                  <c:v>1.0630710999999975</c:v>
+                  <c:v>1.0630710999999973</c:v>
                 </c:pt>
                 <c:pt idx="2">
-                  <c:v>0.28386960000000061</c:v>
+                  <c:v>0.28386960000000067</c:v>
                 </c:pt>
                 <c:pt idx="3">
-                  <c:v>0.15299750000000037</c:v>
+                  <c:v>0.15299750000000042</c:v>
                 </c:pt>
                 <c:pt idx="4">
                   <c:v>4.9843000000000103E-2</c:v>
@@ -255,33 +258,33 @@
                 <c:formatCode>General</c:formatCode>
                 <c:ptCount val="6"/>
                 <c:pt idx="0">
-                  <c:v>3.4600000000000157E-5</c:v>
+                  <c:v>3.460000000000017E-5</c:v>
                 </c:pt>
                 <c:pt idx="1">
-                  <c:v>3.4000000000000149E-5</c:v>
+                  <c:v>3.4000000000000162E-5</c:v>
                 </c:pt>
                 <c:pt idx="2">
-                  <c:v>3.0700000000000136E-5</c:v>
+                  <c:v>3.0700000000000143E-5</c:v>
                 </c:pt>
                 <c:pt idx="3">
-                  <c:v>5.7700000000000305E-5</c:v>
+                  <c:v>5.7700000000000332E-5</c:v>
                 </c:pt>
                 <c:pt idx="4">
-                  <c:v>3.3300000000000132E-5</c:v>
+                  <c:v>3.3300000000000139E-5</c:v>
                 </c:pt>
                 <c:pt idx="5">
-                  <c:v>3.4600000000000157E-5</c:v>
+                  <c:v>3.460000000000017E-5</c:v>
                 </c:pt>
               </c:numCache>
             </c:numRef>
           </c:val>
         </c:ser>
         <c:marker val="1"/>
-        <c:axId val="59724160"/>
-        <c:axId val="59725696"/>
+        <c:axId val="68506368"/>
+        <c:axId val="68507904"/>
       </c:lineChart>
       <c:catAx>
-        <c:axId val="59724160"/>
+        <c:axId val="68506368"/>
         <c:scaling>
           <c:orientation val="minMax"/>
         </c:scaling>
@@ -297,14 +300,14 @@
             <a:endParaRPr lang="fr-FR"/>
           </a:p>
         </c:txPr>
-        <c:crossAx val="59725696"/>
-        <c:crossesAt val="1.000000000000005E-5"/>
+        <c:crossAx val="68507904"/>
+        <c:crossesAt val="1.0000000000000053E-5"/>
         <c:auto val="1"/>
         <c:lblAlgn val="ctr"/>
         <c:lblOffset val="100"/>
       </c:catAx>
       <c:valAx>
-        <c:axId val="59725696"/>
+        <c:axId val="68507904"/>
         <c:scaling>
           <c:logBase val="10"/>
           <c:orientation val="minMax"/>
@@ -314,7 +317,7 @@
         <c:numFmt formatCode="General" sourceLinked="1"/>
         <c:minorTickMark val="in"/>
         <c:tickLblPos val="nextTo"/>
-        <c:crossAx val="59724160"/>
+        <c:crossAx val="68506368"/>
         <c:crosses val="autoZero"/>
         <c:crossBetween val="between"/>
       </c:valAx>
@@ -392,16 +395,16 @@
                 <c:formatCode>General</c:formatCode>
                 <c:ptCount val="6"/>
                 <c:pt idx="0">
-                  <c:v>0.76500000000000012</c:v>
+                  <c:v>0.76500000000000024</c:v>
                 </c:pt>
                 <c:pt idx="1">
                   <c:v>0.81799999999999995</c:v>
                 </c:pt>
                 <c:pt idx="2">
-                  <c:v>0.72800000000000009</c:v>
+                  <c:v>0.7280000000000002</c:v>
                 </c:pt>
                 <c:pt idx="3">
-                  <c:v>0.6110000000000001</c:v>
+                  <c:v>0.61100000000000021</c:v>
                 </c:pt>
                 <c:pt idx="4">
                   <c:v>0.57099999999999995</c:v>
@@ -419,6 +422,13 @@
           <c:tx>
             <c:v>Kinect Hands</c:v>
           </c:tx>
+          <c:spPr>
+            <a:ln>
+              <a:solidFill>
+                <a:srgbClr val="FFFF00"/>
+              </a:solidFill>
+            </a:ln>
+          </c:spPr>
           <c:marker>
             <c:symbol val="none"/>
           </c:marker>
@@ -456,6 +466,13 @@
           <c:tx>
             <c:v>Kinect Skeleton</c:v>
           </c:tx>
+          <c:spPr>
+            <a:ln>
+              <a:solidFill>
+                <a:srgbClr val="FF0000"/>
+              </a:solidFill>
+            </a:ln>
+          </c:spPr>
           <c:marker>
             <c:symbol val="none"/>
           </c:marker>
@@ -475,38 +492,38 @@
                   <c:v>2.2890000000000001</c:v>
                 </c:pt>
                 <c:pt idx="3">
-                  <c:v>2.3509999999999995</c:v>
+                  <c:v>2.3509999999999991</c:v>
                 </c:pt>
                 <c:pt idx="4">
                   <c:v>2.0840000000000001</c:v>
                 </c:pt>
                 <c:pt idx="5">
-                  <c:v>1.7749999999999999</c:v>
+                  <c:v>1.7749999999999995</c:v>
                 </c:pt>
               </c:numCache>
             </c:numRef>
           </c:val>
         </c:ser>
         <c:marker val="1"/>
-        <c:axId val="68655744"/>
-        <c:axId val="71573888"/>
+        <c:axId val="77156352"/>
+        <c:axId val="77159040"/>
       </c:lineChart>
       <c:catAx>
-        <c:axId val="68655744"/>
+        <c:axId val="77156352"/>
         <c:scaling>
           <c:orientation val="minMax"/>
         </c:scaling>
         <c:axPos val="b"/>
         <c:numFmt formatCode="General" sourceLinked="1"/>
         <c:tickLblPos val="nextTo"/>
-        <c:crossAx val="71573888"/>
+        <c:crossAx val="77159040"/>
         <c:crosses val="autoZero"/>
         <c:auto val="1"/>
         <c:lblAlgn val="ctr"/>
         <c:lblOffset val="100"/>
       </c:catAx>
       <c:valAx>
-        <c:axId val="71573888"/>
+        <c:axId val="77159040"/>
         <c:scaling>
           <c:orientation val="minMax"/>
         </c:scaling>
@@ -514,7 +531,7 @@
         <c:majorGridlines/>
         <c:numFmt formatCode="General" sourceLinked="1"/>
         <c:tickLblPos val="nextTo"/>
-        <c:crossAx val="68655744"/>
+        <c:crossAx val="77156352"/>
         <c:crosses val="autoZero"/>
         <c:crossBetween val="between"/>
       </c:valAx>
@@ -682,6 +699,13 @@
           <c:tx>
             <c:v>Kinect Skeleton</c:v>
           </c:tx>
+          <c:spPr>
+            <a:ln>
+              <a:solidFill>
+                <a:srgbClr val="FF0000"/>
+              </a:solidFill>
+            </a:ln>
+          </c:spPr>
           <c:marker>
             <c:symbol val="none"/>
           </c:marker>
@@ -741,25 +765,25 @@
           </c:val>
         </c:ser>
         <c:marker val="1"/>
-        <c:axId val="71591040"/>
-        <c:axId val="71592576"/>
+        <c:axId val="63339904"/>
+        <c:axId val="63355904"/>
       </c:lineChart>
       <c:catAx>
-        <c:axId val="71591040"/>
+        <c:axId val="63339904"/>
         <c:scaling>
           <c:orientation val="minMax"/>
         </c:scaling>
         <c:axPos val="b"/>
         <c:numFmt formatCode="General" sourceLinked="1"/>
         <c:tickLblPos val="nextTo"/>
-        <c:crossAx val="71592576"/>
+        <c:crossAx val="63355904"/>
         <c:crosses val="autoZero"/>
         <c:auto val="1"/>
         <c:lblAlgn val="ctr"/>
         <c:lblOffset val="100"/>
       </c:catAx>
       <c:valAx>
-        <c:axId val="71592576"/>
+        <c:axId val="63355904"/>
         <c:scaling>
           <c:orientation val="minMax"/>
         </c:scaling>
@@ -767,7 +791,7 @@
         <c:majorGridlines/>
         <c:numFmt formatCode="General" sourceLinked="1"/>
         <c:tickLblPos val="nextTo"/>
-        <c:crossAx val="71591040"/>
+        <c:crossAx val="63339904"/>
         <c:crosses val="autoZero"/>
         <c:crossBetween val="between"/>
       </c:valAx>
@@ -908,6 +932,13 @@
           <c:tx>
             <c:v>Kinect Skeleton</c:v>
           </c:tx>
+          <c:spPr>
+            <a:ln>
+              <a:solidFill>
+                <a:srgbClr val="FF0000"/>
+              </a:solidFill>
+            </a:ln>
+          </c:spPr>
           <c:marker>
             <c:symbol val="none"/>
           </c:marker>
@@ -940,25 +971,25 @@
           </c:val>
         </c:ser>
         <c:marker val="1"/>
-        <c:axId val="71643136"/>
-        <c:axId val="71644672"/>
+        <c:axId val="67591552"/>
+        <c:axId val="77478528"/>
       </c:lineChart>
       <c:catAx>
-        <c:axId val="71643136"/>
+        <c:axId val="67591552"/>
         <c:scaling>
           <c:orientation val="minMax"/>
         </c:scaling>
         <c:axPos val="b"/>
         <c:numFmt formatCode="General" sourceLinked="1"/>
         <c:tickLblPos val="nextTo"/>
-        <c:crossAx val="71644672"/>
+        <c:crossAx val="77478528"/>
         <c:crosses val="autoZero"/>
         <c:auto val="1"/>
         <c:lblAlgn val="ctr"/>
         <c:lblOffset val="100"/>
       </c:catAx>
       <c:valAx>
-        <c:axId val="71644672"/>
+        <c:axId val="77478528"/>
         <c:scaling>
           <c:orientation val="minMax"/>
         </c:scaling>
@@ -966,7 +997,7 @@
         <c:majorGridlines/>
         <c:numFmt formatCode="General" sourceLinked="1"/>
         <c:tickLblPos val="nextTo"/>
-        <c:crossAx val="71643136"/>
+        <c:crossAx val="67591552"/>
         <c:crosses val="autoZero"/>
         <c:crossBetween val="between"/>
       </c:valAx>
@@ -1089,13 +1120,13 @@
                   <c:v>37.531000000000006</c:v>
                 </c:pt>
                 <c:pt idx="3">
-                  <c:v>49.551000000000002</c:v>
+                  <c:v>49.550999999999995</c:v>
                 </c:pt>
                 <c:pt idx="4">
                   <c:v>44.338000000000001</c:v>
                 </c:pt>
                 <c:pt idx="5">
-                  <c:v>57.416999999999994</c:v>
+                  <c:v>57.417000000000002</c:v>
                 </c:pt>
               </c:numCache>
             </c:numRef>
@@ -1107,6 +1138,13 @@
           <c:tx>
             <c:v>Kinect Skeleton</c:v>
           </c:tx>
+          <c:spPr>
+            <a:ln>
+              <a:solidFill>
+                <a:srgbClr val="FF0000"/>
+              </a:solidFill>
+            </a:ln>
+          </c:spPr>
           <c:marker>
             <c:symbol val="none"/>
           </c:marker>
@@ -1117,7 +1155,7 @@
                 <c:formatCode>General</c:formatCode>
                 <c:ptCount val="6"/>
                 <c:pt idx="0">
-                  <c:v>32.128000000000085</c:v>
+                  <c:v>32.128000000000107</c:v>
                 </c:pt>
                 <c:pt idx="1">
                   <c:v>33.488</c:v>
@@ -1139,25 +1177,25 @@
           </c:val>
         </c:ser>
         <c:marker val="1"/>
-        <c:axId val="71661824"/>
-        <c:axId val="71671808"/>
+        <c:axId val="77675136"/>
+        <c:axId val="77683712"/>
       </c:lineChart>
       <c:catAx>
-        <c:axId val="71661824"/>
+        <c:axId val="77675136"/>
         <c:scaling>
           <c:orientation val="minMax"/>
         </c:scaling>
         <c:axPos val="b"/>
         <c:numFmt formatCode="General" sourceLinked="1"/>
         <c:tickLblPos val="nextTo"/>
-        <c:crossAx val="71671808"/>
+        <c:crossAx val="77683712"/>
         <c:crosses val="autoZero"/>
         <c:auto val="1"/>
         <c:lblAlgn val="ctr"/>
         <c:lblOffset val="100"/>
       </c:catAx>
       <c:valAx>
-        <c:axId val="71671808"/>
+        <c:axId val="77683712"/>
         <c:scaling>
           <c:orientation val="minMax"/>
         </c:scaling>
@@ -1165,7 +1203,7 @@
         <c:majorGridlines/>
         <c:numFmt formatCode="General" sourceLinked="1"/>
         <c:tickLblPos val="nextTo"/>
-        <c:crossAx val="71661824"/>
+        <c:crossAx val="77675136"/>
         <c:crosses val="autoZero"/>
         <c:crossBetween val="between"/>
       </c:valAx>
@@ -1277,24 +1315,24 @@
           </c:val>
         </c:ser>
         <c:overlap val="100"/>
-        <c:axId val="71700864"/>
-        <c:axId val="71702400"/>
+        <c:axId val="67706880"/>
+        <c:axId val="67708416"/>
       </c:barChart>
       <c:catAx>
-        <c:axId val="71700864"/>
+        <c:axId val="67706880"/>
         <c:scaling>
           <c:orientation val="minMax"/>
         </c:scaling>
         <c:axPos val="b"/>
         <c:tickLblPos val="nextTo"/>
-        <c:crossAx val="71702400"/>
+        <c:crossAx val="67708416"/>
         <c:crosses val="autoZero"/>
         <c:auto val="1"/>
         <c:lblAlgn val="ctr"/>
         <c:lblOffset val="100"/>
       </c:catAx>
       <c:valAx>
-        <c:axId val="71702400"/>
+        <c:axId val="67708416"/>
         <c:scaling>
           <c:orientation val="minMax"/>
         </c:scaling>
@@ -1302,7 +1340,7 @@
         <c:majorGridlines/>
         <c:numFmt formatCode="General" sourceLinked="1"/>
         <c:tickLblPos val="nextTo"/>
-        <c:crossAx val="71700864"/>
+        <c:crossAx val="67706880"/>
         <c:crosses val="autoZero"/>
         <c:crossBetween val="between"/>
       </c:valAx>
@@ -1422,24 +1460,24 @@
             </c:numRef>
           </c:val>
         </c:ser>
-        <c:axId val="71756032"/>
-        <c:axId val="71761920"/>
+        <c:axId val="67757952"/>
+        <c:axId val="67759488"/>
       </c:barChart>
       <c:catAx>
-        <c:axId val="71756032"/>
+        <c:axId val="67757952"/>
         <c:scaling>
           <c:orientation val="minMax"/>
         </c:scaling>
         <c:axPos val="b"/>
         <c:tickLblPos val="nextTo"/>
-        <c:crossAx val="71761920"/>
+        <c:crossAx val="67759488"/>
         <c:crosses val="autoZero"/>
         <c:auto val="1"/>
         <c:lblAlgn val="ctr"/>
         <c:lblOffset val="100"/>
       </c:catAx>
       <c:valAx>
-        <c:axId val="71761920"/>
+        <c:axId val="67759488"/>
         <c:scaling>
           <c:orientation val="minMax"/>
         </c:scaling>
@@ -1447,7 +1485,7 @@
         <c:majorGridlines/>
         <c:numFmt formatCode="General" sourceLinked="1"/>
         <c:tickLblPos val="nextTo"/>
-        <c:crossAx val="71756032"/>
+        <c:crossAx val="67757952"/>
         <c:crosses val="autoZero"/>
         <c:crossBetween val="between"/>
       </c:valAx>
@@ -1567,25 +1605,25 @@
             </c:numRef>
           </c:val>
         </c:ser>
-        <c:axId val="71786496"/>
-        <c:axId val="71788032"/>
+        <c:axId val="67771776"/>
+        <c:axId val="67789952"/>
       </c:barChart>
       <c:catAx>
-        <c:axId val="71786496"/>
+        <c:axId val="67771776"/>
         <c:scaling>
           <c:orientation val="minMax"/>
         </c:scaling>
         <c:axPos val="b"/>
         <c:numFmt formatCode="General" sourceLinked="1"/>
         <c:tickLblPos val="nextTo"/>
-        <c:crossAx val="71788032"/>
+        <c:crossAx val="67789952"/>
         <c:crosses val="autoZero"/>
         <c:auto val="1"/>
         <c:lblAlgn val="ctr"/>
         <c:lblOffset val="100"/>
       </c:catAx>
       <c:valAx>
-        <c:axId val="71788032"/>
+        <c:axId val="67789952"/>
         <c:scaling>
           <c:orientation val="minMax"/>
         </c:scaling>
@@ -1593,7 +1631,7 @@
         <c:majorGridlines/>
         <c:numFmt formatCode="General" sourceLinked="1"/>
         <c:tickLblPos val="nextTo"/>
-        <c:crossAx val="71786496"/>
+        <c:crossAx val="67771776"/>
         <c:crosses val="autoZero"/>
         <c:crossBetween val="between"/>
       </c:valAx>
@@ -2705,13 +2743,13 @@
         <p:spPr/>
         <p:txBody>
           <a:bodyPr>
-            <a:normAutofit lnSpcReduction="10000"/>
+            <a:normAutofit/>
           </a:bodyPr>
           <a:lstStyle/>
           <a:p>
             <a:r>
               <a:rPr lang="fr-FR" dirty="0" err="1" smtClean="0"/>
-              <a:t>Precise</a:t>
+              <a:t>Make</a:t>
             </a:r>
             <a:r>
               <a:rPr lang="fr-FR" dirty="0" smtClean="0"/>
@@ -2719,71 +2757,19 @@
             </a:r>
             <a:r>
               <a:rPr lang="fr-FR" dirty="0" err="1" smtClean="0"/>
-              <a:t>what</a:t>
+              <a:t>some</a:t>
             </a:r>
             <a:r>
               <a:rPr lang="fr-FR" dirty="0" smtClean="0"/>
-              <a:t> are to </a:t>
+              <a:t> </a:t>
             </a:r>
             <a:r>
               <a:rPr lang="fr-FR" dirty="0" err="1" smtClean="0"/>
-              <a:t>strong</a:t>
-            </a:r>
-            <a:r>
-              <a:rPr lang="fr-FR" baseline="0" dirty="0" smtClean="0"/>
-              <a:t> and </a:t>
-            </a:r>
-            <a:r>
-              <a:rPr lang="fr-FR" baseline="0" dirty="0" err="1" smtClean="0"/>
-              <a:t>weak</a:t>
-            </a:r>
-            <a:r>
-              <a:rPr lang="fr-FR" baseline="0" dirty="0" smtClean="0"/>
-              <a:t> points of </a:t>
-            </a:r>
-            <a:r>
-              <a:rPr lang="fr-FR" baseline="0" dirty="0" err="1" smtClean="0"/>
-              <a:t>our</a:t>
-            </a:r>
-            <a:r>
-              <a:rPr lang="fr-FR" baseline="0" dirty="0" smtClean="0"/>
-              <a:t> </a:t>
-            </a:r>
-            <a:r>
-              <a:rPr lang="fr-FR" baseline="0" dirty="0" err="1" smtClean="0"/>
-              <a:t>method</a:t>
-            </a:r>
-            <a:r>
-              <a:rPr lang="fr-FR" baseline="0" dirty="0" smtClean="0"/>
-              <a:t>, the limitations and </a:t>
-            </a:r>
-            <a:r>
-              <a:rPr lang="fr-FR" baseline="0" dirty="0" err="1" smtClean="0"/>
-              <a:t>so</a:t>
-            </a:r>
-            <a:r>
-              <a:rPr lang="fr-FR" baseline="0" dirty="0" smtClean="0"/>
-              <a:t> on</a:t>
-            </a:r>
-          </a:p>
-          <a:p>
-            <a:r>
-              <a:rPr lang="fr-FR" baseline="0" dirty="0" smtClean="0"/>
-              <a:t>La plage d’</a:t>
-            </a:r>
-            <a:r>
-              <a:rPr lang="fr-FR" baseline="0" dirty="0" err="1" smtClean="0"/>
-              <a:t>usabilité</a:t>
-            </a:r>
-            <a:r>
-              <a:rPr lang="fr-FR" baseline="0" dirty="0" smtClean="0"/>
-              <a:t>, les moments où c’est complètement good ou complètement foireux</a:t>
-            </a:r>
-          </a:p>
-          <a:p>
-            <a:r>
-              <a:rPr lang="fr-FR" baseline="0" dirty="0" smtClean="0"/>
-              <a:t>Graph : précision en fonction de la distance ?</a:t>
+              <a:t>video</a:t>
+            </a:r>
+            <a:r>
+              <a:rPr lang="fr-FR" dirty="0" smtClean="0"/>
+              <a:t> où on utilise le truc</a:t>
             </a:r>
             <a:endParaRPr lang="fr-FR" dirty="0"/>
           </a:p>
@@ -2807,7 +2793,7 @@
             <a:fld id="{2AC8731D-2D87-440C-8698-DB210FC0FD5A}" type="slidenum">
               <a:rPr lang="fr-FR" smtClean="0"/>
               <a:pPr/>
-              <a:t>20</a:t>
+              <a:t>21</a:t>
             </a:fld>
             <a:endParaRPr lang="fr-FR"/>
           </a:p>
@@ -2863,29 +2849,85 @@
         <p:spPr/>
         <p:txBody>
           <a:bodyPr>
-            <a:normAutofit/>
+            <a:normAutofit lnSpcReduction="10000"/>
           </a:bodyPr>
           <a:lstStyle/>
           <a:p>
             <a:r>
+              <a:rPr lang="fr-FR" dirty="0" err="1" smtClean="0"/>
+              <a:t>Precise</a:t>
+            </a:r>
+            <a:r>
               <a:rPr lang="fr-FR" dirty="0" smtClean="0"/>
-              <a:t>Mettre les </a:t>
+              <a:t> </a:t>
             </a:r>
             <a:r>
               <a:rPr lang="fr-FR" dirty="0" err="1" smtClean="0"/>
-              <a:t>specs</a:t>
+              <a:t>what</a:t>
             </a:r>
             <a:r>
               <a:rPr lang="fr-FR" dirty="0" smtClean="0"/>
-              <a:t> « </a:t>
+              <a:t> are to </a:t>
             </a:r>
             <a:r>
               <a:rPr lang="fr-FR" dirty="0" err="1" smtClean="0"/>
-              <a:t>rumors</a:t>
-            </a:r>
-            <a:r>
-              <a:rPr lang="fr-FR" dirty="0" smtClean="0"/>
-              <a:t> » de la Kinect 2 (pour le fun)</a:t>
+              <a:t>strong</a:t>
+            </a:r>
+            <a:r>
+              <a:rPr lang="fr-FR" baseline="0" dirty="0" smtClean="0"/>
+              <a:t> and </a:t>
+            </a:r>
+            <a:r>
+              <a:rPr lang="fr-FR" baseline="0" dirty="0" err="1" smtClean="0"/>
+              <a:t>weak</a:t>
+            </a:r>
+            <a:r>
+              <a:rPr lang="fr-FR" baseline="0" dirty="0" smtClean="0"/>
+              <a:t> points of </a:t>
+            </a:r>
+            <a:r>
+              <a:rPr lang="fr-FR" baseline="0" dirty="0" err="1" smtClean="0"/>
+              <a:t>our</a:t>
+            </a:r>
+            <a:r>
+              <a:rPr lang="fr-FR" baseline="0" dirty="0" smtClean="0"/>
+              <a:t> </a:t>
+            </a:r>
+            <a:r>
+              <a:rPr lang="fr-FR" baseline="0" dirty="0" err="1" smtClean="0"/>
+              <a:t>method</a:t>
+            </a:r>
+            <a:r>
+              <a:rPr lang="fr-FR" baseline="0" dirty="0" smtClean="0"/>
+              <a:t>, the limitations and </a:t>
+            </a:r>
+            <a:r>
+              <a:rPr lang="fr-FR" baseline="0" dirty="0" err="1" smtClean="0"/>
+              <a:t>so</a:t>
+            </a:r>
+            <a:r>
+              <a:rPr lang="fr-FR" baseline="0" dirty="0" smtClean="0"/>
+              <a:t> on</a:t>
+            </a:r>
+          </a:p>
+          <a:p>
+            <a:r>
+              <a:rPr lang="fr-FR" baseline="0" dirty="0" smtClean="0"/>
+              <a:t>La plage d’</a:t>
+            </a:r>
+            <a:r>
+              <a:rPr lang="fr-FR" baseline="0" dirty="0" err="1" smtClean="0"/>
+              <a:t>usabilité</a:t>
+            </a:r>
+            <a:r>
+              <a:rPr lang="fr-FR" baseline="0" dirty="0" smtClean="0"/>
+              <a:t>, les moments où c’est complètement good ou complètement foireux</a:t>
+            </a:r>
+          </a:p>
+          <a:p>
+            <a:r>
+              <a:rPr lang="fr-FR" baseline="0" dirty="0" smtClean="0"/>
+              <a:t>Graph : précision en fonction de la distance ?</a:t>
             </a:r>
             <a:endParaRPr lang="fr-FR" dirty="0"/>
           </a:p>
@@ -2909,7 +2951,109 @@
             <a:fld id="{2AC8731D-2D87-440C-8698-DB210FC0FD5A}" type="slidenum">
               <a:rPr lang="fr-FR" smtClean="0"/>
               <a:pPr/>
-              <a:t>21</a:t>
+              <a:t>23</a:t>
+            </a:fld>
+            <a:endParaRPr lang="fr-FR"/>
+          </a:p>
+        </p:txBody>
+      </p:sp>
+    </p:spTree>
+  </p:cSld>
+  <p:clrMapOvr>
+    <a:masterClrMapping/>
+  </p:clrMapOvr>
+</p:notes>
+</file>
+
+<file path=ppt/notesSlides/notesSlide8.xml><?xml version="1.0" encoding="utf-8"?>
+<p:notes xmlns:a="http://schemas.openxmlformats.org/drawingml/2006/main" xmlns:r="http://schemas.openxmlformats.org/officeDocument/2006/relationships" xmlns:p="http://schemas.openxmlformats.org/presentationml/2006/main">
+  <p:cSld>
+    <p:spTree>
+      <p:nvGrpSpPr>
+        <p:cNvPr id="1" name=""/>
+        <p:cNvGrpSpPr/>
+        <p:nvPr/>
+      </p:nvGrpSpPr>
+      <p:grpSpPr>
+        <a:xfrm>
+          <a:off x="0" y="0"/>
+          <a:ext cx="0" cy="0"/>
+          <a:chOff x="0" y="0"/>
+          <a:chExt cx="0" cy="0"/>
+        </a:xfrm>
+      </p:grpSpPr>
+      <p:sp>
+        <p:nvSpPr>
+          <p:cNvPr id="2" name="Espace réservé de l'image des diapositives 1"/>
+          <p:cNvSpPr>
+            <a:spLocks noGrp="1" noRot="1" noChangeAspect="1"/>
+          </p:cNvSpPr>
+          <p:nvPr>
+            <p:ph type="sldImg"/>
+          </p:nvPr>
+        </p:nvSpPr>
+        <p:spPr/>
+      </p:sp>
+      <p:sp>
+        <p:nvSpPr>
+          <p:cNvPr id="3" name="Espace réservé des commentaires 2"/>
+          <p:cNvSpPr>
+            <a:spLocks noGrp="1"/>
+          </p:cNvSpPr>
+          <p:nvPr>
+            <p:ph type="body" idx="1"/>
+          </p:nvPr>
+        </p:nvSpPr>
+        <p:spPr/>
+        <p:txBody>
+          <a:bodyPr>
+            <a:normAutofit/>
+          </a:bodyPr>
+          <a:lstStyle/>
+          <a:p>
+            <a:r>
+              <a:rPr lang="fr-FR" dirty="0" smtClean="0"/>
+              <a:t>Mettre les </a:t>
+            </a:r>
+            <a:r>
+              <a:rPr lang="fr-FR" dirty="0" err="1" smtClean="0"/>
+              <a:t>specs</a:t>
+            </a:r>
+            <a:r>
+              <a:rPr lang="fr-FR" dirty="0" smtClean="0"/>
+              <a:t> « </a:t>
+            </a:r>
+            <a:r>
+              <a:rPr lang="fr-FR" dirty="0" err="1" smtClean="0"/>
+              <a:t>rumors</a:t>
+            </a:r>
+            <a:r>
+              <a:rPr lang="fr-FR" dirty="0" smtClean="0"/>
+              <a:t> » de la Kinect 2 (pour le fun)</a:t>
+            </a:r>
+            <a:endParaRPr lang="fr-FR" dirty="0"/>
+          </a:p>
+        </p:txBody>
+      </p:sp>
+      <p:sp>
+        <p:nvSpPr>
+          <p:cNvPr id="4" name="Espace réservé du numéro de diapositive 3"/>
+          <p:cNvSpPr>
+            <a:spLocks noGrp="1"/>
+          </p:cNvSpPr>
+          <p:nvPr>
+            <p:ph type="sldNum" sz="quarter" idx="10"/>
+          </p:nvPr>
+        </p:nvSpPr>
+        <p:spPr/>
+        <p:txBody>
+          <a:bodyPr/>
+          <a:lstStyle/>
+          <a:p>
+            <a:fld id="{2AC8731D-2D87-440C-8698-DB210FC0FD5A}" type="slidenum">
+              <a:rPr lang="fr-FR" smtClean="0"/>
+              <a:pPr/>
+              <a:t>24</a:t>
             </a:fld>
             <a:endParaRPr lang="fr-FR"/>
           </a:p>
@@ -7604,21 +7748,23 @@
             <a:pPr lvl="1"/>
             <a:r>
               <a:rPr lang="en-US" dirty="0" smtClean="0"/>
-              <a:t>Accuracy</a:t>
-            </a:r>
+              <a:t>Cursor accuracy</a:t>
+            </a:r>
+            <a:endParaRPr lang="en-US" dirty="0" smtClean="0"/>
           </a:p>
           <a:p>
             <a:pPr lvl="1"/>
             <a:r>
               <a:rPr lang="en-US" dirty="0" smtClean="0"/>
-              <a:t>Speed processing</a:t>
-            </a:r>
+              <a:t>Processing speed</a:t>
+            </a:r>
+            <a:endParaRPr lang="en-US" dirty="0" smtClean="0"/>
           </a:p>
           <a:p>
             <a:pPr lvl="1"/>
             <a:r>
               <a:rPr lang="en-US" dirty="0" smtClean="0"/>
-              <a:t>Input word</a:t>
+              <a:t>Word input speed</a:t>
             </a:r>
             <a:endParaRPr lang="en-US" dirty="0"/>
           </a:p>
@@ -7692,14 +7838,71 @@
         </p:nvSpPr>
         <p:spPr/>
         <p:txBody>
+          <a:bodyPr>
+            <a:normAutofit fontScale="90000"/>
+          </a:bodyPr>
+          <a:lstStyle/>
+          <a:p>
+            <a:r>
+              <a:rPr lang="fr-FR" dirty="0" smtClean="0"/>
+              <a:t>TODO: </a:t>
+            </a:r>
+            <a:r>
+              <a:rPr lang="fr-FR" dirty="0" err="1" smtClean="0"/>
+              <a:t>explains</a:t>
+            </a:r>
+            <a:r>
+              <a:rPr lang="fr-FR" dirty="0" smtClean="0"/>
+              <a:t> </a:t>
+            </a:r>
+            <a:r>
+              <a:rPr lang="fr-FR" dirty="0" err="1" smtClean="0"/>
+              <a:t>kinect</a:t>
+            </a:r>
+            <a:r>
+              <a:rPr lang="fr-FR" dirty="0" smtClean="0"/>
+              <a:t> hands, </a:t>
+            </a:r>
+            <a:r>
+              <a:rPr lang="fr-FR" dirty="0" err="1" smtClean="0"/>
+              <a:t>squeleton</a:t>
+            </a:r>
+            <a:r>
+              <a:rPr lang="fr-FR" dirty="0" smtClean="0"/>
+              <a:t> and </a:t>
+            </a:r>
+            <a:r>
+              <a:rPr lang="fr-FR" dirty="0" err="1" smtClean="0"/>
+              <a:t>present</a:t>
+            </a:r>
+            <a:r>
+              <a:rPr lang="fr-FR" dirty="0" smtClean="0"/>
+              <a:t> </a:t>
+            </a:r>
+            <a:r>
+              <a:rPr lang="fr-FR" dirty="0" err="1" smtClean="0"/>
+              <a:t>them</a:t>
+            </a:r>
+            <a:endParaRPr lang="fr-FR" dirty="0"/>
+          </a:p>
+        </p:txBody>
+      </p:sp>
+      <p:sp>
+        <p:nvSpPr>
+          <p:cNvPr id="3" name="Espace réservé du contenu 2"/>
+          <p:cNvSpPr>
+            <a:spLocks noGrp="1"/>
+          </p:cNvSpPr>
+          <p:nvPr>
+            <p:ph idx="1"/>
+          </p:nvPr>
+        </p:nvSpPr>
+        <p:spPr/>
+        <p:txBody>
           <a:bodyPr/>
           <a:lstStyle/>
           <a:p>
-            <a:r>
-              <a:rPr lang="fr-FR" dirty="0" err="1" smtClean="0"/>
-              <a:t>Accuracy</a:t>
-            </a:r>
-            <a:endParaRPr lang="fr-FR" dirty="0"/>
+            <a:endParaRPr lang="fr-FR"/>
           </a:p>
         </p:txBody>
       </p:sp>
@@ -7722,6 +7925,78 @@
               <a:rPr lang="fr-FR" smtClean="0"/>
               <a:pPr/>
               <a:t>14</a:t>
+            </a:fld>
+            <a:endParaRPr lang="fr-FR" dirty="0"/>
+          </a:p>
+        </p:txBody>
+      </p:sp>
+    </p:spTree>
+  </p:cSld>
+  <p:clrMapOvr>
+    <a:masterClrMapping/>
+  </p:clrMapOvr>
+</p:sld>
+</file>
+
+<file path=ppt/slides/slide15.xml><?xml version="1.0" encoding="utf-8"?>
+<p:sld xmlns:a="http://schemas.openxmlformats.org/drawingml/2006/main" xmlns:r="http://schemas.openxmlformats.org/officeDocument/2006/relationships" xmlns:p="http://schemas.openxmlformats.org/presentationml/2006/main">
+  <p:cSld>
+    <p:spTree>
+      <p:nvGrpSpPr>
+        <p:cNvPr id="1" name=""/>
+        <p:cNvGrpSpPr/>
+        <p:nvPr/>
+      </p:nvGrpSpPr>
+      <p:grpSpPr>
+        <a:xfrm>
+          <a:off x="0" y="0"/>
+          <a:ext cx="0" cy="0"/>
+          <a:chOff x="0" y="0"/>
+          <a:chExt cx="0" cy="0"/>
+        </a:xfrm>
+      </p:grpSpPr>
+      <p:sp>
+        <p:nvSpPr>
+          <p:cNvPr id="2" name="Titre 1"/>
+          <p:cNvSpPr>
+            <a:spLocks noGrp="1"/>
+          </p:cNvSpPr>
+          <p:nvPr>
+            <p:ph type="title"/>
+          </p:nvPr>
+        </p:nvSpPr>
+        <p:spPr/>
+        <p:txBody>
+          <a:bodyPr/>
+          <a:lstStyle/>
+          <a:p>
+            <a:r>
+              <a:rPr lang="fr-FR" dirty="0" err="1" smtClean="0"/>
+              <a:t>Accuracy</a:t>
+            </a:r>
+            <a:endParaRPr lang="fr-FR" dirty="0"/>
+          </a:p>
+        </p:txBody>
+      </p:sp>
+      <p:sp>
+        <p:nvSpPr>
+          <p:cNvPr id="4" name="Espace réservé du numéro de diapositive 3"/>
+          <p:cNvSpPr>
+            <a:spLocks noGrp="1"/>
+          </p:cNvSpPr>
+          <p:nvPr>
+            <p:ph type="sldNum" sz="quarter" idx="12"/>
+          </p:nvPr>
+        </p:nvSpPr>
+        <p:spPr/>
+        <p:txBody>
+          <a:bodyPr/>
+          <a:lstStyle/>
+          <a:p>
+            <a:fld id="{AB9DB7C7-3B7A-421A-AF98-AB9FC2185CD3}" type="slidenum">
+              <a:rPr lang="fr-FR" smtClean="0"/>
+              <a:pPr/>
+              <a:t>15</a:t>
             </a:fld>
             <a:endParaRPr lang="fr-FR" dirty="0"/>
           </a:p>
@@ -7795,187 +8070,69 @@
           </a:ln>
         </p:spPr>
       </p:pic>
-    </p:spTree>
-  </p:cSld>
-  <p:clrMapOvr>
-    <a:masterClrMapping/>
-  </p:clrMapOvr>
-  <p:timing>
-    <p:tnLst>
-      <p:par>
-        <p:cTn id="1" dur="indefinite" restart="never" nodeType="tmRoot"/>
-      </p:par>
-    </p:tnLst>
-  </p:timing>
-</p:sld>
-</file>
-
-<file path=ppt/slides/slide15.xml><?xml version="1.0" encoding="utf-8"?>
-<p:sld xmlns:a="http://schemas.openxmlformats.org/drawingml/2006/main" xmlns:r="http://schemas.openxmlformats.org/officeDocument/2006/relationships" xmlns:p="http://schemas.openxmlformats.org/presentationml/2006/main">
-  <p:cSld>
-    <p:spTree>
-      <p:nvGrpSpPr>
-        <p:cNvPr id="1" name=""/>
-        <p:cNvGrpSpPr/>
-        <p:nvPr/>
-      </p:nvGrpSpPr>
-      <p:grpSpPr>
-        <a:xfrm>
-          <a:off x="0" y="0"/>
-          <a:ext cx="0" cy="0"/>
-          <a:chOff x="0" y="0"/>
-          <a:chExt cx="0" cy="0"/>
-        </a:xfrm>
-      </p:grpSpPr>
-      <p:sp>
-        <p:nvSpPr>
-          <p:cNvPr id="7" name="Titre 6"/>
-          <p:cNvSpPr>
-            <a:spLocks noGrp="1"/>
-          </p:cNvSpPr>
-          <p:nvPr>
-            <p:ph type="title"/>
-          </p:nvPr>
-        </p:nvSpPr>
-        <p:spPr/>
-        <p:txBody>
-          <a:bodyPr/>
-          <a:lstStyle/>
-          <a:p>
-            <a:r>
-              <a:rPr lang="fr-FR" dirty="0" err="1" smtClean="0"/>
-              <a:t>Accuracy</a:t>
-            </a:r>
-            <a:endParaRPr lang="fr-FR" dirty="0"/>
-          </a:p>
-        </p:txBody>
-      </p:sp>
-      <p:sp>
-        <p:nvSpPr>
-          <p:cNvPr id="8" name="Espace réservé du texte 7"/>
-          <p:cNvSpPr>
-            <a:spLocks noGrp="1"/>
-          </p:cNvSpPr>
-          <p:nvPr>
-            <p:ph type="body" idx="1"/>
-          </p:nvPr>
-        </p:nvSpPr>
-        <p:spPr/>
-        <p:txBody>
-          <a:bodyPr/>
-          <a:lstStyle/>
-          <a:p>
-            <a:r>
-              <a:rPr lang="fr-FR" dirty="0" err="1" smtClean="0"/>
-              <a:t>Arrival</a:t>
-            </a:r>
-            <a:r>
-              <a:rPr lang="fr-FR" dirty="0" smtClean="0"/>
-              <a:t> </a:t>
-            </a:r>
-            <a:r>
-              <a:rPr lang="fr-FR" dirty="0" err="1" smtClean="0"/>
-              <a:t>duration</a:t>
-            </a:r>
-            <a:endParaRPr lang="fr-FR" dirty="0"/>
-          </a:p>
-        </p:txBody>
-      </p:sp>
-      <p:sp>
-        <p:nvSpPr>
-          <p:cNvPr id="10" name="Espace réservé du texte 9"/>
-          <p:cNvSpPr>
-            <a:spLocks noGrp="1"/>
-          </p:cNvSpPr>
-          <p:nvPr>
-            <p:ph type="body" sz="half" idx="3"/>
-          </p:nvPr>
-        </p:nvSpPr>
-        <p:spPr/>
-        <p:txBody>
-          <a:bodyPr/>
-          <a:lstStyle/>
-          <a:p>
-            <a:r>
-              <a:rPr lang="fr-FR" dirty="0" err="1" smtClean="0"/>
-              <a:t>Average</a:t>
-            </a:r>
-            <a:r>
-              <a:rPr lang="fr-FR" dirty="0" smtClean="0"/>
-              <a:t> </a:t>
-            </a:r>
-            <a:r>
-              <a:rPr lang="fr-FR" dirty="0" err="1" smtClean="0"/>
-              <a:t>error</a:t>
-            </a:r>
-            <a:endParaRPr lang="fr-FR" dirty="0"/>
-          </a:p>
-        </p:txBody>
-      </p:sp>
-      <p:sp>
-        <p:nvSpPr>
-          <p:cNvPr id="5" name="Espace réservé du numéro de diapositive 4"/>
-          <p:cNvSpPr>
-            <a:spLocks noGrp="1"/>
-          </p:cNvSpPr>
-          <p:nvPr>
-            <p:ph type="sldNum" sz="quarter" idx="12"/>
-          </p:nvPr>
-        </p:nvSpPr>
-        <p:spPr/>
-        <p:txBody>
-          <a:bodyPr/>
-          <a:lstStyle/>
-          <a:p>
-            <a:fld id="{AB9DB7C7-3B7A-421A-AF98-AB9FC2185CD3}" type="slidenum">
-              <a:rPr lang="fr-FR" smtClean="0"/>
-              <a:pPr/>
-              <a:t>15</a:t>
-            </a:fld>
-            <a:endParaRPr lang="fr-FR" dirty="0"/>
-          </a:p>
-        </p:txBody>
-      </p:sp>
-      <p:graphicFrame>
-        <p:nvGraphicFramePr>
-          <p:cNvPr id="12" name="Espace réservé du contenu 11"/>
-          <p:cNvGraphicFramePr>
-            <a:graphicFrameLocks noGrp="1"/>
-          </p:cNvGraphicFramePr>
-          <p:nvPr>
-            <p:ph sz="quarter" idx="2"/>
-          </p:nvPr>
-        </p:nvGraphicFramePr>
-        <p:xfrm>
-          <a:off x="457200" y="1517650"/>
-          <a:ext cx="4040188" cy="3941763"/>
-        </p:xfrm>
-        <a:graphic>
-          <a:graphicData uri="http://schemas.openxmlformats.org/drawingml/2006/chart">
-            <c:chart xmlns:c="http://schemas.openxmlformats.org/drawingml/2006/chart" xmlns:r="http://schemas.openxmlformats.org/officeDocument/2006/relationships" r:id="rId2"/>
-          </a:graphicData>
-        </a:graphic>
-      </p:graphicFrame>
-      <p:graphicFrame>
-        <p:nvGraphicFramePr>
-          <p:cNvPr id="13" name="Espace réservé du contenu 12"/>
-          <p:cNvGraphicFramePr>
-            <a:graphicFrameLocks noGrp="1"/>
-          </p:cNvGraphicFramePr>
-          <p:nvPr>
-            <p:ph sz="quarter" idx="4"/>
-          </p:nvPr>
-        </p:nvGraphicFramePr>
-        <p:xfrm>
-          <a:off x="4645025" y="1517650"/>
-          <a:ext cx="4041775" cy="3941763"/>
-        </p:xfrm>
-        <a:graphic>
-          <a:graphicData uri="http://schemas.openxmlformats.org/drawingml/2006/chart">
-            <c:chart xmlns:c="http://schemas.openxmlformats.org/drawingml/2006/chart" xmlns:r="http://schemas.openxmlformats.org/officeDocument/2006/relationships" r:id="rId3"/>
-          </a:graphicData>
-        </a:graphic>
-      </p:graphicFrame>
+      <p:sp>
+        <p:nvSpPr>
+          <p:cNvPr id="6" name="Espace réservé du contenu 2"/>
+          <p:cNvSpPr txBox="1">
+            <a:spLocks/>
+          </p:cNvSpPr>
+          <p:nvPr/>
+        </p:nvSpPr>
+        <p:spPr>
+          <a:xfrm>
+            <a:off x="457200" y="1600200"/>
+            <a:ext cx="7467600" cy="4525963"/>
+          </a:xfrm>
+          <a:prstGeom prst="rect">
+            <a:avLst/>
+          </a:prstGeom>
+        </p:spPr>
+        <p:txBody>
+          <a:bodyPr vert="horz">
+            <a:normAutofit/>
+          </a:bodyPr>
+          <a:lstStyle/>
+          <a:p>
+            <a:pPr marL="420624" marR="0" lvl="0" indent="-384048" algn="l" defTabSz="914400" rtl="0" eaLnBrk="1" fontAlgn="auto" latinLnBrk="0" hangingPunct="1">
+              <a:lnSpc>
+                <a:spcPct val="100000"/>
+              </a:lnSpc>
+              <a:spcBef>
+                <a:spcPct val="20000"/>
+              </a:spcBef>
+              <a:spcAft>
+                <a:spcPts val="0"/>
+              </a:spcAft>
+              <a:buClr>
+                <a:schemeClr val="accent1"/>
+              </a:buClr>
+              <a:buSzPct val="80000"/>
+              <a:buFont typeface="Wingdings 2"/>
+              <a:buChar char=""/>
+              <a:tabLst/>
+              <a:defRPr/>
+            </a:pPr>
+            <a:r>
+              <a:rPr lang="en-US" sz="2600" dirty="0" smtClean="0"/>
+              <a:t>Accuracy test:</a:t>
+            </a:r>
+            <a:endParaRPr kumimoji="0" lang="en-US" sz="2600" b="0" i="0" u="none" strike="noStrike" kern="1200" cap="none" spc="0" normalizeH="0" baseline="0" noProof="0" dirty="0" smtClean="0">
+              <a:ln>
+                <a:noFill/>
+              </a:ln>
+              <a:solidFill>
+                <a:schemeClr val="tx1"/>
+              </a:solidFill>
+              <a:effectLst/>
+              <a:uLnTx/>
+              <a:uFillTx/>
+              <a:latin typeface="+mn-lt"/>
+              <a:ea typeface="+mn-ea"/>
+              <a:cs typeface="+mn-cs"/>
+            </a:endParaRPr>
+          </a:p>
+        </p:txBody>
+      </p:sp>
     </p:spTree>
   </p:cSld>
   <p:clrMapOvr>
@@ -8010,7 +8167,7 @@
       </p:grpSpPr>
       <p:sp>
         <p:nvSpPr>
-          <p:cNvPr id="2" name="Titre 1"/>
+          <p:cNvPr id="7" name="Titre 6"/>
           <p:cNvSpPr>
             <a:spLocks noGrp="1"/>
           </p:cNvSpPr>
@@ -8027,28 +8184,13 @@
               <a:rPr lang="fr-FR" dirty="0" err="1" smtClean="0"/>
               <a:t>Accuracy</a:t>
             </a:r>
-            <a:endParaRPr lang="fr-FR" dirty="0"/>
-          </a:p>
-        </p:txBody>
-      </p:sp>
-      <p:sp>
-        <p:nvSpPr>
-          <p:cNvPr id="3" name="Espace réservé du texte 2"/>
-          <p:cNvSpPr>
-            <a:spLocks noGrp="1"/>
-          </p:cNvSpPr>
-          <p:nvPr>
-            <p:ph type="body" idx="1"/>
-          </p:nvPr>
-        </p:nvSpPr>
-        <p:spPr/>
-        <p:txBody>
-          <a:bodyPr/>
-          <a:lstStyle/>
-          <a:p>
+            <a:r>
+              <a:rPr lang="fr-FR" dirty="0" smtClean="0"/>
+              <a:t> : </a:t>
+            </a:r>
             <a:r>
               <a:rPr lang="fr-FR" dirty="0" err="1" smtClean="0"/>
-              <a:t>Percentage</a:t>
+              <a:t>arrival</a:t>
             </a:r>
             <a:r>
               <a:rPr lang="fr-FR" dirty="0" smtClean="0"/>
@@ -8056,7 +8198,7 @@
             </a:r>
             <a:r>
               <a:rPr lang="fr-FR" dirty="0" err="1" smtClean="0"/>
-              <a:t>error</a:t>
+              <a:t>duration</a:t>
             </a:r>
             <a:endParaRPr lang="fr-FR" dirty="0"/>
           </a:p>
@@ -8064,42 +8206,7 @@
       </p:sp>
       <p:sp>
         <p:nvSpPr>
-          <p:cNvPr id="4" name="Espace réservé du texte 3"/>
-          <p:cNvSpPr>
-            <a:spLocks noGrp="1"/>
-          </p:cNvSpPr>
-          <p:nvPr>
-            <p:ph type="body" sz="half" idx="3"/>
-          </p:nvPr>
-        </p:nvSpPr>
-        <p:spPr/>
-        <p:txBody>
-          <a:bodyPr/>
-          <a:lstStyle/>
-          <a:p>
-            <a:r>
-              <a:rPr lang="fr-FR" dirty="0" smtClean="0"/>
-              <a:t>Distance </a:t>
-            </a:r>
-            <a:r>
-              <a:rPr lang="fr-FR" dirty="0" err="1" smtClean="0"/>
-              <a:t>moved</a:t>
-            </a:r>
-            <a:r>
-              <a:rPr lang="fr-FR" dirty="0" smtClean="0"/>
-              <a:t> in </a:t>
-            </a:r>
-            <a:r>
-              <a:rPr lang="fr-FR" dirty="0" err="1" smtClean="0"/>
-              <a:t>rest</a:t>
-            </a:r>
-            <a:endParaRPr lang="fr-FR" dirty="0"/>
-          </a:p>
-        </p:txBody>
-      </p:sp>
-      <p:sp>
-        <p:nvSpPr>
-          <p:cNvPr id="7" name="Espace réservé du numéro de diapositive 6"/>
+          <p:cNvPr id="5" name="Espace réservé du numéro de diapositive 4"/>
           <p:cNvSpPr>
             <a:spLocks noGrp="1"/>
           </p:cNvSpPr>
@@ -8123,17 +8230,17 @@
       </p:sp>
       <p:graphicFrame>
         <p:nvGraphicFramePr>
-          <p:cNvPr id="8" name="Espace réservé du contenu 7"/>
+          <p:cNvPr id="16" name="Espace réservé du contenu 11"/>
           <p:cNvGraphicFramePr>
             <a:graphicFrameLocks noGrp="1"/>
           </p:cNvGraphicFramePr>
           <p:nvPr>
-            <p:ph sz="quarter" idx="2"/>
+            <p:ph idx="1"/>
           </p:nvPr>
         </p:nvGraphicFramePr>
         <p:xfrm>
-          <a:off x="457200" y="1517650"/>
-          <a:ext cx="4040188" cy="3941763"/>
+          <a:off x="457200" y="1600200"/>
+          <a:ext cx="7467600" cy="4525963"/>
         </p:xfrm>
         <a:graphic>
           <a:graphicData uri="http://schemas.openxmlformats.org/drawingml/2006/chart">
@@ -8141,26 +8248,74 @@
           </a:graphicData>
         </a:graphic>
       </p:graphicFrame>
-      <p:graphicFrame>
-        <p:nvGraphicFramePr>
-          <p:cNvPr id="9" name="Espace réservé du contenu 8"/>
-          <p:cNvGraphicFramePr>
-            <a:graphicFrameLocks noGrp="1"/>
-          </p:cNvGraphicFramePr>
-          <p:nvPr>
-            <p:ph sz="quarter" idx="4"/>
-          </p:nvPr>
-        </p:nvGraphicFramePr>
-        <p:xfrm>
-          <a:off x="4645025" y="1517650"/>
-          <a:ext cx="4041775" cy="3941763"/>
-        </p:xfrm>
-        <a:graphic>
-          <a:graphicData uri="http://schemas.openxmlformats.org/drawingml/2006/chart">
-            <c:chart xmlns:c="http://schemas.openxmlformats.org/drawingml/2006/chart" xmlns:r="http://schemas.openxmlformats.org/officeDocument/2006/relationships" r:id="rId3"/>
-          </a:graphicData>
-        </a:graphic>
-      </p:graphicFrame>
+      <p:sp>
+        <p:nvSpPr>
+          <p:cNvPr id="17" name="ZoneTexte 16"/>
+          <p:cNvSpPr txBox="1"/>
+          <p:nvPr/>
+        </p:nvSpPr>
+        <p:spPr>
+          <a:xfrm>
+            <a:off x="1619672" y="6381328"/>
+            <a:ext cx="3888432" cy="369332"/>
+          </a:xfrm>
+          <a:prstGeom prst="rect">
+            <a:avLst/>
+          </a:prstGeom>
+          <a:noFill/>
+        </p:spPr>
+        <p:txBody>
+          <a:bodyPr wrap="square" rtlCol="0">
+            <a:spAutoFit/>
+          </a:bodyPr>
+          <a:lstStyle/>
+          <a:p>
+            <a:r>
+              <a:rPr lang="fr-FR" dirty="0" err="1" smtClean="0"/>
+              <a:t>Diameter</a:t>
+            </a:r>
+            <a:r>
+              <a:rPr lang="fr-FR" dirty="0" smtClean="0"/>
+              <a:t> of the </a:t>
+            </a:r>
+            <a:r>
+              <a:rPr lang="fr-FR" dirty="0" err="1" smtClean="0"/>
+              <a:t>target</a:t>
+            </a:r>
+            <a:endParaRPr lang="fr-FR" dirty="0"/>
+          </a:p>
+        </p:txBody>
+      </p:sp>
+      <p:sp>
+        <p:nvSpPr>
+          <p:cNvPr id="18" name="ZoneTexte 17"/>
+          <p:cNvSpPr txBox="1"/>
+          <p:nvPr/>
+        </p:nvSpPr>
+        <p:spPr>
+          <a:xfrm>
+            <a:off x="0" y="1700808"/>
+            <a:ext cx="461665" cy="2592288"/>
+          </a:xfrm>
+          <a:prstGeom prst="rect">
+            <a:avLst/>
+          </a:prstGeom>
+          <a:noFill/>
+        </p:spPr>
+        <p:txBody>
+          <a:bodyPr vert="eaVert" wrap="square" rtlCol="0">
+            <a:spAutoFit/>
+          </a:bodyPr>
+          <a:lstStyle/>
+          <a:p>
+            <a:r>
+              <a:rPr lang="fr-FR" dirty="0" smtClean="0"/>
+              <a:t>Time in Seconds</a:t>
+            </a:r>
+            <a:endParaRPr lang="fr-FR" dirty="0"/>
+          </a:p>
+        </p:txBody>
+      </p:sp>
     </p:spTree>
   </p:cSld>
   <p:clrMapOvr>
@@ -8195,7 +8350,7 @@
       </p:grpSpPr>
       <p:sp>
         <p:nvSpPr>
-          <p:cNvPr id="2" name="Titre 1"/>
+          <p:cNvPr id="8" name="Titre 7"/>
           <p:cNvSpPr>
             <a:spLocks noGrp="1"/>
           </p:cNvSpPr>
@@ -8209,90 +8364,16 @@
           <a:lstStyle/>
           <a:p>
             <a:r>
+              <a:rPr lang="fr-FR" dirty="0" err="1" smtClean="0"/>
+              <a:t>Accuracy</a:t>
+            </a:r>
+            <a:r>
               <a:rPr lang="fr-FR" dirty="0" smtClean="0"/>
-              <a:t>Speed </a:t>
+              <a:t>: </a:t>
             </a:r>
             <a:r>
               <a:rPr lang="fr-FR" dirty="0" err="1" smtClean="0"/>
-              <a:t>processing</a:t>
-            </a:r>
-            <a:endParaRPr lang="fr-FR" dirty="0"/>
-          </a:p>
-        </p:txBody>
-      </p:sp>
-      <p:sp>
-        <p:nvSpPr>
-          <p:cNvPr id="10" name="Espace réservé du contenu 9"/>
-          <p:cNvSpPr>
-            <a:spLocks noGrp="1"/>
-          </p:cNvSpPr>
-          <p:nvPr>
-            <p:ph idx="1"/>
-          </p:nvPr>
-        </p:nvSpPr>
-        <p:spPr>
-          <a:xfrm>
-            <a:off x="467544" y="1484784"/>
-            <a:ext cx="7467600" cy="4525963"/>
-          </a:xfrm>
-        </p:spPr>
-        <p:txBody>
-          <a:bodyPr/>
-          <a:lstStyle/>
-          <a:p>
-            <a:pPr lvl="0"/>
-            <a:r>
-              <a:rPr lang="fr-FR" dirty="0" smtClean="0"/>
-              <a:t>PC1(Karim) </a:t>
-            </a:r>
-            <a:r>
-              <a:rPr lang="fr-FR" dirty="0" err="1" smtClean="0"/>
-              <a:t>Core</a:t>
-            </a:r>
-            <a:r>
-              <a:rPr lang="fr-FR" dirty="0" smtClean="0"/>
-              <a:t> i7 2 </a:t>
-            </a:r>
-            <a:r>
-              <a:rPr lang="fr-FR" dirty="0" err="1" smtClean="0"/>
-              <a:t>Ghz</a:t>
-            </a:r>
-            <a:endParaRPr lang="fr-FR" dirty="0" smtClean="0"/>
-          </a:p>
-          <a:p>
-            <a:pPr lvl="0">
-              <a:buNone/>
-            </a:pPr>
-            <a:r>
-              <a:rPr lang="fr-FR" dirty="0" smtClean="0"/>
-              <a:t>	</a:t>
-            </a:r>
-            <a:r>
-              <a:rPr lang="fr-FR" dirty="0" err="1" smtClean="0"/>
-              <a:t>Radeon</a:t>
-            </a:r>
-            <a:r>
-              <a:rPr lang="fr-FR" dirty="0" smtClean="0"/>
-              <a:t> HD 4650</a:t>
-            </a:r>
-          </a:p>
-          <a:p>
-            <a:pPr lvl="0"/>
-            <a:r>
-              <a:rPr lang="fr-FR" dirty="0" smtClean="0"/>
-              <a:t>PC 2 (Kevin) </a:t>
-            </a:r>
-            <a:r>
-              <a:rPr lang="fr-FR" dirty="0" err="1" smtClean="0"/>
-              <a:t>Core</a:t>
-            </a:r>
-            <a:r>
-              <a:rPr lang="fr-FR" dirty="0" smtClean="0"/>
-              <a:t> 2 Duo 2,13 </a:t>
-            </a:r>
-            <a:r>
-              <a:rPr lang="fr-FR" dirty="0" err="1" smtClean="0"/>
-              <a:t>Ghz</a:t>
+              <a:t>average</a:t>
             </a:r>
             <a:r>
               <a:rPr lang="fr-FR" dirty="0" smtClean="0"/>
@@ -8300,14 +8381,8 @@
             </a:r>
             <a:r>
               <a:rPr lang="fr-FR" dirty="0" err="1" smtClean="0"/>
-              <a:t>Radeon</a:t>
-            </a:r>
-            <a:r>
-              <a:rPr lang="fr-FR" dirty="0" smtClean="0"/>
-              <a:t> HD 4530</a:t>
-            </a:r>
-          </a:p>
-          <a:p>
+              <a:t>error</a:t>
+            </a:r>
             <a:endParaRPr lang="fr-FR" dirty="0"/>
           </a:p>
         </p:txBody>
@@ -8338,13 +8413,125 @@
       </p:sp>
       <p:graphicFrame>
         <p:nvGraphicFramePr>
-          <p:cNvPr id="11" name="Graphique 10"/>
-          <p:cNvGraphicFramePr/>
-          <p:nvPr/>
+          <p:cNvPr id="10" name="Espace réservé du contenu 12"/>
+          <p:cNvGraphicFramePr>
+            <a:graphicFrameLocks noGrp="1"/>
+          </p:cNvGraphicFramePr>
+          <p:nvPr>
+            <p:ph idx="1"/>
+          </p:nvPr>
         </p:nvGraphicFramePr>
         <p:xfrm>
-          <a:off x="1835696" y="3645024"/>
-          <a:ext cx="5328592" cy="2880320"/>
+          <a:off x="457200" y="1600200"/>
+          <a:ext cx="7467600" cy="4525963"/>
+        </p:xfrm>
+        <a:graphic>
+          <a:graphicData uri="http://schemas.openxmlformats.org/drawingml/2006/chart">
+            <c:chart xmlns:c="http://schemas.openxmlformats.org/drawingml/2006/chart" xmlns:r="http://schemas.openxmlformats.org/officeDocument/2006/relationships" r:id="rId2"/>
+          </a:graphicData>
+        </a:graphic>
+      </p:graphicFrame>
+    </p:spTree>
+  </p:cSld>
+  <p:clrMapOvr>
+    <a:masterClrMapping/>
+  </p:clrMapOvr>
+</p:sld>
+</file>
+
+<file path=ppt/slides/slide18.xml><?xml version="1.0" encoding="utf-8"?>
+<p:sld xmlns:a="http://schemas.openxmlformats.org/drawingml/2006/main" xmlns:r="http://schemas.openxmlformats.org/officeDocument/2006/relationships" xmlns:p="http://schemas.openxmlformats.org/presentationml/2006/main">
+  <p:cSld>
+    <p:spTree>
+      <p:nvGrpSpPr>
+        <p:cNvPr id="1" name=""/>
+        <p:cNvGrpSpPr/>
+        <p:nvPr/>
+      </p:nvGrpSpPr>
+      <p:grpSpPr>
+        <a:xfrm>
+          <a:off x="0" y="0"/>
+          <a:ext cx="0" cy="0"/>
+          <a:chOff x="0" y="0"/>
+          <a:chExt cx="0" cy="0"/>
+        </a:xfrm>
+      </p:grpSpPr>
+      <p:sp>
+        <p:nvSpPr>
+          <p:cNvPr id="2" name="Titre 1"/>
+          <p:cNvSpPr>
+            <a:spLocks noGrp="1"/>
+          </p:cNvSpPr>
+          <p:nvPr>
+            <p:ph type="title"/>
+          </p:nvPr>
+        </p:nvSpPr>
+        <p:spPr/>
+        <p:txBody>
+          <a:bodyPr/>
+          <a:lstStyle/>
+          <a:p>
+            <a:r>
+              <a:rPr lang="fr-FR" dirty="0" err="1" smtClean="0"/>
+              <a:t>Accuracy</a:t>
+            </a:r>
+            <a:r>
+              <a:rPr lang="fr-FR" dirty="0" smtClean="0"/>
+              <a:t>: </a:t>
+            </a:r>
+            <a:r>
+              <a:rPr lang="fr-FR" dirty="0" err="1" smtClean="0"/>
+              <a:t>percentage</a:t>
+            </a:r>
+            <a:r>
+              <a:rPr lang="fr-FR" dirty="0" smtClean="0"/>
+              <a:t> </a:t>
+            </a:r>
+            <a:r>
+              <a:rPr lang="fr-FR" dirty="0" err="1" smtClean="0"/>
+              <a:t>error</a:t>
+            </a:r>
+            <a:endParaRPr lang="fr-FR" dirty="0"/>
+          </a:p>
+        </p:txBody>
+      </p:sp>
+      <p:sp>
+        <p:nvSpPr>
+          <p:cNvPr id="7" name="Espace réservé du numéro de diapositive 6"/>
+          <p:cNvSpPr>
+            <a:spLocks noGrp="1"/>
+          </p:cNvSpPr>
+          <p:nvPr>
+            <p:ph type="sldNum" sz="quarter" idx="12"/>
+          </p:nvPr>
+        </p:nvSpPr>
+        <p:spPr/>
+        <p:txBody>
+          <a:bodyPr/>
+          <a:lstStyle/>
+          <a:p>
+            <a:fld id="{AB9DB7C7-3B7A-421A-AF98-AB9FC2185CD3}" type="slidenum">
+              <a:rPr lang="fr-FR" smtClean="0"/>
+              <a:pPr/>
+              <a:t>18</a:t>
+            </a:fld>
+            <a:endParaRPr lang="fr-FR" dirty="0"/>
+          </a:p>
+        </p:txBody>
+      </p:sp>
+      <p:graphicFrame>
+        <p:nvGraphicFramePr>
+          <p:cNvPr id="15" name="Espace réservé du contenu 7"/>
+          <p:cNvGraphicFramePr>
+            <a:graphicFrameLocks noGrp="1"/>
+          </p:cNvGraphicFramePr>
+          <p:nvPr>
+            <p:ph idx="1"/>
+          </p:nvPr>
+        </p:nvGraphicFramePr>
+        <p:xfrm>
+          <a:off x="457200" y="1600200"/>
+          <a:ext cx="7467600" cy="4525963"/>
         </p:xfrm>
         <a:graphic>
           <a:graphicData uri="http://schemas.openxmlformats.org/drawingml/2006/chart">
@@ -8367,7 +8554,7 @@
 </p:sld>
 </file>
 
-<file path=ppt/slides/slide18.xml><?xml version="1.0" encoding="utf-8"?>
+<file path=ppt/slides/slide19.xml><?xml version="1.0" encoding="utf-8"?>
 <p:sld xmlns:a="http://schemas.openxmlformats.org/drawingml/2006/main" xmlns:r="http://schemas.openxmlformats.org/officeDocument/2006/relationships" xmlns:p="http://schemas.openxmlformats.org/presentationml/2006/main">
   <p:cSld>
     <p:spTree>
@@ -8386,7 +8573,7 @@
       </p:grpSpPr>
       <p:sp>
         <p:nvSpPr>
-          <p:cNvPr id="2" name="Titre 1"/>
+          <p:cNvPr id="8" name="Titre 7"/>
           <p:cNvSpPr>
             <a:spLocks noGrp="1"/>
           </p:cNvSpPr>
@@ -8400,16 +8587,16 @@
           <a:lstStyle/>
           <a:p>
             <a:r>
+              <a:rPr lang="fr-FR" dirty="0" err="1" smtClean="0"/>
+              <a:t>Accuracy</a:t>
+            </a:r>
+            <a:r>
               <a:rPr lang="fr-FR" dirty="0" smtClean="0"/>
-              <a:t>Input </a:t>
+              <a:t>: </a:t>
             </a:r>
             <a:r>
               <a:rPr lang="fr-FR" dirty="0" err="1" smtClean="0"/>
-              <a:t>word</a:t>
-            </a:r>
-            <a:r>
-              <a:rPr lang="fr-FR" dirty="0" smtClean="0"/>
-              <a:t> speed</a:t>
+              <a:t>stability</a:t>
             </a:r>
             <a:endParaRPr lang="fr-FR" dirty="0"/>
           </a:p>
@@ -8417,57 +8604,7 @@
       </p:sp>
       <p:sp>
         <p:nvSpPr>
-          <p:cNvPr id="5" name="Espace réservé du texte 4"/>
-          <p:cNvSpPr>
-            <a:spLocks noGrp="1"/>
-          </p:cNvSpPr>
-          <p:nvPr>
-            <p:ph type="body" idx="1"/>
-          </p:nvPr>
-        </p:nvSpPr>
-        <p:spPr/>
-        <p:txBody>
-          <a:bodyPr/>
-          <a:lstStyle/>
-          <a:p>
-            <a:r>
-              <a:rPr lang="fr-FR" dirty="0" err="1" smtClean="0"/>
-              <a:t>Circular</a:t>
-            </a:r>
-            <a:r>
-              <a:rPr lang="fr-FR" dirty="0" smtClean="0"/>
-              <a:t> Keyboard</a:t>
-            </a:r>
-            <a:endParaRPr lang="fr-FR" dirty="0"/>
-          </a:p>
-        </p:txBody>
-      </p:sp>
-      <p:sp>
-        <p:nvSpPr>
-          <p:cNvPr id="7" name="Espace réservé du texte 6"/>
-          <p:cNvSpPr>
-            <a:spLocks noGrp="1"/>
-          </p:cNvSpPr>
-          <p:nvPr>
-            <p:ph type="body" sz="half" idx="3"/>
-          </p:nvPr>
-        </p:nvSpPr>
-        <p:spPr/>
-        <p:txBody>
-          <a:bodyPr/>
-          <a:lstStyle/>
-          <a:p>
-            <a:r>
-              <a:rPr lang="fr-FR" dirty="0" smtClean="0"/>
-              <a:t>T9 Keyboard</a:t>
-            </a:r>
-            <a:endParaRPr lang="fr-FR" dirty="0"/>
-          </a:p>
-        </p:txBody>
-      </p:sp>
-      <p:sp>
-        <p:nvSpPr>
-          <p:cNvPr id="4" name="Espace réservé du numéro de diapositive 3"/>
+          <p:cNvPr id="7" name="Espace réservé du numéro de diapositive 6"/>
           <p:cNvSpPr>
             <a:spLocks noGrp="1"/>
           </p:cNvSpPr>
@@ -8483,7 +8620,551 @@
             <a:fld id="{AB9DB7C7-3B7A-421A-AF98-AB9FC2185CD3}" type="slidenum">
               <a:rPr lang="fr-FR" smtClean="0"/>
               <a:pPr/>
-              <a:t>18</a:t>
+              <a:t>19</a:t>
+            </a:fld>
+            <a:endParaRPr lang="fr-FR" dirty="0"/>
+          </a:p>
+        </p:txBody>
+      </p:sp>
+      <p:graphicFrame>
+        <p:nvGraphicFramePr>
+          <p:cNvPr id="10" name="Espace réservé du contenu 8"/>
+          <p:cNvGraphicFramePr>
+            <a:graphicFrameLocks noGrp="1"/>
+          </p:cNvGraphicFramePr>
+          <p:nvPr>
+            <p:ph idx="1"/>
+          </p:nvPr>
+        </p:nvGraphicFramePr>
+        <p:xfrm>
+          <a:off x="457200" y="1600200"/>
+          <a:ext cx="7467600" cy="4525963"/>
+        </p:xfrm>
+        <a:graphic>
+          <a:graphicData uri="http://schemas.openxmlformats.org/drawingml/2006/chart">
+            <c:chart xmlns:c="http://schemas.openxmlformats.org/drawingml/2006/chart" xmlns:r="http://schemas.openxmlformats.org/officeDocument/2006/relationships" r:id="rId2"/>
+          </a:graphicData>
+        </a:graphic>
+      </p:graphicFrame>
+    </p:spTree>
+  </p:cSld>
+  <p:clrMapOvr>
+    <a:masterClrMapping/>
+  </p:clrMapOvr>
+</p:sld>
+</file>
+
+<file path=ppt/slides/slide2.xml><?xml version="1.0" encoding="utf-8"?>
+<p:sld xmlns:a="http://schemas.openxmlformats.org/drawingml/2006/main" xmlns:r="http://schemas.openxmlformats.org/officeDocument/2006/relationships" xmlns:p="http://schemas.openxmlformats.org/presentationml/2006/main">
+  <p:cSld>
+    <p:spTree>
+      <p:nvGrpSpPr>
+        <p:cNvPr id="1" name=""/>
+        <p:cNvGrpSpPr/>
+        <p:nvPr/>
+      </p:nvGrpSpPr>
+      <p:grpSpPr>
+        <a:xfrm>
+          <a:off x="0" y="0"/>
+          <a:ext cx="0" cy="0"/>
+          <a:chOff x="0" y="0"/>
+          <a:chExt cx="0" cy="0"/>
+        </a:xfrm>
+      </p:grpSpPr>
+      <p:sp>
+        <p:nvSpPr>
+          <p:cNvPr id="2" name="Titre 1"/>
+          <p:cNvSpPr>
+            <a:spLocks noGrp="1"/>
+          </p:cNvSpPr>
+          <p:nvPr>
+            <p:ph type="title"/>
+          </p:nvPr>
+        </p:nvSpPr>
+        <p:spPr/>
+        <p:txBody>
+          <a:bodyPr/>
+          <a:lstStyle/>
+          <a:p>
+            <a:r>
+              <a:rPr lang="en-US" dirty="0" smtClean="0"/>
+              <a:t>Summary</a:t>
+            </a:r>
+            <a:endParaRPr lang="en-US" dirty="0"/>
+          </a:p>
+        </p:txBody>
+      </p:sp>
+      <p:sp>
+        <p:nvSpPr>
+          <p:cNvPr id="3" name="Espace réservé du contenu 2"/>
+          <p:cNvSpPr>
+            <a:spLocks noGrp="1"/>
+          </p:cNvSpPr>
+          <p:nvPr>
+            <p:ph idx="1"/>
+          </p:nvPr>
+        </p:nvSpPr>
+        <p:spPr/>
+        <p:txBody>
+          <a:bodyPr/>
+          <a:lstStyle/>
+          <a:p>
+            <a:r>
+              <a:rPr lang="en-US" dirty="0" smtClean="0"/>
+              <a:t>Motivations</a:t>
+            </a:r>
+          </a:p>
+          <a:p>
+            <a:r>
+              <a:rPr lang="en-US" dirty="0" smtClean="0"/>
+              <a:t>Background</a:t>
+            </a:r>
+          </a:p>
+          <a:p>
+            <a:r>
+              <a:rPr lang="en-US" dirty="0" smtClean="0"/>
+              <a:t>Objectives</a:t>
+            </a:r>
+          </a:p>
+          <a:p>
+            <a:r>
+              <a:rPr lang="en-US" dirty="0" smtClean="0"/>
+              <a:t>Solution</a:t>
+            </a:r>
+          </a:p>
+          <a:p>
+            <a:r>
+              <a:rPr lang="en-US" dirty="0" smtClean="0"/>
+              <a:t>Theory/Technical</a:t>
+            </a:r>
+          </a:p>
+          <a:p>
+            <a:r>
+              <a:rPr lang="en-US" dirty="0" smtClean="0"/>
+              <a:t>Evaluation</a:t>
+            </a:r>
+          </a:p>
+          <a:p>
+            <a:r>
+              <a:rPr lang="en-US" dirty="0" smtClean="0"/>
+              <a:t>Results</a:t>
+            </a:r>
+          </a:p>
+          <a:p>
+            <a:r>
+              <a:rPr lang="en-US" dirty="0" smtClean="0"/>
+              <a:t>Conclusion</a:t>
+            </a:r>
+          </a:p>
+        </p:txBody>
+      </p:sp>
+      <p:sp>
+        <p:nvSpPr>
+          <p:cNvPr id="4" name="Espace réservé du numéro de diapositive 3"/>
+          <p:cNvSpPr>
+            <a:spLocks noGrp="1"/>
+          </p:cNvSpPr>
+          <p:nvPr>
+            <p:ph type="sldNum" sz="quarter" idx="12"/>
+          </p:nvPr>
+        </p:nvSpPr>
+        <p:spPr/>
+        <p:txBody>
+          <a:bodyPr/>
+          <a:lstStyle/>
+          <a:p>
+            <a:fld id="{AB9DB7C7-3B7A-421A-AF98-AB9FC2185CD3}" type="slidenum">
+              <a:rPr lang="fr-FR" smtClean="0"/>
+              <a:pPr/>
+              <a:t>2</a:t>
+            </a:fld>
+            <a:endParaRPr lang="fr-FR" dirty="0"/>
+          </a:p>
+        </p:txBody>
+      </p:sp>
+    </p:spTree>
+  </p:cSld>
+  <p:clrMapOvr>
+    <a:masterClrMapping/>
+  </p:clrMapOvr>
+  <p:timing>
+    <p:tnLst>
+      <p:par>
+        <p:cTn id="1" dur="indefinite" restart="never" nodeType="tmRoot"/>
+      </p:par>
+    </p:tnLst>
+  </p:timing>
+</p:sld>
+</file>
+
+<file path=ppt/slides/slide20.xml><?xml version="1.0" encoding="utf-8"?>
+<p:sld xmlns:a="http://schemas.openxmlformats.org/drawingml/2006/main" xmlns:r="http://schemas.openxmlformats.org/officeDocument/2006/relationships" xmlns:p="http://schemas.openxmlformats.org/presentationml/2006/main">
+  <p:cSld>
+    <p:spTree>
+      <p:nvGrpSpPr>
+        <p:cNvPr id="1" name=""/>
+        <p:cNvGrpSpPr/>
+        <p:nvPr/>
+      </p:nvGrpSpPr>
+      <p:grpSpPr>
+        <a:xfrm>
+          <a:off x="0" y="0"/>
+          <a:ext cx="0" cy="0"/>
+          <a:chOff x="0" y="0"/>
+          <a:chExt cx="0" cy="0"/>
+        </a:xfrm>
+      </p:grpSpPr>
+      <p:sp>
+        <p:nvSpPr>
+          <p:cNvPr id="2" name="Titre 1"/>
+          <p:cNvSpPr>
+            <a:spLocks noGrp="1"/>
+          </p:cNvSpPr>
+          <p:nvPr>
+            <p:ph type="title"/>
+          </p:nvPr>
+        </p:nvSpPr>
+        <p:spPr/>
+        <p:txBody>
+          <a:bodyPr/>
+          <a:lstStyle/>
+          <a:p>
+            <a:r>
+              <a:rPr lang="fr-FR" dirty="0" smtClean="0"/>
+              <a:t>Speed </a:t>
+            </a:r>
+            <a:r>
+              <a:rPr lang="fr-FR" dirty="0" err="1" smtClean="0"/>
+              <a:t>processing</a:t>
+            </a:r>
+            <a:endParaRPr lang="fr-FR" dirty="0"/>
+          </a:p>
+        </p:txBody>
+      </p:sp>
+      <p:sp>
+        <p:nvSpPr>
+          <p:cNvPr id="10" name="Espace réservé du contenu 9"/>
+          <p:cNvSpPr>
+            <a:spLocks noGrp="1"/>
+          </p:cNvSpPr>
+          <p:nvPr>
+            <p:ph idx="1"/>
+          </p:nvPr>
+        </p:nvSpPr>
+        <p:spPr>
+          <a:xfrm>
+            <a:off x="467544" y="1484784"/>
+            <a:ext cx="7467600" cy="4525963"/>
+          </a:xfrm>
+        </p:spPr>
+        <p:txBody>
+          <a:bodyPr/>
+          <a:lstStyle/>
+          <a:p>
+            <a:pPr lvl="0"/>
+            <a:r>
+              <a:rPr lang="fr-FR" dirty="0" smtClean="0"/>
+              <a:t>PC1Core </a:t>
+            </a:r>
+            <a:r>
+              <a:rPr lang="fr-FR" dirty="0" smtClean="0"/>
+              <a:t>i7 2 </a:t>
+            </a:r>
+            <a:r>
+              <a:rPr lang="fr-FR" dirty="0" err="1" smtClean="0"/>
+              <a:t>Ghz</a:t>
+            </a:r>
+            <a:r>
+              <a:rPr lang="fr-FR" dirty="0" smtClean="0"/>
+              <a:t>	</a:t>
+            </a:r>
+            <a:r>
+              <a:rPr lang="fr-FR" dirty="0" err="1" smtClean="0"/>
+              <a:t>Radeon</a:t>
+            </a:r>
+            <a:r>
+              <a:rPr lang="fr-FR" dirty="0" smtClean="0"/>
+              <a:t> HD 4650</a:t>
+            </a:r>
+          </a:p>
+          <a:p>
+            <a:pPr lvl="0"/>
+            <a:r>
+              <a:rPr lang="fr-FR" dirty="0" smtClean="0"/>
+              <a:t>PC </a:t>
+            </a:r>
+            <a:r>
+              <a:rPr lang="fr-FR" dirty="0" smtClean="0"/>
+              <a:t>2 </a:t>
+            </a:r>
+            <a:r>
+              <a:rPr lang="fr-FR" dirty="0" err="1" smtClean="0"/>
+              <a:t>Core</a:t>
+            </a:r>
+            <a:r>
+              <a:rPr lang="fr-FR" dirty="0" smtClean="0"/>
+              <a:t> 2 Duo 2,13 </a:t>
+            </a:r>
+            <a:r>
+              <a:rPr lang="fr-FR" dirty="0" err="1" smtClean="0"/>
+              <a:t>Ghz</a:t>
+            </a:r>
+            <a:r>
+              <a:rPr lang="fr-FR" dirty="0" smtClean="0"/>
+              <a:t> </a:t>
+            </a:r>
+            <a:r>
+              <a:rPr lang="fr-FR" dirty="0" err="1" smtClean="0"/>
+              <a:t>Radeon</a:t>
+            </a:r>
+            <a:r>
+              <a:rPr lang="fr-FR" dirty="0" smtClean="0"/>
+              <a:t> HD 4530</a:t>
+            </a:r>
+          </a:p>
+          <a:p>
+            <a:endParaRPr lang="fr-FR" dirty="0"/>
+          </a:p>
+        </p:txBody>
+      </p:sp>
+      <p:sp>
+        <p:nvSpPr>
+          <p:cNvPr id="7" name="Espace réservé du numéro de diapositive 6"/>
+          <p:cNvSpPr>
+            <a:spLocks noGrp="1"/>
+          </p:cNvSpPr>
+          <p:nvPr>
+            <p:ph type="sldNum" sz="quarter" idx="12"/>
+          </p:nvPr>
+        </p:nvSpPr>
+        <p:spPr/>
+        <p:txBody>
+          <a:bodyPr/>
+          <a:lstStyle/>
+          <a:p>
+            <a:fld id="{AB9DB7C7-3B7A-421A-AF98-AB9FC2185CD3}" type="slidenum">
+              <a:rPr lang="fr-FR" smtClean="0"/>
+              <a:pPr/>
+              <a:t>20</a:t>
+            </a:fld>
+            <a:endParaRPr lang="fr-FR" dirty="0"/>
+          </a:p>
+        </p:txBody>
+      </p:sp>
+      <p:graphicFrame>
+        <p:nvGraphicFramePr>
+          <p:cNvPr id="11" name="Graphique 10"/>
+          <p:cNvGraphicFramePr/>
+          <p:nvPr/>
+        </p:nvGraphicFramePr>
+        <p:xfrm>
+          <a:off x="1331640" y="3140968"/>
+          <a:ext cx="5832648" cy="3384376"/>
+        </p:xfrm>
+        <a:graphic>
+          <a:graphicData uri="http://schemas.openxmlformats.org/drawingml/2006/chart">
+            <c:chart xmlns:c="http://schemas.openxmlformats.org/drawingml/2006/chart" xmlns:r="http://schemas.openxmlformats.org/officeDocument/2006/relationships" r:id="rId2"/>
+          </a:graphicData>
+        </a:graphic>
+      </p:graphicFrame>
+      <p:cxnSp>
+        <p:nvCxnSpPr>
+          <p:cNvPr id="8" name="Connecteur droit 7"/>
+          <p:cNvCxnSpPr/>
+          <p:nvPr/>
+        </p:nvCxnSpPr>
+        <p:spPr>
+          <a:xfrm>
+            <a:off x="1475656" y="5013176"/>
+            <a:ext cx="4392488" cy="0"/>
+          </a:xfrm>
+          <a:prstGeom prst="line">
+            <a:avLst/>
+          </a:prstGeom>
+        </p:spPr>
+        <p:style>
+          <a:lnRef idx="1">
+            <a:schemeClr val="accent1"/>
+          </a:lnRef>
+          <a:fillRef idx="0">
+            <a:schemeClr val="accent1"/>
+          </a:fillRef>
+          <a:effectRef idx="0">
+            <a:schemeClr val="accent1"/>
+          </a:effectRef>
+          <a:fontRef idx="minor">
+            <a:schemeClr val="tx1"/>
+          </a:fontRef>
+        </p:style>
+      </p:cxnSp>
+      <p:sp>
+        <p:nvSpPr>
+          <p:cNvPr id="9" name="ZoneTexte 8"/>
+          <p:cNvSpPr txBox="1"/>
+          <p:nvPr/>
+        </p:nvSpPr>
+        <p:spPr>
+          <a:xfrm>
+            <a:off x="323528" y="4653136"/>
+            <a:ext cx="1152128" cy="646331"/>
+          </a:xfrm>
+          <a:prstGeom prst="rect">
+            <a:avLst/>
+          </a:prstGeom>
+          <a:noFill/>
+        </p:spPr>
+        <p:txBody>
+          <a:bodyPr wrap="square" rtlCol="0">
+            <a:spAutoFit/>
+          </a:bodyPr>
+          <a:lstStyle/>
+          <a:p>
+            <a:r>
+              <a:rPr lang="fr-FR" dirty="0" smtClean="0"/>
+              <a:t>30 </a:t>
+            </a:r>
+            <a:r>
+              <a:rPr lang="fr-FR" dirty="0" err="1" smtClean="0"/>
+              <a:t>fps</a:t>
+            </a:r>
+            <a:r>
+              <a:rPr lang="fr-FR" dirty="0" smtClean="0"/>
+              <a:t> Kinect</a:t>
+            </a:r>
+            <a:endParaRPr lang="fr-FR" dirty="0"/>
+          </a:p>
+        </p:txBody>
+      </p:sp>
+    </p:spTree>
+  </p:cSld>
+  <p:clrMapOvr>
+    <a:masterClrMapping/>
+  </p:clrMapOvr>
+  <p:timing>
+    <p:tnLst>
+      <p:par>
+        <p:cTn id="1" dur="indefinite" restart="never" nodeType="tmRoot"/>
+      </p:par>
+    </p:tnLst>
+  </p:timing>
+</p:sld>
+</file>
+
+<file path=ppt/slides/slide21.xml><?xml version="1.0" encoding="utf-8"?>
+<p:sld xmlns:a="http://schemas.openxmlformats.org/drawingml/2006/main" xmlns:r="http://schemas.openxmlformats.org/officeDocument/2006/relationships" xmlns:p="http://schemas.openxmlformats.org/presentationml/2006/main">
+  <p:cSld>
+    <p:spTree>
+      <p:nvGrpSpPr>
+        <p:cNvPr id="1" name=""/>
+        <p:cNvGrpSpPr/>
+        <p:nvPr/>
+      </p:nvGrpSpPr>
+      <p:grpSpPr>
+        <a:xfrm>
+          <a:off x="0" y="0"/>
+          <a:ext cx="0" cy="0"/>
+          <a:chOff x="0" y="0"/>
+          <a:chExt cx="0" cy="0"/>
+        </a:xfrm>
+      </p:grpSpPr>
+      <p:sp>
+        <p:nvSpPr>
+          <p:cNvPr id="2" name="Titre 1"/>
+          <p:cNvSpPr>
+            <a:spLocks noGrp="1"/>
+          </p:cNvSpPr>
+          <p:nvPr>
+            <p:ph type="title"/>
+          </p:nvPr>
+        </p:nvSpPr>
+        <p:spPr/>
+        <p:txBody>
+          <a:bodyPr>
+            <a:normAutofit/>
+          </a:bodyPr>
+          <a:lstStyle/>
+          <a:p>
+            <a:r>
+              <a:rPr lang="fr-FR" dirty="0" smtClean="0"/>
+              <a:t>Word i</a:t>
+            </a:r>
+            <a:r>
+              <a:rPr lang="fr-FR" dirty="0" smtClean="0"/>
+              <a:t>nput speed</a:t>
+            </a:r>
+            <a:endParaRPr lang="fr-FR" dirty="0"/>
+          </a:p>
+        </p:txBody>
+      </p:sp>
+      <p:sp>
+        <p:nvSpPr>
+          <p:cNvPr id="5" name="Espace réservé du texte 4"/>
+          <p:cNvSpPr>
+            <a:spLocks noGrp="1"/>
+          </p:cNvSpPr>
+          <p:nvPr>
+            <p:ph type="body" idx="1"/>
+          </p:nvPr>
+        </p:nvSpPr>
+        <p:spPr/>
+        <p:txBody>
+          <a:bodyPr/>
+          <a:lstStyle/>
+          <a:p>
+            <a:r>
+              <a:rPr lang="fr-FR" dirty="0" err="1" smtClean="0"/>
+              <a:t>Circular</a:t>
+            </a:r>
+            <a:r>
+              <a:rPr lang="fr-FR" dirty="0" smtClean="0"/>
+              <a:t> Keyboard</a:t>
+            </a:r>
+            <a:endParaRPr lang="fr-FR" dirty="0"/>
+          </a:p>
+        </p:txBody>
+      </p:sp>
+      <p:sp>
+        <p:nvSpPr>
+          <p:cNvPr id="7" name="Espace réservé du texte 6"/>
+          <p:cNvSpPr>
+            <a:spLocks noGrp="1"/>
+          </p:cNvSpPr>
+          <p:nvPr>
+            <p:ph type="body" sz="half" idx="3"/>
+          </p:nvPr>
+        </p:nvSpPr>
+        <p:spPr/>
+        <p:txBody>
+          <a:bodyPr/>
+          <a:lstStyle/>
+          <a:p>
+            <a:r>
+              <a:rPr lang="fr-FR" dirty="0" smtClean="0"/>
+              <a:t>T9 Keyboard</a:t>
+            </a:r>
+            <a:endParaRPr lang="fr-FR" dirty="0"/>
+          </a:p>
+        </p:txBody>
+      </p:sp>
+      <p:sp>
+        <p:nvSpPr>
+          <p:cNvPr id="4" name="Espace réservé du numéro de diapositive 3"/>
+          <p:cNvSpPr>
+            <a:spLocks noGrp="1"/>
+          </p:cNvSpPr>
+          <p:nvPr>
+            <p:ph type="sldNum" sz="quarter" idx="12"/>
+          </p:nvPr>
+        </p:nvSpPr>
+        <p:spPr/>
+        <p:txBody>
+          <a:bodyPr/>
+          <a:lstStyle/>
+          <a:p>
+            <a:fld id="{AB9DB7C7-3B7A-421A-AF98-AB9FC2185CD3}" type="slidenum">
+              <a:rPr lang="fr-FR" smtClean="0"/>
+              <a:pPr/>
+              <a:t>21</a:t>
             </a:fld>
             <a:endParaRPr lang="fr-FR" dirty="0"/>
           </a:p>
@@ -8500,7 +9181,7 @@
           </p:nvPr>
         </p:nvPicPr>
         <p:blipFill>
-          <a:blip r:embed="rId2" cstate="print"/>
+          <a:blip r:embed="rId3" cstate="print"/>
           <a:srcRect/>
           <a:stretch>
             <a:fillRect/>
@@ -8534,7 +9215,7 @@
           </p:nvPr>
         </p:nvPicPr>
         <p:blipFill>
-          <a:blip r:embed="rId3" cstate="print"/>
+          <a:blip r:embed="rId4" cstate="print"/>
           <a:srcRect/>
           <a:stretch>
             <a:fillRect/>
@@ -8572,7 +9253,7 @@
 </p:sld>
 </file>
 
-<file path=ppt/slides/slide19.xml><?xml version="1.0" encoding="utf-8"?>
+<file path=ppt/slides/slide22.xml><?xml version="1.0" encoding="utf-8"?>
 <p:sld xmlns:a="http://schemas.openxmlformats.org/drawingml/2006/main" xmlns:r="http://schemas.openxmlformats.org/officeDocument/2006/relationships" xmlns:p="http://schemas.openxmlformats.org/presentationml/2006/main">
   <p:cSld>
     <p:spTree>
@@ -8606,15 +9287,11 @@
           <a:p>
             <a:r>
               <a:rPr lang="fr-FR" dirty="0" smtClean="0"/>
-              <a:t>Input </a:t>
-            </a:r>
-            <a:r>
-              <a:rPr lang="fr-FR" dirty="0" err="1" smtClean="0"/>
-              <a:t>word</a:t>
+              <a:t>Word input </a:t>
             </a:r>
             <a:r>
               <a:rPr lang="fr-FR" dirty="0" smtClean="0"/>
-              <a:t> speed</a:t>
+              <a:t>speed</a:t>
             </a:r>
             <a:endParaRPr lang="fr-FR" dirty="0"/>
           </a:p>
@@ -8688,7 +9365,7 @@
             <a:fld id="{AB9DB7C7-3B7A-421A-AF98-AB9FC2185CD3}" type="slidenum">
               <a:rPr lang="fr-FR" smtClean="0"/>
               <a:pPr/>
-              <a:t>19</a:t>
+              <a:t>22</a:t>
             </a:fld>
             <a:endParaRPr lang="fr-FR" dirty="0"/>
           </a:p>
@@ -8749,7 +9426,7 @@
 </p:sld>
 </file>
 
-<file path=ppt/slides/slide2.xml><?xml version="1.0" encoding="utf-8"?>
+<file path=ppt/slides/slide23.xml><?xml version="1.0" encoding="utf-8"?>
 <p:sld xmlns:a="http://schemas.openxmlformats.org/drawingml/2006/main" xmlns:r="http://schemas.openxmlformats.org/officeDocument/2006/relationships" xmlns:p="http://schemas.openxmlformats.org/presentationml/2006/main">
   <p:cSld>
     <p:spTree>
@@ -8768,6 +9445,189 @@
       </p:grpSpPr>
       <p:sp>
         <p:nvSpPr>
+          <p:cNvPr id="6" name="Espace réservé du contenu 2"/>
+          <p:cNvSpPr>
+            <a:spLocks noGrp="1"/>
+          </p:cNvSpPr>
+          <p:nvPr>
+            <p:ph idx="1"/>
+          </p:nvPr>
+        </p:nvSpPr>
+        <p:spPr>
+          <a:xfrm>
+            <a:off x="457200" y="1600200"/>
+            <a:ext cx="7467600" cy="4525963"/>
+          </a:xfrm>
+        </p:spPr>
+        <p:txBody>
+          <a:bodyPr>
+            <a:normAutofit fontScale="92500" lnSpcReduction="20000"/>
+          </a:bodyPr>
+          <a:lstStyle/>
+          <a:p>
+            <a:r>
+              <a:rPr lang="en-US" dirty="0" smtClean="0"/>
+              <a:t>Stable and accurate cursor</a:t>
+            </a:r>
+          </a:p>
+          <a:p>
+            <a:r>
+              <a:rPr lang="en-US" dirty="0" smtClean="0"/>
+              <a:t>Hand recognition </a:t>
+            </a:r>
+            <a:r>
+              <a:rPr lang="en-US" dirty="0" smtClean="0"/>
+              <a:t>equivalent to </a:t>
+            </a:r>
+            <a:r>
+              <a:rPr lang="en-US" dirty="0" smtClean="0"/>
+              <a:t>Kinect </a:t>
+            </a:r>
+            <a:r>
+              <a:rPr lang="en-US" dirty="0" smtClean="0"/>
+              <a:t>Skeleton</a:t>
+            </a:r>
+          </a:p>
+          <a:p>
+            <a:r>
+              <a:rPr lang="en-US" dirty="0" smtClean="0"/>
+              <a:t>TODO: </a:t>
+            </a:r>
+            <a:r>
+              <a:rPr lang="en-US" dirty="0" err="1" smtClean="0"/>
+              <a:t>rajouter</a:t>
+            </a:r>
+            <a:r>
+              <a:rPr lang="en-US" dirty="0" smtClean="0"/>
+              <a:t> </a:t>
+            </a:r>
+            <a:r>
+              <a:rPr lang="en-US" dirty="0" err="1" smtClean="0"/>
+              <a:t>que</a:t>
+            </a:r>
+            <a:r>
+              <a:rPr lang="en-US" dirty="0" smtClean="0"/>
+              <a:t> </a:t>
+            </a:r>
+            <a:r>
+              <a:rPr lang="en-US" dirty="0" err="1" smtClean="0"/>
+              <a:t>notre</a:t>
+            </a:r>
+            <a:r>
+              <a:rPr lang="en-US" dirty="0" smtClean="0"/>
+              <a:t> </a:t>
+            </a:r>
+            <a:r>
+              <a:rPr lang="en-US" dirty="0" err="1" smtClean="0"/>
+              <a:t>truc</a:t>
+            </a:r>
+            <a:r>
+              <a:rPr lang="en-US" dirty="0" smtClean="0"/>
+              <a:t> </a:t>
+            </a:r>
+            <a:r>
+              <a:rPr lang="en-US" dirty="0" err="1" smtClean="0"/>
+              <a:t>roxxe</a:t>
+            </a:r>
+            <a:r>
+              <a:rPr lang="en-US" dirty="0" smtClean="0"/>
+              <a:t> </a:t>
+            </a:r>
+            <a:r>
+              <a:rPr lang="en-US" dirty="0" err="1" smtClean="0"/>
+              <a:t>parce</a:t>
+            </a:r>
+            <a:r>
+              <a:rPr lang="en-US" dirty="0" smtClean="0"/>
+              <a:t> </a:t>
+            </a:r>
+            <a:r>
+              <a:rPr lang="en-US" dirty="0" err="1" smtClean="0"/>
+              <a:t>qu’on</a:t>
+            </a:r>
+            <a:r>
+              <a:rPr lang="en-US" dirty="0" smtClean="0"/>
+              <a:t> a pas à </a:t>
+            </a:r>
+            <a:r>
+              <a:rPr lang="en-US" dirty="0" err="1" smtClean="0"/>
+              <a:t>être</a:t>
+            </a:r>
+            <a:r>
+              <a:rPr lang="en-US" dirty="0" smtClean="0"/>
+              <a:t> </a:t>
+            </a:r>
+            <a:r>
+              <a:rPr lang="en-US" dirty="0" err="1" smtClean="0"/>
+              <a:t>debout</a:t>
+            </a:r>
+            <a:r>
+              <a:rPr lang="en-US" dirty="0" smtClean="0"/>
+              <a:t> pour </a:t>
+            </a:r>
+            <a:r>
+              <a:rPr lang="en-US" dirty="0" err="1" smtClean="0"/>
+              <a:t>l’utiliser</a:t>
+            </a:r>
+            <a:endParaRPr lang="en-US" dirty="0" smtClean="0"/>
+          </a:p>
+          <a:p>
+            <a:r>
+              <a:rPr lang="en-US" dirty="0" smtClean="0"/>
+              <a:t>Total Execution Time : </a:t>
+            </a:r>
+            <a:r>
+              <a:rPr lang="en-US" dirty="0" smtClean="0">
+                <a:solidFill>
+                  <a:srgbClr val="FFC000"/>
+                </a:solidFill>
+              </a:rPr>
+              <a:t>10 – 18 ms</a:t>
+            </a:r>
+            <a:endParaRPr lang="en-US" dirty="0" smtClean="0">
+              <a:solidFill>
+                <a:srgbClr val="FFFF00"/>
+              </a:solidFill>
+            </a:endParaRPr>
+          </a:p>
+          <a:p>
+            <a:r>
+              <a:rPr lang="en-US" dirty="0" smtClean="0"/>
+              <a:t>We are tracking 4 blobs</a:t>
+            </a:r>
+          </a:p>
+          <a:p>
+            <a:pPr lvl="1"/>
+            <a:r>
+              <a:rPr lang="en-US" dirty="0" smtClean="0"/>
+              <a:t>Single user</a:t>
+            </a:r>
+          </a:p>
+          <a:p>
+            <a:pPr lvl="1"/>
+            <a:r>
+              <a:rPr lang="en-US" dirty="0" smtClean="0"/>
+              <a:t>One blob added for safety considering the noise of </a:t>
+            </a:r>
+            <a:r>
+              <a:rPr lang="en-US" dirty="0" err="1" smtClean="0"/>
+              <a:t>Kinect’s</a:t>
+            </a:r>
+            <a:r>
+              <a:rPr lang="en-US" dirty="0" smtClean="0"/>
+              <a:t> sensors</a:t>
+            </a:r>
+          </a:p>
+          <a:p>
+            <a:r>
+              <a:rPr lang="en-US" dirty="0" smtClean="0"/>
+              <a:t>Functional distance : 1m – 2m</a:t>
+            </a:r>
+          </a:p>
+        </p:txBody>
+      </p:sp>
+      <p:sp>
+        <p:nvSpPr>
           <p:cNvPr id="2" name="Titre 1"/>
           <p:cNvSpPr>
             <a:spLocks noGrp="1"/>
@@ -8780,76 +9640,12 @@
         <p:txBody>
           <a:bodyPr/>
           <a:lstStyle/>
-          <a:p>
-            <a:r>
-              <a:rPr lang="en-US" dirty="0" smtClean="0"/>
-              <a:t>Summary</a:t>
-            </a:r>
-            <a:endParaRPr lang="en-US" dirty="0"/>
-          </a:p>
-        </p:txBody>
-      </p:sp>
-      <p:sp>
-        <p:nvSpPr>
-          <p:cNvPr id="3" name="Espace réservé du contenu 2"/>
-          <p:cNvSpPr>
-            <a:spLocks noGrp="1"/>
-          </p:cNvSpPr>
-          <p:nvPr>
-            <p:ph idx="1"/>
-          </p:nvPr>
-        </p:nvSpPr>
-        <p:spPr/>
-        <p:txBody>
-          <a:bodyPr/>
-          <a:lstStyle/>
-          <a:p>
-            <a:r>
-              <a:rPr lang="en-US" dirty="0" smtClean="0"/>
-              <a:t>Motivations</a:t>
-            </a:r>
-          </a:p>
-          <a:p>
-            <a:r>
-              <a:rPr lang="en-US" dirty="0" smtClean="0"/>
-              <a:t>Background</a:t>
-            </a:r>
-          </a:p>
-          <a:p>
-            <a:r>
-              <a:rPr lang="en-US" dirty="0" smtClean="0"/>
-              <a:t>Objectives</a:t>
-            </a:r>
-          </a:p>
-          <a:p>
-            <a:r>
-              <a:rPr lang="en-US" dirty="0" smtClean="0"/>
-              <a:t>Solution</a:t>
-            </a:r>
-          </a:p>
-          <a:p>
-            <a:r>
-              <a:rPr lang="en-US" dirty="0" smtClean="0"/>
-              <a:t>Theory/Technical</a:t>
-            </a:r>
-          </a:p>
-          <a:p>
-            <a:r>
-              <a:rPr lang="en-US" dirty="0" smtClean="0"/>
-              <a:t>Evaluation</a:t>
-            </a:r>
-          </a:p>
           <a:p>
             <a:r>
               <a:rPr lang="en-US" dirty="0" smtClean="0"/>
               <a:t>Results</a:t>
             </a:r>
-          </a:p>
-          <a:p>
-            <a:r>
-              <a:rPr lang="en-US" dirty="0" smtClean="0"/>
-              <a:t>Conclusion</a:t>
-            </a:r>
+            <a:endParaRPr lang="en-US" dirty="0"/>
           </a:p>
         </p:txBody>
       </p:sp>
@@ -8869,11 +9665,11 @@
           <a:lstStyle/>
           <a:p>
             <a:fld id="{AB9DB7C7-3B7A-421A-AF98-AB9FC2185CD3}" type="slidenum">
-              <a:rPr lang="fr-FR" smtClean="0"/>
+              <a:rPr lang="en-US" smtClean="0"/>
               <a:pPr/>
-              <a:t>2</a:t>
+              <a:t>23</a:t>
             </a:fld>
-            <a:endParaRPr lang="fr-FR" dirty="0"/>
+            <a:endParaRPr lang="en-US"/>
           </a:p>
         </p:txBody>
       </p:sp>
@@ -8892,7 +9688,7 @@
 </p:sld>
 </file>
 
-<file path=ppt/slides/slide20.xml><?xml version="1.0" encoding="utf-8"?>
+<file path=ppt/slides/slide24.xml><?xml version="1.0" encoding="utf-8"?>
 <p:sld xmlns:a="http://schemas.openxmlformats.org/drawingml/2006/main" xmlns:r="http://schemas.openxmlformats.org/officeDocument/2006/relationships" xmlns:p="http://schemas.openxmlformats.org/presentationml/2006/main">
   <p:cSld>
     <p:spTree>
@@ -8911,7 +9707,30 @@
       </p:grpSpPr>
       <p:sp>
         <p:nvSpPr>
-          <p:cNvPr id="6" name="Espace réservé du contenu 2"/>
+          <p:cNvPr id="2" name="Titre 1"/>
+          <p:cNvSpPr>
+            <a:spLocks noGrp="1"/>
+          </p:cNvSpPr>
+          <p:nvPr>
+            <p:ph type="title"/>
+          </p:nvPr>
+        </p:nvSpPr>
+        <p:spPr/>
+        <p:txBody>
+          <a:bodyPr/>
+          <a:lstStyle/>
+          <a:p>
+            <a:r>
+              <a:rPr lang="fr-FR" dirty="0" smtClean="0"/>
+              <a:t>Conclusion</a:t>
+            </a:r>
+            <a:endParaRPr lang="fr-FR" dirty="0"/>
+          </a:p>
+        </p:txBody>
+      </p:sp>
+      <p:sp>
+        <p:nvSpPr>
+          <p:cNvPr id="3" name="Espace réservé du contenu 2"/>
           <p:cNvSpPr>
             <a:spLocks noGrp="1"/>
           </p:cNvSpPr>
@@ -8919,92 +9738,104 @@
             <p:ph idx="1"/>
           </p:nvPr>
         </p:nvSpPr>
-        <p:spPr>
-          <a:xfrm>
-            <a:off x="457200" y="1600200"/>
-            <a:ext cx="7467600" cy="4525963"/>
-          </a:xfrm>
-        </p:spPr>
+        <p:spPr/>
         <p:txBody>
           <a:bodyPr>
-            <a:normAutofit lnSpcReduction="10000"/>
+            <a:normAutofit fontScale="85000" lnSpcReduction="20000"/>
           </a:bodyPr>
           <a:lstStyle/>
           <a:p>
             <a:r>
               <a:rPr lang="en-US" dirty="0" smtClean="0"/>
-              <a:t>Stable and accurate cursor</a:t>
-            </a:r>
-          </a:p>
-          <a:p>
+              <a:t>Features offered by the Kinect</a:t>
+            </a:r>
+          </a:p>
+          <a:p>
+            <a:pPr lvl="1"/>
             <a:r>
               <a:rPr lang="en-US" dirty="0" smtClean="0"/>
-              <a:t>Hand recognition on par with Kinect Skeleton</a:t>
-            </a:r>
-          </a:p>
-          <a:p>
+              <a:t>Depth data</a:t>
+            </a:r>
+          </a:p>
+          <a:p>
+            <a:pPr lvl="1"/>
             <a:r>
               <a:rPr lang="en-US" dirty="0" smtClean="0"/>
-              <a:t>Total Execution Time : </a:t>
-            </a:r>
-            <a:r>
-              <a:rPr lang="en-US" dirty="0" smtClean="0">
-                <a:solidFill>
-                  <a:srgbClr val="FFC000"/>
-                </a:solidFill>
-              </a:rPr>
-              <a:t>10 – 18 ms</a:t>
-            </a:r>
-            <a:endParaRPr lang="en-US" dirty="0" smtClean="0">
-              <a:solidFill>
-                <a:srgbClr val="FFFF00"/>
-              </a:solidFill>
-            </a:endParaRPr>
-          </a:p>
-          <a:p>
+              <a:t>Color data</a:t>
+            </a:r>
+          </a:p>
+          <a:p>
+            <a:pPr lvl="1"/>
             <a:r>
               <a:rPr lang="en-US" dirty="0" smtClean="0"/>
-              <a:t>We are tracking 4 blobs</a:t>
+              <a:t>Skeleton recognition</a:t>
+            </a:r>
+          </a:p>
+          <a:p>
+            <a:pPr lvl="1">
+              <a:buNone/>
+            </a:pPr>
+            <a:endParaRPr lang="en-US" dirty="0" smtClean="0"/>
+          </a:p>
+          <a:p>
+            <a:r>
+              <a:rPr lang="en-US" dirty="0" smtClean="0"/>
+              <a:t>Limitations</a:t>
             </a:r>
           </a:p>
           <a:p>
             <a:pPr lvl="1"/>
             <a:r>
               <a:rPr lang="en-US" dirty="0" smtClean="0"/>
-              <a:t>Single user</a:t>
+              <a:t>Distance</a:t>
             </a:r>
           </a:p>
           <a:p>
             <a:pPr lvl="1"/>
             <a:r>
               <a:rPr lang="en-US" dirty="0" smtClean="0"/>
-              <a:t>One blob added for safety considering the noise of </a:t>
-            </a:r>
-            <a:r>
-              <a:rPr lang="en-US" dirty="0" err="1" smtClean="0"/>
-              <a:t>Kinect’s</a:t>
-            </a:r>
+              <a:t>Accuracy when not standing up</a:t>
+            </a:r>
+          </a:p>
+          <a:p>
+            <a:pPr lvl="1">
+              <a:buNone/>
+            </a:pPr>
+            <a:endParaRPr lang="en-US" dirty="0" smtClean="0"/>
+          </a:p>
+          <a:p>
             <a:r>
               <a:rPr lang="en-US" dirty="0" smtClean="0"/>
-              <a:t> sensors</a:t>
-            </a:r>
+              <a:t>“Easy-to-use” camera</a:t>
+            </a:r>
+          </a:p>
+          <a:p>
+            <a:endParaRPr lang="en-US" dirty="0" smtClean="0"/>
           </a:p>
           <a:p>
             <a:r>
               <a:rPr lang="en-US" dirty="0" smtClean="0"/>
-              <a:t>Functional distance : 1m – 2m</a:t>
-            </a:r>
-          </a:p>
-        </p:txBody>
-      </p:sp>
-      <p:sp>
-        <p:nvSpPr>
-          <p:cNvPr id="2" name="Titre 1"/>
-          <p:cNvSpPr>
-            <a:spLocks noGrp="1"/>
-          </p:cNvSpPr>
-          <p:nvPr>
-            <p:ph type="title"/>
+              <a:t>PC Kinect in </a:t>
+            </a:r>
+            <a:r>
+              <a:rPr lang="en-US" dirty="0" smtClean="0"/>
+              <a:t>released (TODO: specs)</a:t>
+            </a:r>
+            <a:endParaRPr lang="en-US" dirty="0" smtClean="0"/>
+          </a:p>
+          <a:p>
+            <a:endParaRPr lang="fr-FR" dirty="0"/>
+          </a:p>
+        </p:txBody>
+      </p:sp>
+      <p:sp>
+        <p:nvSpPr>
+          <p:cNvPr id="4" name="Espace réservé du numéro de diapositive 3"/>
+          <p:cNvSpPr>
+            <a:spLocks noGrp="1"/>
+          </p:cNvSpPr>
+          <p:nvPr>
+            <p:ph type="sldNum" sz="quarter" idx="12"/>
           </p:nvPr>
         </p:nvSpPr>
         <p:spPr/>
@@ -9012,35 +9843,12 @@
           <a:bodyPr/>
           <a:lstStyle/>
           <a:p>
-            <a:r>
-              <a:rPr lang="en-US" dirty="0" smtClean="0"/>
-              <a:t>Results</a:t>
-            </a:r>
-            <a:endParaRPr lang="en-US" dirty="0"/>
-          </a:p>
-        </p:txBody>
-      </p:sp>
-      <p:sp>
-        <p:nvSpPr>
-          <p:cNvPr id="4" name="Espace réservé du numéro de diapositive 3"/>
-          <p:cNvSpPr>
-            <a:spLocks noGrp="1"/>
-          </p:cNvSpPr>
-          <p:nvPr>
-            <p:ph type="sldNum" sz="quarter" idx="12"/>
-          </p:nvPr>
-        </p:nvSpPr>
-        <p:spPr/>
-        <p:txBody>
-          <a:bodyPr/>
-          <a:lstStyle/>
-          <a:p>
             <a:fld id="{AB9DB7C7-3B7A-421A-AF98-AB9FC2185CD3}" type="slidenum">
-              <a:rPr lang="en-US" smtClean="0"/>
+              <a:rPr lang="fr-FR" smtClean="0"/>
               <a:pPr/>
-              <a:t>20</a:t>
+              <a:t>24</a:t>
             </a:fld>
-            <a:endParaRPr lang="en-US"/>
+            <a:endParaRPr lang="fr-FR" dirty="0"/>
           </a:p>
         </p:txBody>
       </p:sp>
@@ -9059,7 +9867,7 @@
 </p:sld>
 </file>
 
-<file path=ppt/slides/slide21.xml><?xml version="1.0" encoding="utf-8"?>
+<file path=ppt/slides/slide25.xml><?xml version="1.0" encoding="utf-8"?>
 <p:sld xmlns:a="http://schemas.openxmlformats.org/drawingml/2006/main" xmlns:r="http://schemas.openxmlformats.org/officeDocument/2006/relationships" xmlns:p="http://schemas.openxmlformats.org/presentationml/2006/main">
   <p:cSld>
     <p:spTree>
@@ -9078,187 +9886,6 @@
       </p:grpSpPr>
       <p:sp>
         <p:nvSpPr>
-          <p:cNvPr id="2" name="Titre 1"/>
-          <p:cNvSpPr>
-            <a:spLocks noGrp="1"/>
-          </p:cNvSpPr>
-          <p:nvPr>
-            <p:ph type="title"/>
-          </p:nvPr>
-        </p:nvSpPr>
-        <p:spPr/>
-        <p:txBody>
-          <a:bodyPr/>
-          <a:lstStyle/>
-          <a:p>
-            <a:r>
-              <a:rPr lang="fr-FR" dirty="0" smtClean="0"/>
-              <a:t>Conclusion</a:t>
-            </a:r>
-            <a:endParaRPr lang="fr-FR" dirty="0"/>
-          </a:p>
-        </p:txBody>
-      </p:sp>
-      <p:sp>
-        <p:nvSpPr>
-          <p:cNvPr id="3" name="Espace réservé du contenu 2"/>
-          <p:cNvSpPr>
-            <a:spLocks noGrp="1"/>
-          </p:cNvSpPr>
-          <p:nvPr>
-            <p:ph idx="1"/>
-          </p:nvPr>
-        </p:nvSpPr>
-        <p:spPr/>
-        <p:txBody>
-          <a:bodyPr>
-            <a:normAutofit fontScale="77500" lnSpcReduction="20000"/>
-          </a:bodyPr>
-          <a:lstStyle/>
-          <a:p>
-            <a:r>
-              <a:rPr lang="en-US" dirty="0" smtClean="0"/>
-              <a:t>Features offered by the Kinect</a:t>
-            </a:r>
-          </a:p>
-          <a:p>
-            <a:pPr lvl="1"/>
-            <a:r>
-              <a:rPr lang="en-US" dirty="0" smtClean="0"/>
-              <a:t>Depth data</a:t>
-            </a:r>
-          </a:p>
-          <a:p>
-            <a:pPr lvl="1"/>
-            <a:r>
-              <a:rPr lang="en-US" dirty="0" smtClean="0"/>
-              <a:t>Color data</a:t>
-            </a:r>
-          </a:p>
-          <a:p>
-            <a:pPr lvl="1"/>
-            <a:r>
-              <a:rPr lang="en-US" dirty="0" smtClean="0"/>
-              <a:t>Skeleton recognition</a:t>
-            </a:r>
-          </a:p>
-          <a:p>
-            <a:pPr lvl="1">
-              <a:buNone/>
-            </a:pPr>
-            <a:endParaRPr lang="en-US" dirty="0" smtClean="0"/>
-          </a:p>
-          <a:p>
-            <a:r>
-              <a:rPr lang="en-US" dirty="0" smtClean="0"/>
-              <a:t>Limitations</a:t>
-            </a:r>
-          </a:p>
-          <a:p>
-            <a:pPr lvl="1"/>
-            <a:r>
-              <a:rPr lang="en-US" dirty="0" smtClean="0"/>
-              <a:t>Distance</a:t>
-            </a:r>
-          </a:p>
-          <a:p>
-            <a:pPr lvl="1"/>
-            <a:r>
-              <a:rPr lang="en-US" dirty="0" smtClean="0"/>
-              <a:t>Accuracy when not standing up</a:t>
-            </a:r>
-          </a:p>
-          <a:p>
-            <a:pPr lvl="1">
-              <a:buNone/>
-            </a:pPr>
-            <a:endParaRPr lang="en-US" dirty="0" smtClean="0"/>
-          </a:p>
-          <a:p>
-            <a:r>
-              <a:rPr lang="en-US" dirty="0" smtClean="0"/>
-              <a:t>“Easy-to-use” camera</a:t>
-            </a:r>
-          </a:p>
-          <a:p>
-            <a:endParaRPr lang="en-US" dirty="0" smtClean="0"/>
-          </a:p>
-          <a:p>
-            <a:r>
-              <a:rPr lang="en-US" dirty="0" smtClean="0"/>
-              <a:t>PC Kinect in development</a:t>
-            </a:r>
-            <a:br>
-              <a:rPr lang="en-US" dirty="0" smtClean="0"/>
-            </a:br>
-            <a:r>
-              <a:rPr lang="en-US" dirty="0" smtClean="0"/>
-              <a:t>Minimum Depth : 50 cm (1m with the current Kinect)</a:t>
-            </a:r>
-          </a:p>
-          <a:p>
-            <a:endParaRPr lang="fr-FR" dirty="0"/>
-          </a:p>
-        </p:txBody>
-      </p:sp>
-      <p:sp>
-        <p:nvSpPr>
-          <p:cNvPr id="4" name="Espace réservé du numéro de diapositive 3"/>
-          <p:cNvSpPr>
-            <a:spLocks noGrp="1"/>
-          </p:cNvSpPr>
-          <p:nvPr>
-            <p:ph type="sldNum" sz="quarter" idx="12"/>
-          </p:nvPr>
-        </p:nvSpPr>
-        <p:spPr/>
-        <p:txBody>
-          <a:bodyPr/>
-          <a:lstStyle/>
-          <a:p>
-            <a:fld id="{AB9DB7C7-3B7A-421A-AF98-AB9FC2185CD3}" type="slidenum">
-              <a:rPr lang="fr-FR" smtClean="0"/>
-              <a:pPr/>
-              <a:t>21</a:t>
-            </a:fld>
-            <a:endParaRPr lang="fr-FR" dirty="0"/>
-          </a:p>
-        </p:txBody>
-      </p:sp>
-    </p:spTree>
-  </p:cSld>
-  <p:clrMapOvr>
-    <a:masterClrMapping/>
-  </p:clrMapOvr>
-  <p:timing>
-    <p:tnLst>
-      <p:par>
-        <p:cTn id="1" dur="indefinite" restart="never" nodeType="tmRoot"/>
-      </p:par>
-    </p:tnLst>
-  </p:timing>
-</p:sld>
-</file>
-
-<file path=ppt/slides/slide22.xml><?xml version="1.0" encoding="utf-8"?>
-<p:sld xmlns:a="http://schemas.openxmlformats.org/drawingml/2006/main" xmlns:r="http://schemas.openxmlformats.org/officeDocument/2006/relationships" xmlns:p="http://schemas.openxmlformats.org/presentationml/2006/main">
-  <p:cSld>
-    <p:spTree>
-      <p:nvGrpSpPr>
-        <p:cNvPr id="1" name=""/>
-        <p:cNvGrpSpPr/>
-        <p:nvPr/>
-      </p:nvGrpSpPr>
-      <p:grpSpPr>
-        <a:xfrm>
-          <a:off x="0" y="0"/>
-          <a:ext cx="0" cy="0"/>
-          <a:chOff x="0" y="0"/>
-          <a:chExt cx="0" cy="0"/>
-        </a:xfrm>
-      </p:grpSpPr>
-      <p:sp>
-        <p:nvSpPr>
           <p:cNvPr id="5" name="Titre 4"/>
           <p:cNvSpPr>
             <a:spLocks noGrp="1"/>
@@ -9304,7 +9931,7 @@
             <a:fld id="{AB9DB7C7-3B7A-421A-AF98-AB9FC2185CD3}" type="slidenum">
               <a:rPr lang="fr-FR" smtClean="0"/>
               <a:pPr/>
-              <a:t>22</a:t>
+              <a:t>25</a:t>
             </a:fld>
             <a:endParaRPr lang="fr-FR" dirty="0"/>
           </a:p>

</xml_diff>